<commit_message>
modified Atef s part
</commit_message>
<xml_diff>
--- a/Expose_ARPAnet.pptx
+++ b/Expose_ARPAnet.pptx
@@ -13,12 +13,12 @@
   <p:sldIdLst>
     <p:sldId id="256" r:id="rId2"/>
     <p:sldId id="258" r:id="rId3"/>
-    <p:sldId id="262" r:id="rId4"/>
-    <p:sldId id="275" r:id="rId5"/>
+    <p:sldId id="275" r:id="rId4"/>
+    <p:sldId id="262" r:id="rId5"/>
     <p:sldId id="273" r:id="rId6"/>
     <p:sldId id="276" r:id="rId7"/>
     <p:sldId id="260" r:id="rId8"/>
-    <p:sldId id="274" r:id="rId9"/>
+    <p:sldId id="277" r:id="rId9"/>
     <p:sldId id="257" r:id="rId10"/>
     <p:sldId id="259" r:id="rId11"/>
     <p:sldId id="268" r:id="rId12"/>
@@ -148,7 +148,8 @@
 <p1510:revInfo xmlns:a="http://schemas.openxmlformats.org/drawingml/2006/main" xmlns:r="http://schemas.openxmlformats.org/officeDocument/2006/relationships" xmlns:p1510="http://schemas.microsoft.com/office/powerpoint/2015/10/main">
   <p1510:revLst>
     <p1510:client id="{03B86C6F-3327-42D7-B8E1-DF0C704BC322}" v="3" dt="2024-01-15T19:08:09.055"/>
-    <p1510:client id="{4BFF2F48-6638-484E-B9AC-4C7D5C1CFC2C}" v="94" dt="2024-01-15T20:59:15.500"/>
+    <p1510:client id="{4422DB98-549F-6814-9FFB-CA30D1A2C8C2}" v="40" dt="2024-01-15T21:50:59.259"/>
+    <p1510:client id="{4BFF2F48-6638-484E-B9AC-4C7D5C1CFC2C}" v="727" dt="2024-01-15T21:44:18.876"/>
     <p1510:client id="{5E9A9961-44C6-4693-80A4-C8D1F14ED8A6}" v="471" dt="2024-01-15T20:30:41.376"/>
     <p1510:client id="{6E17614E-7E8A-417E-AD9E-CF0071B3F5EA}" v="1" dt="2024-01-15T20:46:42.084"/>
     <p1510:client id="{9AC9D32F-A8A6-4323-93B3-394C3AAAF4F0}" v="52" dt="2024-01-15T19:19:09.549"/>
@@ -158,564 +159,6 @@
 
 <file path=ppt/changesInfos/changesInfo1.xml><?xml version="1.0" encoding="utf-8"?>
 <pc:chgInfo xmlns:a="http://schemas.openxmlformats.org/drawingml/2006/main" xmlns:r="http://schemas.openxmlformats.org/officeDocument/2006/relationships" xmlns:ac="http://schemas.microsoft.com/office/drawing/2013/main/command" xmlns:pc="http://schemas.microsoft.com/office/powerpoint/2013/main/command">
-  <pc:docChgLst>
-    <pc:chgData name="Atef Mrad" userId="S::bwb.a.mrad@fondespierre.com::4488c457-ef99-4230-b0ca-d6b8f1ad5a27" providerId="AD" clId="Web-{5E9A9961-44C6-4693-80A4-C8D1F14ED8A6}"/>
-    <pc:docChg chg="mod addSld modSld sldOrd">
-      <pc:chgData name="Atef Mrad" userId="S::bwb.a.mrad@fondespierre.com::4488c457-ef99-4230-b0ca-d6b8f1ad5a27" providerId="AD" clId="Web-{5E9A9961-44C6-4693-80A4-C8D1F14ED8A6}" dt="2024-01-15T20:30:38.783" v="558" actId="20577"/>
-      <pc:docMkLst>
-        <pc:docMk/>
-      </pc:docMkLst>
-      <pc:sldChg chg="addSp delSp modSp modNotes">
-        <pc:chgData name="Atef Mrad" userId="S::bwb.a.mrad@fondespierre.com::4488c457-ef99-4230-b0ca-d6b8f1ad5a27" providerId="AD" clId="Web-{5E9A9961-44C6-4693-80A4-C8D1F14ED8A6}" dt="2024-01-15T20:26:10.303" v="525" actId="20577"/>
-        <pc:sldMkLst>
-          <pc:docMk/>
-          <pc:sldMk cId="180226005" sldId="258"/>
-        </pc:sldMkLst>
-        <pc:spChg chg="mod">
-          <ac:chgData name="Atef Mrad" userId="S::bwb.a.mrad@fondespierre.com::4488c457-ef99-4230-b0ca-d6b8f1ad5a27" providerId="AD" clId="Web-{5E9A9961-44C6-4693-80A4-C8D1F14ED8A6}" dt="2024-01-15T19:26:55.993" v="0"/>
-          <ac:spMkLst>
-            <pc:docMk/>
-            <pc:sldMk cId="180226005" sldId="258"/>
-            <ac:spMk id="5" creationId="{37EF6C40-661E-E00E-5D81-FC8A49FAA3D5}"/>
-          </ac:spMkLst>
-        </pc:spChg>
-        <pc:spChg chg="mod">
-          <ac:chgData name="Atef Mrad" userId="S::bwb.a.mrad@fondespierre.com::4488c457-ef99-4230-b0ca-d6b8f1ad5a27" providerId="AD" clId="Web-{5E9A9961-44C6-4693-80A4-C8D1F14ED8A6}" dt="2024-01-15T20:26:10.303" v="525" actId="20577"/>
-          <ac:spMkLst>
-            <pc:docMk/>
-            <pc:sldMk cId="180226005" sldId="258"/>
-            <ac:spMk id="7" creationId="{56F3D5DE-B93A-556E-58FA-A3D016079468}"/>
-          </ac:spMkLst>
-        </pc:spChg>
-        <pc:spChg chg="del">
-          <ac:chgData name="Atef Mrad" userId="S::bwb.a.mrad@fondespierre.com::4488c457-ef99-4230-b0ca-d6b8f1ad5a27" providerId="AD" clId="Web-{5E9A9961-44C6-4693-80A4-C8D1F14ED8A6}" dt="2024-01-15T19:26:55.993" v="0"/>
-          <ac:spMkLst>
-            <pc:docMk/>
-            <pc:sldMk cId="180226005" sldId="258"/>
-            <ac:spMk id="31" creationId="{665DBBEF-238B-476B-96AB-8AAC3224ECEA}"/>
-          </ac:spMkLst>
-        </pc:spChg>
-        <pc:spChg chg="del">
-          <ac:chgData name="Atef Mrad" userId="S::bwb.a.mrad@fondespierre.com::4488c457-ef99-4230-b0ca-d6b8f1ad5a27" providerId="AD" clId="Web-{5E9A9961-44C6-4693-80A4-C8D1F14ED8A6}" dt="2024-01-15T19:26:55.993" v="0"/>
-          <ac:spMkLst>
-            <pc:docMk/>
-            <pc:sldMk cId="180226005" sldId="258"/>
-            <ac:spMk id="33" creationId="{3FCFB1DE-0B7E-48CC-BA90-B2AB0889F9D6}"/>
-          </ac:spMkLst>
-        </pc:spChg>
-        <pc:spChg chg="add">
-          <ac:chgData name="Atef Mrad" userId="S::bwb.a.mrad@fondespierre.com::4488c457-ef99-4230-b0ca-d6b8f1ad5a27" providerId="AD" clId="Web-{5E9A9961-44C6-4693-80A4-C8D1F14ED8A6}" dt="2024-01-15T19:26:55.993" v="0"/>
-          <ac:spMkLst>
-            <pc:docMk/>
-            <pc:sldMk cId="180226005" sldId="258"/>
-            <ac:spMk id="38" creationId="{6B5E2835-4E47-45B3-9CFE-732FF7B05472}"/>
-          </ac:spMkLst>
-        </pc:spChg>
-        <pc:spChg chg="add">
-          <ac:chgData name="Atef Mrad" userId="S::bwb.a.mrad@fondespierre.com::4488c457-ef99-4230-b0ca-d6b8f1ad5a27" providerId="AD" clId="Web-{5E9A9961-44C6-4693-80A4-C8D1F14ED8A6}" dt="2024-01-15T19:26:55.993" v="0"/>
-          <ac:spMkLst>
-            <pc:docMk/>
-            <pc:sldMk cId="180226005" sldId="258"/>
-            <ac:spMk id="40" creationId="{5B45AD5D-AA52-4F7B-9362-576A39AD9E09}"/>
-          </ac:spMkLst>
-        </pc:spChg>
-        <pc:spChg chg="add">
-          <ac:chgData name="Atef Mrad" userId="S::bwb.a.mrad@fondespierre.com::4488c457-ef99-4230-b0ca-d6b8f1ad5a27" providerId="AD" clId="Web-{5E9A9961-44C6-4693-80A4-C8D1F14ED8A6}" dt="2024-01-15T19:26:55.993" v="0"/>
-          <ac:spMkLst>
-            <pc:docMk/>
-            <pc:sldMk cId="180226005" sldId="258"/>
-            <ac:spMk id="42" creationId="{AEDD7960-4866-4399-BEF6-DD1431AB4E34}"/>
-          </ac:spMkLst>
-        </pc:spChg>
-        <pc:spChg chg="add">
-          <ac:chgData name="Atef Mrad" userId="S::bwb.a.mrad@fondespierre.com::4488c457-ef99-4230-b0ca-d6b8f1ad5a27" providerId="AD" clId="Web-{5E9A9961-44C6-4693-80A4-C8D1F14ED8A6}" dt="2024-01-15T19:26:55.993" v="0"/>
-          <ac:spMkLst>
-            <pc:docMk/>
-            <pc:sldMk cId="180226005" sldId="258"/>
-            <ac:spMk id="44" creationId="{55D4142C-5077-457F-A6AD-3FECFDB39685}"/>
-          </ac:spMkLst>
-        </pc:spChg>
-        <pc:spChg chg="add">
-          <ac:chgData name="Atef Mrad" userId="S::bwb.a.mrad@fondespierre.com::4488c457-ef99-4230-b0ca-d6b8f1ad5a27" providerId="AD" clId="Web-{5E9A9961-44C6-4693-80A4-C8D1F14ED8A6}" dt="2024-01-15T19:26:55.993" v="0"/>
-          <ac:spMkLst>
-            <pc:docMk/>
-            <pc:sldMk cId="180226005" sldId="258"/>
-            <ac:spMk id="46" creationId="{7A5F0580-5EE9-419F-96EE-B6529EF6E7D0}"/>
-          </ac:spMkLst>
-        </pc:spChg>
-        <pc:picChg chg="mod ord">
-          <ac:chgData name="Atef Mrad" userId="S::bwb.a.mrad@fondespierre.com::4488c457-ef99-4230-b0ca-d6b8f1ad5a27" providerId="AD" clId="Web-{5E9A9961-44C6-4693-80A4-C8D1F14ED8A6}" dt="2024-01-15T19:26:55.993" v="0"/>
-          <ac:picMkLst>
-            <pc:docMk/>
-            <pc:sldMk cId="180226005" sldId="258"/>
-            <ac:picMk id="2" creationId="{C44FBADD-87A3-79D7-9012-1CB269FC5652}"/>
-          </ac:picMkLst>
-        </pc:picChg>
-      </pc:sldChg>
-      <pc:sldChg chg="addSp delSp modSp modNotes">
-        <pc:chgData name="Atef Mrad" userId="S::bwb.a.mrad@fondespierre.com::4488c457-ef99-4230-b0ca-d6b8f1ad5a27" providerId="AD" clId="Web-{5E9A9961-44C6-4693-80A4-C8D1F14ED8A6}" dt="2024-01-15T20:29:13.217" v="535" actId="20577"/>
-        <pc:sldMkLst>
-          <pc:docMk/>
-          <pc:sldMk cId="1574640382" sldId="260"/>
-        </pc:sldMkLst>
-        <pc:spChg chg="mod">
-          <ac:chgData name="Atef Mrad" userId="S::bwb.a.mrad@fondespierre.com::4488c457-ef99-4230-b0ca-d6b8f1ad5a27" providerId="AD" clId="Web-{5E9A9961-44C6-4693-80A4-C8D1F14ED8A6}" dt="2024-01-15T19:30:37.798" v="37"/>
-          <ac:spMkLst>
-            <pc:docMk/>
-            <pc:sldMk cId="1574640382" sldId="260"/>
-            <ac:spMk id="4" creationId="{3029BEB2-8B7C-C613-C587-953DAE3D5BCD}"/>
-          </ac:spMkLst>
-        </pc:spChg>
-        <pc:spChg chg="mod">
-          <ac:chgData name="Atef Mrad" userId="S::bwb.a.mrad@fondespierre.com::4488c457-ef99-4230-b0ca-d6b8f1ad5a27" providerId="AD" clId="Web-{5E9A9961-44C6-4693-80A4-C8D1F14ED8A6}" dt="2024-01-15T20:29:13.217" v="535" actId="20577"/>
-          <ac:spMkLst>
-            <pc:docMk/>
-            <pc:sldMk cId="1574640382" sldId="260"/>
-            <ac:spMk id="8" creationId="{96BD530C-2AFB-374C-D58A-78DB95EB526B}"/>
-          </ac:spMkLst>
-        </pc:spChg>
-        <pc:spChg chg="del">
-          <ac:chgData name="Atef Mrad" userId="S::bwb.a.mrad@fondespierre.com::4488c457-ef99-4230-b0ca-d6b8f1ad5a27" providerId="AD" clId="Web-{5E9A9961-44C6-4693-80A4-C8D1F14ED8A6}" dt="2024-01-15T19:30:37.798" v="37"/>
-          <ac:spMkLst>
-            <pc:docMk/>
-            <pc:sldMk cId="1574640382" sldId="260"/>
-            <ac:spMk id="13" creationId="{327D73B4-9F5C-4A64-A179-51B9500CB8B5}"/>
-          </ac:spMkLst>
-        </pc:spChg>
-        <pc:spChg chg="del">
-          <ac:chgData name="Atef Mrad" userId="S::bwb.a.mrad@fondespierre.com::4488c457-ef99-4230-b0ca-d6b8f1ad5a27" providerId="AD" clId="Web-{5E9A9961-44C6-4693-80A4-C8D1F14ED8A6}" dt="2024-01-15T19:30:37.798" v="37"/>
-          <ac:spMkLst>
-            <pc:docMk/>
-            <pc:sldMk cId="1574640382" sldId="260"/>
-            <ac:spMk id="15" creationId="{85D33C90-E0E9-4BCC-847B-53431DF7C73A}"/>
-          </ac:spMkLst>
-        </pc:spChg>
-        <pc:spChg chg="del">
-          <ac:chgData name="Atef Mrad" userId="S::bwb.a.mrad@fondespierre.com::4488c457-ef99-4230-b0ca-d6b8f1ad5a27" providerId="AD" clId="Web-{5E9A9961-44C6-4693-80A4-C8D1F14ED8A6}" dt="2024-01-15T19:30:37.798" v="37"/>
-          <ac:spMkLst>
-            <pc:docMk/>
-            <pc:sldMk cId="1574640382" sldId="260"/>
-            <ac:spMk id="17" creationId="{0743BE1B-E693-47F5-A9BA-46D13E0C9751}"/>
-          </ac:spMkLst>
-        </pc:spChg>
-        <pc:spChg chg="del">
-          <ac:chgData name="Atef Mrad" userId="S::bwb.a.mrad@fondespierre.com::4488c457-ef99-4230-b0ca-d6b8f1ad5a27" providerId="AD" clId="Web-{5E9A9961-44C6-4693-80A4-C8D1F14ED8A6}" dt="2024-01-15T19:30:37.798" v="37"/>
-          <ac:spMkLst>
-            <pc:docMk/>
-            <pc:sldMk cId="1574640382" sldId="260"/>
-            <ac:spMk id="23" creationId="{1453BF6C-B012-48B7-B4E8-6D7AC7C27D02}"/>
-          </ac:spMkLst>
-        </pc:spChg>
-        <pc:spChg chg="del">
-          <ac:chgData name="Atef Mrad" userId="S::bwb.a.mrad@fondespierre.com::4488c457-ef99-4230-b0ca-d6b8f1ad5a27" providerId="AD" clId="Web-{5E9A9961-44C6-4693-80A4-C8D1F14ED8A6}" dt="2024-01-15T19:30:37.798" v="37"/>
-          <ac:spMkLst>
-            <pc:docMk/>
-            <pc:sldMk cId="1574640382" sldId="260"/>
-            <ac:spMk id="25" creationId="{D0F14822-B1F1-4730-A131-C3416A790B0D}"/>
-          </ac:spMkLst>
-        </pc:spChg>
-        <pc:spChg chg="add">
-          <ac:chgData name="Atef Mrad" userId="S::bwb.a.mrad@fondespierre.com::4488c457-ef99-4230-b0ca-d6b8f1ad5a27" providerId="AD" clId="Web-{5E9A9961-44C6-4693-80A4-C8D1F14ED8A6}" dt="2024-01-15T19:30:37.798" v="37"/>
-          <ac:spMkLst>
-            <pc:docMk/>
-            <pc:sldMk cId="1574640382" sldId="260"/>
-            <ac:spMk id="32" creationId="{F13C74B1-5B17-4795-BED0-7140497B445A}"/>
-          </ac:spMkLst>
-        </pc:spChg>
-        <pc:spChg chg="add">
-          <ac:chgData name="Atef Mrad" userId="S::bwb.a.mrad@fondespierre.com::4488c457-ef99-4230-b0ca-d6b8f1ad5a27" providerId="AD" clId="Web-{5E9A9961-44C6-4693-80A4-C8D1F14ED8A6}" dt="2024-01-15T19:30:37.798" v="37"/>
-          <ac:spMkLst>
-            <pc:docMk/>
-            <pc:sldMk cId="1574640382" sldId="260"/>
-            <ac:spMk id="34" creationId="{D4974D33-8DC5-464E-8C6D-BE58F0669C17}"/>
-          </ac:spMkLst>
-        </pc:spChg>
-        <pc:grpChg chg="del">
-          <ac:chgData name="Atef Mrad" userId="S::bwb.a.mrad@fondespierre.com::4488c457-ef99-4230-b0ca-d6b8f1ad5a27" providerId="AD" clId="Web-{5E9A9961-44C6-4693-80A4-C8D1F14ED8A6}" dt="2024-01-15T19:30:37.798" v="37"/>
-          <ac:grpSpMkLst>
-            <pc:docMk/>
-            <pc:sldMk cId="1574640382" sldId="260"/>
-            <ac:grpSpMk id="19" creationId="{CF5BD426-789C-4E69-83C0-245370E37264}"/>
-          </ac:grpSpMkLst>
-        </pc:grpChg>
-        <pc:picChg chg="del">
-          <ac:chgData name="Atef Mrad" userId="S::bwb.a.mrad@fondespierre.com::4488c457-ef99-4230-b0ca-d6b8f1ad5a27" providerId="AD" clId="Web-{5E9A9961-44C6-4693-80A4-C8D1F14ED8A6}" dt="2024-01-15T19:30:19.469" v="34"/>
-          <ac:picMkLst>
-            <pc:docMk/>
-            <pc:sldMk cId="1574640382" sldId="260"/>
-            <ac:picMk id="2" creationId="{31D0BB37-4694-0A53-CD1A-1B4DE8538AE8}"/>
-          </ac:picMkLst>
-        </pc:picChg>
-        <pc:picChg chg="del">
-          <ac:chgData name="Atef Mrad" userId="S::bwb.a.mrad@fondespierre.com::4488c457-ef99-4230-b0ca-d6b8f1ad5a27" providerId="AD" clId="Web-{5E9A9961-44C6-4693-80A4-C8D1F14ED8A6}" dt="2024-01-15T19:30:17.532" v="33"/>
-          <ac:picMkLst>
-            <pc:docMk/>
-            <pc:sldMk cId="1574640382" sldId="260"/>
-            <ac:picMk id="3" creationId="{482E7E35-D90F-5ABB-07DA-DE23957B086F}"/>
-          </ac:picMkLst>
-        </pc:picChg>
-        <pc:picChg chg="del">
-          <ac:chgData name="Atef Mrad" userId="S::bwb.a.mrad@fondespierre.com::4488c457-ef99-4230-b0ca-d6b8f1ad5a27" providerId="AD" clId="Web-{5E9A9961-44C6-4693-80A4-C8D1F14ED8A6}" dt="2024-01-15T19:30:15.391" v="32"/>
-          <ac:picMkLst>
-            <pc:docMk/>
-            <pc:sldMk cId="1574640382" sldId="260"/>
-            <ac:picMk id="5" creationId="{55861065-D6A3-A98D-940F-98E4FD8865AD}"/>
-          </ac:picMkLst>
-        </pc:picChg>
-        <pc:picChg chg="add mod">
-          <ac:chgData name="Atef Mrad" userId="S::bwb.a.mrad@fondespierre.com::4488c457-ef99-4230-b0ca-d6b8f1ad5a27" providerId="AD" clId="Web-{5E9A9961-44C6-4693-80A4-C8D1F14ED8A6}" dt="2024-01-15T19:30:37.798" v="37"/>
-          <ac:picMkLst>
-            <pc:docMk/>
-            <pc:sldMk cId="1574640382" sldId="260"/>
-            <ac:picMk id="6" creationId="{49850487-9AF9-067F-DCD1-37A9EB20F4AE}"/>
-          </ac:picMkLst>
-        </pc:picChg>
-        <pc:cxnChg chg="del">
-          <ac:chgData name="Atef Mrad" userId="S::bwb.a.mrad@fondespierre.com::4488c457-ef99-4230-b0ca-d6b8f1ad5a27" providerId="AD" clId="Web-{5E9A9961-44C6-4693-80A4-C8D1F14ED8A6}" dt="2024-01-15T19:30:37.798" v="37"/>
-          <ac:cxnSpMkLst>
-            <pc:docMk/>
-            <pc:sldMk cId="1574640382" sldId="260"/>
-            <ac:cxnSpMk id="27" creationId="{C49DA8F6-BCC1-4447-B54C-57856834B94B}"/>
-          </ac:cxnSpMkLst>
-        </pc:cxnChg>
-      </pc:sldChg>
-      <pc:sldChg chg="modSp modNotes">
-        <pc:chgData name="Atef Mrad" userId="S::bwb.a.mrad@fondespierre.com::4488c457-ef99-4230-b0ca-d6b8f1ad5a27" providerId="AD" clId="Web-{5E9A9961-44C6-4693-80A4-C8D1F14ED8A6}" dt="2024-01-15T20:10:32.033" v="461"/>
-        <pc:sldMkLst>
-          <pc:docMk/>
-          <pc:sldMk cId="406620325" sldId="262"/>
-        </pc:sldMkLst>
-        <pc:spChg chg="mod">
-          <ac:chgData name="Atef Mrad" userId="S::bwb.a.mrad@fondespierre.com::4488c457-ef99-4230-b0ca-d6b8f1ad5a27" providerId="AD" clId="Web-{5E9A9961-44C6-4693-80A4-C8D1F14ED8A6}" dt="2024-01-15T20:09:36.827" v="459" actId="20577"/>
-          <ac:spMkLst>
-            <pc:docMk/>
-            <pc:sldMk cId="406620325" sldId="262"/>
-            <ac:spMk id="7" creationId="{56F3D5DE-B93A-556E-58FA-A3D016079468}"/>
-          </ac:spMkLst>
-        </pc:spChg>
-      </pc:sldChg>
-      <pc:sldChg chg="addSp delSp modSp modNotes">
-        <pc:chgData name="Atef Mrad" userId="S::bwb.a.mrad@fondespierre.com::4488c457-ef99-4230-b0ca-d6b8f1ad5a27" providerId="AD" clId="Web-{5E9A9961-44C6-4693-80A4-C8D1F14ED8A6}" dt="2024-01-15T20:24:45.769" v="523" actId="20577"/>
-        <pc:sldMkLst>
-          <pc:docMk/>
-          <pc:sldMk cId="2191258283" sldId="273"/>
-        </pc:sldMkLst>
-        <pc:spChg chg="mod">
-          <ac:chgData name="Atef Mrad" userId="S::bwb.a.mrad@fondespierre.com::4488c457-ef99-4230-b0ca-d6b8f1ad5a27" providerId="AD" clId="Web-{5E9A9961-44C6-4693-80A4-C8D1F14ED8A6}" dt="2024-01-15T20:02:19.998" v="354"/>
-          <ac:spMkLst>
-            <pc:docMk/>
-            <pc:sldMk cId="2191258283" sldId="273"/>
-            <ac:spMk id="4" creationId="{5A9127B8-465A-A5ED-9627-395F4258B19C}"/>
-          </ac:spMkLst>
-        </pc:spChg>
-        <pc:spChg chg="add del mod">
-          <ac:chgData name="Atef Mrad" userId="S::bwb.a.mrad@fondespierre.com::4488c457-ef99-4230-b0ca-d6b8f1ad5a27" providerId="AD" clId="Web-{5E9A9961-44C6-4693-80A4-C8D1F14ED8A6}" dt="2024-01-15T20:24:45.769" v="523" actId="20577"/>
-          <ac:spMkLst>
-            <pc:docMk/>
-            <pc:sldMk cId="2191258283" sldId="273"/>
-            <ac:spMk id="7" creationId="{982A96F1-D04C-17E5-3AE4-7914E1279374}"/>
-          </ac:spMkLst>
-        </pc:spChg>
-        <pc:spChg chg="add del mod">
-          <ac:chgData name="Atef Mrad" userId="S::bwb.a.mrad@fondespierre.com::4488c457-ef99-4230-b0ca-d6b8f1ad5a27" providerId="AD" clId="Web-{5E9A9961-44C6-4693-80A4-C8D1F14ED8A6}" dt="2024-01-15T19:56:34.609" v="240"/>
-          <ac:spMkLst>
-            <pc:docMk/>
-            <pc:sldMk cId="2191258283" sldId="273"/>
-            <ac:spMk id="8" creationId="{8773CCD0-14EE-275F-510A-64D063EE9359}"/>
-          </ac:spMkLst>
-        </pc:spChg>
-        <pc:spChg chg="add del">
-          <ac:chgData name="Atef Mrad" userId="S::bwb.a.mrad@fondespierre.com::4488c457-ef99-4230-b0ca-d6b8f1ad5a27" providerId="AD" clId="Web-{5E9A9961-44C6-4693-80A4-C8D1F14ED8A6}" dt="2024-01-15T19:47:02.399" v="149"/>
-          <ac:spMkLst>
-            <pc:docMk/>
-            <pc:sldMk cId="2191258283" sldId="273"/>
-            <ac:spMk id="29" creationId="{F58FB4AA-7058-4218-AE65-3ACD24A41226}"/>
-          </ac:spMkLst>
-        </pc:spChg>
-        <pc:spChg chg="add del">
-          <ac:chgData name="Atef Mrad" userId="S::bwb.a.mrad@fondespierre.com::4488c457-ef99-4230-b0ca-d6b8f1ad5a27" providerId="AD" clId="Web-{5E9A9961-44C6-4693-80A4-C8D1F14ED8A6}" dt="2024-01-15T19:47:02.399" v="149"/>
-          <ac:spMkLst>
-            <pc:docMk/>
-            <pc:sldMk cId="2191258283" sldId="273"/>
-            <ac:spMk id="31" creationId="{F35BC0E3-6FE4-4491-BA19-C0126066A51B}"/>
-          </ac:spMkLst>
-        </pc:spChg>
-        <pc:spChg chg="add del">
-          <ac:chgData name="Atef Mrad" userId="S::bwb.a.mrad@fondespierre.com::4488c457-ef99-4230-b0ca-d6b8f1ad5a27" providerId="AD" clId="Web-{5E9A9961-44C6-4693-80A4-C8D1F14ED8A6}" dt="2024-01-15T19:47:02.399" v="149"/>
-          <ac:spMkLst>
-            <pc:docMk/>
-            <pc:sldMk cId="2191258283" sldId="273"/>
-            <ac:spMk id="33" creationId="{DB11BD18-218F-49C7-BE16-82AEA08B237B}"/>
-          </ac:spMkLst>
-        </pc:spChg>
-        <pc:spChg chg="add del">
-          <ac:chgData name="Atef Mrad" userId="S::bwb.a.mrad@fondespierre.com::4488c457-ef99-4230-b0ca-d6b8f1ad5a27" providerId="AD" clId="Web-{5E9A9961-44C6-4693-80A4-C8D1F14ED8A6}" dt="2024-01-15T19:47:02.399" v="149"/>
-          <ac:spMkLst>
-            <pc:docMk/>
-            <pc:sldMk cId="2191258283" sldId="273"/>
-            <ac:spMk id="37" creationId="{EA996627-3E00-4A50-8640-F4F7D38C556C}"/>
-          </ac:spMkLst>
-        </pc:spChg>
-        <pc:spChg chg="add del">
-          <ac:chgData name="Atef Mrad" userId="S::bwb.a.mrad@fondespierre.com::4488c457-ef99-4230-b0ca-d6b8f1ad5a27" providerId="AD" clId="Web-{5E9A9961-44C6-4693-80A4-C8D1F14ED8A6}" dt="2024-01-15T19:47:02.399" v="149"/>
-          <ac:spMkLst>
-            <pc:docMk/>
-            <pc:sldMk cId="2191258283" sldId="273"/>
-            <ac:spMk id="39" creationId="{A619555D-3337-4F1A-9AFF-1DA3B921C57C}"/>
-          </ac:spMkLst>
-        </pc:spChg>
-        <pc:spChg chg="add del">
-          <ac:chgData name="Atef Mrad" userId="S::bwb.a.mrad@fondespierre.com::4488c457-ef99-4230-b0ca-d6b8f1ad5a27" providerId="AD" clId="Web-{5E9A9961-44C6-4693-80A4-C8D1F14ED8A6}" dt="2024-01-15T19:47:02.399" v="149"/>
-          <ac:spMkLst>
-            <pc:docMk/>
-            <pc:sldMk cId="2191258283" sldId="273"/>
-            <ac:spMk id="41" creationId="{CF5E7AE0-415D-4236-B5E6-F2FC68DB94EE}"/>
-          </ac:spMkLst>
-        </pc:spChg>
-        <pc:spChg chg="add del">
-          <ac:chgData name="Atef Mrad" userId="S::bwb.a.mrad@fondespierre.com::4488c457-ef99-4230-b0ca-d6b8f1ad5a27" providerId="AD" clId="Web-{5E9A9961-44C6-4693-80A4-C8D1F14ED8A6}" dt="2024-01-15T19:47:02.383" v="148"/>
-          <ac:spMkLst>
-            <pc:docMk/>
-            <pc:sldMk cId="2191258283" sldId="273"/>
-            <ac:spMk id="46" creationId="{B3684CCF-CEBB-4D8E-A366-95E43D4C790B}"/>
-          </ac:spMkLst>
-        </pc:spChg>
-        <pc:spChg chg="add del">
-          <ac:chgData name="Atef Mrad" userId="S::bwb.a.mrad@fondespierre.com::4488c457-ef99-4230-b0ca-d6b8f1ad5a27" providerId="AD" clId="Web-{5E9A9961-44C6-4693-80A4-C8D1F14ED8A6}" dt="2024-01-15T19:47:02.383" v="148"/>
-          <ac:spMkLst>
-            <pc:docMk/>
-            <pc:sldMk cId="2191258283" sldId="273"/>
-            <ac:spMk id="48" creationId="{70BEB1E7-2F88-40BC-B73D-42E5B6F80BFC}"/>
-          </ac:spMkLst>
-        </pc:spChg>
-        <pc:spChg chg="add del">
-          <ac:chgData name="Atef Mrad" userId="S::bwb.a.mrad@fondespierre.com::4488c457-ef99-4230-b0ca-d6b8f1ad5a27" providerId="AD" clId="Web-{5E9A9961-44C6-4693-80A4-C8D1F14ED8A6}" dt="2024-01-15T20:02:19.998" v="354"/>
-          <ac:spMkLst>
-            <pc:docMk/>
-            <pc:sldMk cId="2191258283" sldId="273"/>
-            <ac:spMk id="50" creationId="{AD96FDFD-4E42-4A06-B8B5-768A1DB9C2A9}"/>
-          </ac:spMkLst>
-        </pc:spChg>
-        <pc:spChg chg="add">
-          <ac:chgData name="Atef Mrad" userId="S::bwb.a.mrad@fondespierre.com::4488c457-ef99-4230-b0ca-d6b8f1ad5a27" providerId="AD" clId="Web-{5E9A9961-44C6-4693-80A4-C8D1F14ED8A6}" dt="2024-01-15T20:02:19.998" v="354"/>
-          <ac:spMkLst>
-            <pc:docMk/>
-            <pc:sldMk cId="2191258283" sldId="273"/>
-            <ac:spMk id="55" creationId="{394842B0-684D-44CC-B4BC-D13331CFD290}"/>
-          </ac:spMkLst>
-        </pc:spChg>
-        <pc:spChg chg="add">
-          <ac:chgData name="Atef Mrad" userId="S::bwb.a.mrad@fondespierre.com::4488c457-ef99-4230-b0ca-d6b8f1ad5a27" providerId="AD" clId="Web-{5E9A9961-44C6-4693-80A4-C8D1F14ED8A6}" dt="2024-01-15T20:02:19.998" v="354"/>
-          <ac:spMkLst>
-            <pc:docMk/>
-            <pc:sldMk cId="2191258283" sldId="273"/>
-            <ac:spMk id="57" creationId="{4C2A3DC3-F495-4B99-9FF3-3FB30D63235E}"/>
-          </ac:spMkLst>
-        </pc:spChg>
-        <pc:picChg chg="del mod ord">
-          <ac:chgData name="Atef Mrad" userId="S::bwb.a.mrad@fondespierre.com::4488c457-ef99-4230-b0ca-d6b8f1ad5a27" providerId="AD" clId="Web-{5E9A9961-44C6-4693-80A4-C8D1F14ED8A6}" dt="2024-01-15T19:56:57.578" v="247"/>
-          <ac:picMkLst>
-            <pc:docMk/>
-            <pc:sldMk cId="2191258283" sldId="273"/>
-            <ac:picMk id="2" creationId="{DA678507-F958-669D-584C-AC478D1639CC}"/>
-          </ac:picMkLst>
-        </pc:picChg>
-        <pc:picChg chg="del mod ord">
-          <ac:chgData name="Atef Mrad" userId="S::bwb.a.mrad@fondespierre.com::4488c457-ef99-4230-b0ca-d6b8f1ad5a27" providerId="AD" clId="Web-{5E9A9961-44C6-4693-80A4-C8D1F14ED8A6}" dt="2024-01-15T19:56:56.125" v="246"/>
-          <ac:picMkLst>
-            <pc:docMk/>
-            <pc:sldMk cId="2191258283" sldId="273"/>
-            <ac:picMk id="3" creationId="{DE8488E2-0F7D-CE4C-EF8B-5BA484D9BCF6}"/>
-          </ac:picMkLst>
-        </pc:picChg>
-        <pc:picChg chg="del mod ord">
-          <ac:chgData name="Atef Mrad" userId="S::bwb.a.mrad@fondespierre.com::4488c457-ef99-4230-b0ca-d6b8f1ad5a27" providerId="AD" clId="Web-{5E9A9961-44C6-4693-80A4-C8D1F14ED8A6}" dt="2024-01-15T19:56:54.766" v="245"/>
-          <ac:picMkLst>
-            <pc:docMk/>
-            <pc:sldMk cId="2191258283" sldId="273"/>
-            <ac:picMk id="5" creationId="{541744BF-B421-EB02-F6CA-8E2F270DB08B}"/>
-          </ac:picMkLst>
-        </pc:picChg>
-        <pc:picChg chg="add mod">
-          <ac:chgData name="Atef Mrad" userId="S::bwb.a.mrad@fondespierre.com::4488c457-ef99-4230-b0ca-d6b8f1ad5a27" providerId="AD" clId="Web-{5E9A9961-44C6-4693-80A4-C8D1F14ED8A6}" dt="2024-01-15T20:02:39.217" v="357" actId="14100"/>
-          <ac:picMkLst>
-            <pc:docMk/>
-            <pc:sldMk cId="2191258283" sldId="273"/>
-            <ac:picMk id="9" creationId="{0691D244-F0D1-BCE4-C1C3-329B39DB8B68}"/>
-          </ac:picMkLst>
-        </pc:picChg>
-        <pc:picChg chg="add mod">
-          <ac:chgData name="Atef Mrad" userId="S::bwb.a.mrad@fondespierre.com::4488c457-ef99-4230-b0ca-d6b8f1ad5a27" providerId="AD" clId="Web-{5E9A9961-44C6-4693-80A4-C8D1F14ED8A6}" dt="2024-01-15T20:02:42.483" v="358" actId="14100"/>
-          <ac:picMkLst>
-            <pc:docMk/>
-            <pc:sldMk cId="2191258283" sldId="273"/>
-            <ac:picMk id="10" creationId="{C4910B2A-4490-A145-E8A0-6EE2C03D2E08}"/>
-          </ac:picMkLst>
-        </pc:picChg>
-        <pc:cxnChg chg="add del">
-          <ac:chgData name="Atef Mrad" userId="S::bwb.a.mrad@fondespierre.com::4488c457-ef99-4230-b0ca-d6b8f1ad5a27" providerId="AD" clId="Web-{5E9A9961-44C6-4693-80A4-C8D1F14ED8A6}" dt="2024-01-15T19:47:02.399" v="149"/>
-          <ac:cxnSpMkLst>
-            <pc:docMk/>
-            <pc:sldMk cId="2191258283" sldId="273"/>
-            <ac:cxnSpMk id="35" creationId="{A054EDF5-7644-4A95-AB88-057FAB414FEE}"/>
-          </ac:cxnSpMkLst>
-        </pc:cxnChg>
-      </pc:sldChg>
-      <pc:sldChg chg="addSp modSp new mod setBg addCm">
-        <pc:chgData name="Atef Mrad" userId="S::bwb.a.mrad@fondespierre.com::4488c457-ef99-4230-b0ca-d6b8f1ad5a27" providerId="AD" clId="Web-{5E9A9961-44C6-4693-80A4-C8D1F14ED8A6}" dt="2024-01-15T20:03:41.360" v="360"/>
-        <pc:sldMkLst>
-          <pc:docMk/>
-          <pc:sldMk cId="2191452943" sldId="274"/>
-        </pc:sldMkLst>
-        <pc:spChg chg="mod">
-          <ac:chgData name="Atef Mrad" userId="S::bwb.a.mrad@fondespierre.com::4488c457-ef99-4230-b0ca-d6b8f1ad5a27" providerId="AD" clId="Web-{5E9A9961-44C6-4693-80A4-C8D1F14ED8A6}" dt="2024-01-15T19:46:23.444" v="146" actId="20577"/>
-          <ac:spMkLst>
-            <pc:docMk/>
-            <pc:sldMk cId="2191452943" sldId="274"/>
-            <ac:spMk id="2" creationId="{E1ABFEBE-89B1-8032-852B-762AD86B607A}"/>
-          </ac:spMkLst>
-        </pc:spChg>
-        <pc:spChg chg="mod">
-          <ac:chgData name="Atef Mrad" userId="S::bwb.a.mrad@fondespierre.com::4488c457-ef99-4230-b0ca-d6b8f1ad5a27" providerId="AD" clId="Web-{5E9A9961-44C6-4693-80A4-C8D1F14ED8A6}" dt="2024-01-15T19:45:55.506" v="142"/>
-          <ac:spMkLst>
-            <pc:docMk/>
-            <pc:sldMk cId="2191452943" sldId="274"/>
-            <ac:spMk id="3" creationId="{3CEA4403-45F8-D8CD-D438-D85FDE05C5A2}"/>
-          </ac:spMkLst>
-        </pc:spChg>
-        <pc:spChg chg="add">
-          <ac:chgData name="Atef Mrad" userId="S::bwb.a.mrad@fondespierre.com::4488c457-ef99-4230-b0ca-d6b8f1ad5a27" providerId="AD" clId="Web-{5E9A9961-44C6-4693-80A4-C8D1F14ED8A6}" dt="2024-01-15T19:45:55.506" v="142"/>
-          <ac:spMkLst>
-            <pc:docMk/>
-            <pc:sldMk cId="2191452943" sldId="274"/>
-            <ac:spMk id="9" creationId="{F13C74B1-5B17-4795-BED0-7140497B445A}"/>
-          </ac:spMkLst>
-        </pc:spChg>
-        <pc:spChg chg="add">
-          <ac:chgData name="Atef Mrad" userId="S::bwb.a.mrad@fondespierre.com::4488c457-ef99-4230-b0ca-d6b8f1ad5a27" providerId="AD" clId="Web-{5E9A9961-44C6-4693-80A4-C8D1F14ED8A6}" dt="2024-01-15T19:45:55.506" v="142"/>
-          <ac:spMkLst>
-            <pc:docMk/>
-            <pc:sldMk cId="2191452943" sldId="274"/>
-            <ac:spMk id="11" creationId="{D4974D33-8DC5-464E-8C6D-BE58F0669C17}"/>
-          </ac:spMkLst>
-        </pc:spChg>
-        <pc:picChg chg="add mod">
-          <ac:chgData name="Atef Mrad" userId="S::bwb.a.mrad@fondespierre.com::4488c457-ef99-4230-b0ca-d6b8f1ad5a27" providerId="AD" clId="Web-{5E9A9961-44C6-4693-80A4-C8D1F14ED8A6}" dt="2024-01-15T19:45:55.506" v="142"/>
-          <ac:picMkLst>
-            <pc:docMk/>
-            <pc:sldMk cId="2191452943" sldId="274"/>
-            <ac:picMk id="4" creationId="{D1CF49A7-6669-7447-A39F-A8A8061DA4C8}"/>
-          </ac:picMkLst>
-        </pc:picChg>
-        <pc:extLst>
-          <p:ext xmlns:p="http://schemas.openxmlformats.org/presentationml/2006/main" uri="{D6D511B9-2390-475A-947B-AFAB55BFBCF1}">
-            <pc226:cmChg xmlns:pc226="http://schemas.microsoft.com/office/powerpoint/2022/06/main/command" chg="add">
-              <pc226:chgData name="Atef Mrad" userId="S::bwb.a.mrad@fondespierre.com::4488c457-ef99-4230-b0ca-d6b8f1ad5a27" providerId="AD" clId="Web-{5E9A9961-44C6-4693-80A4-C8D1F14ED8A6}" dt="2024-01-15T20:03:41.360" v="360"/>
-              <pc2:cmMkLst xmlns:pc2="http://schemas.microsoft.com/office/powerpoint/2019/9/main/command">
-                <pc:docMk/>
-                <pc:sldMk cId="2191452943" sldId="274"/>
-                <pc2:cmMk id="{748825A9-048C-4F05-A29A-AEEB0559E3AA}"/>
-              </pc2:cmMkLst>
-            </pc226:cmChg>
-          </p:ext>
-        </pc:extLst>
-      </pc:sldChg>
-      <pc:sldChg chg="addSp modSp new mod ord setBg">
-        <pc:chgData name="Atef Mrad" userId="S::bwb.a.mrad@fondespierre.com::4488c457-ef99-4230-b0ca-d6b8f1ad5a27" providerId="AD" clId="Web-{5E9A9961-44C6-4693-80A4-C8D1F14ED8A6}" dt="2024-01-15T20:30:38.783" v="558" actId="20577"/>
-        <pc:sldMkLst>
-          <pc:docMk/>
-          <pc:sldMk cId="3921660627" sldId="275"/>
-        </pc:sldMkLst>
-        <pc:spChg chg="mod">
-          <ac:chgData name="Atef Mrad" userId="S::bwb.a.mrad@fondespierre.com::4488c457-ef99-4230-b0ca-d6b8f1ad5a27" providerId="AD" clId="Web-{5E9A9961-44C6-4693-80A4-C8D1F14ED8A6}" dt="2024-01-15T20:30:38.783" v="558" actId="20577"/>
-          <ac:spMkLst>
-            <pc:docMk/>
-            <pc:sldMk cId="3921660627" sldId="275"/>
-            <ac:spMk id="2" creationId="{B8A5D022-49CD-F031-5CF4-E6BD0CDE50BF}"/>
-          </ac:spMkLst>
-        </pc:spChg>
-        <pc:spChg chg="mod">
-          <ac:chgData name="Atef Mrad" userId="S::bwb.a.mrad@fondespierre.com::4488c457-ef99-4230-b0ca-d6b8f1ad5a27" providerId="AD" clId="Web-{5E9A9961-44C6-4693-80A4-C8D1F14ED8A6}" dt="2024-01-15T19:53:45.852" v="220" actId="20577"/>
-          <ac:spMkLst>
-            <pc:docMk/>
-            <pc:sldMk cId="3921660627" sldId="275"/>
-            <ac:spMk id="3" creationId="{7B84777B-C837-DD2A-B516-875BC7CD4784}"/>
-          </ac:spMkLst>
-        </pc:spChg>
-        <pc:spChg chg="add">
-          <ac:chgData name="Atef Mrad" userId="S::bwb.a.mrad@fondespierre.com::4488c457-ef99-4230-b0ca-d6b8f1ad5a27" providerId="AD" clId="Web-{5E9A9961-44C6-4693-80A4-C8D1F14ED8A6}" dt="2024-01-15T19:53:27.039" v="219"/>
-          <ac:spMkLst>
-            <pc:docMk/>
-            <pc:sldMk cId="3921660627" sldId="275"/>
-            <ac:spMk id="9" creationId="{743AA782-23D1-4521-8CAD-47662984AA08}"/>
-          </ac:spMkLst>
-        </pc:spChg>
-        <pc:spChg chg="add">
-          <ac:chgData name="Atef Mrad" userId="S::bwb.a.mrad@fondespierre.com::4488c457-ef99-4230-b0ca-d6b8f1ad5a27" providerId="AD" clId="Web-{5E9A9961-44C6-4693-80A4-C8D1F14ED8A6}" dt="2024-01-15T19:53:27.039" v="219"/>
-          <ac:spMkLst>
-            <pc:docMk/>
-            <pc:sldMk cId="3921660627" sldId="275"/>
-            <ac:spMk id="11" creationId="{71877DBC-BB60-40F0-AC93-2ACDBAAE60CE}"/>
-          </ac:spMkLst>
-        </pc:spChg>
-        <pc:picChg chg="add mod">
-          <ac:chgData name="Atef Mrad" userId="S::bwb.a.mrad@fondespierre.com::4488c457-ef99-4230-b0ca-d6b8f1ad5a27" providerId="AD" clId="Web-{5E9A9961-44C6-4693-80A4-C8D1F14ED8A6}" dt="2024-01-15T19:53:27.039" v="219"/>
-          <ac:picMkLst>
-            <pc:docMk/>
-            <pc:sldMk cId="3921660627" sldId="275"/>
-            <ac:picMk id="4" creationId="{450FFC09-1AB2-F2B8-623A-DAC22C955732}"/>
-          </ac:picMkLst>
-        </pc:picChg>
-      </pc:sldChg>
-      <pc:sldChg chg="addSp modSp new mod setBg modNotes">
-        <pc:chgData name="Atef Mrad" userId="S::bwb.a.mrad@fondespierre.com::4488c457-ef99-4230-b0ca-d6b8f1ad5a27" providerId="AD" clId="Web-{5E9A9961-44C6-4693-80A4-C8D1F14ED8A6}" dt="2024-01-15T20:22:21.310" v="521" actId="20577"/>
-        <pc:sldMkLst>
-          <pc:docMk/>
-          <pc:sldMk cId="1303324382" sldId="276"/>
-        </pc:sldMkLst>
-        <pc:spChg chg="mod">
-          <ac:chgData name="Atef Mrad" userId="S::bwb.a.mrad@fondespierre.com::4488c457-ef99-4230-b0ca-d6b8f1ad5a27" providerId="AD" clId="Web-{5E9A9961-44C6-4693-80A4-C8D1F14ED8A6}" dt="2024-01-15T20:06:50.040" v="406"/>
-          <ac:spMkLst>
-            <pc:docMk/>
-            <pc:sldMk cId="1303324382" sldId="276"/>
-            <ac:spMk id="2" creationId="{7D58A86C-0BA0-14BB-3E81-B64FE792C4FD}"/>
-          </ac:spMkLst>
-        </pc:spChg>
-        <pc:spChg chg="mod">
-          <ac:chgData name="Atef Mrad" userId="S::bwb.a.mrad@fondespierre.com::4488c457-ef99-4230-b0ca-d6b8f1ad5a27" providerId="AD" clId="Web-{5E9A9961-44C6-4693-80A4-C8D1F14ED8A6}" dt="2024-01-15T20:22:21.310" v="521" actId="20577"/>
-          <ac:spMkLst>
-            <pc:docMk/>
-            <pc:sldMk cId="1303324382" sldId="276"/>
-            <ac:spMk id="3" creationId="{0FBA8A1B-7A93-B73D-F568-AF1A5EAA0393}"/>
-          </ac:spMkLst>
-        </pc:spChg>
-        <pc:spChg chg="add">
-          <ac:chgData name="Atef Mrad" userId="S::bwb.a.mrad@fondespierre.com::4488c457-ef99-4230-b0ca-d6b8f1ad5a27" providerId="AD" clId="Web-{5E9A9961-44C6-4693-80A4-C8D1F14ED8A6}" dt="2024-01-15T20:06:50.040" v="406"/>
-          <ac:spMkLst>
-            <pc:docMk/>
-            <pc:sldMk cId="1303324382" sldId="276"/>
-            <ac:spMk id="9" creationId="{F13C74B1-5B17-4795-BED0-7140497B445A}"/>
-          </ac:spMkLst>
-        </pc:spChg>
-        <pc:spChg chg="add">
-          <ac:chgData name="Atef Mrad" userId="S::bwb.a.mrad@fondespierre.com::4488c457-ef99-4230-b0ca-d6b8f1ad5a27" providerId="AD" clId="Web-{5E9A9961-44C6-4693-80A4-C8D1F14ED8A6}" dt="2024-01-15T20:06:50.040" v="406"/>
-          <ac:spMkLst>
-            <pc:docMk/>
-            <pc:sldMk cId="1303324382" sldId="276"/>
-            <ac:spMk id="11" creationId="{D4974D33-8DC5-464E-8C6D-BE58F0669C17}"/>
-          </ac:spMkLst>
-        </pc:spChg>
-        <pc:picChg chg="add mod">
-          <ac:chgData name="Atef Mrad" userId="S::bwb.a.mrad@fondespierre.com::4488c457-ef99-4230-b0ca-d6b8f1ad5a27" providerId="AD" clId="Web-{5E9A9961-44C6-4693-80A4-C8D1F14ED8A6}" dt="2024-01-15T20:06:50.040" v="406"/>
-          <ac:picMkLst>
-            <pc:docMk/>
-            <pc:sldMk cId="1303324382" sldId="276"/>
-            <ac:picMk id="4" creationId="{F440C707-FEEA-7DAC-C40A-A6D1EF9A8225}"/>
-          </ac:picMkLst>
-        </pc:picChg>
-      </pc:sldChg>
-    </pc:docChg>
-  </pc:docChgLst>
   <pc:docChgLst>
     <pc:chgData name="Atef Mrad" userId="S::bwb.a.mrad@fondespierre.com::4488c457-ef99-4230-b0ca-d6b8f1ad5a27" providerId="AD" clId="Web-{9AC9D32F-A8A6-4323-93B3-394C3AAAF4F0}"/>
     <pc:docChg chg="modSld">
@@ -985,6 +428,564 @@
             <ac:spMk id="3" creationId="{FB503B7B-689F-463C-AA42-D24B66ED64BF}"/>
           </ac:spMkLst>
         </pc:spChg>
+      </pc:sldChg>
+    </pc:docChg>
+  </pc:docChgLst>
+  <pc:docChgLst>
+    <pc:chgData name="Atef Mrad" userId="S::bwb.a.mrad@fondespierre.com::4488c457-ef99-4230-b0ca-d6b8f1ad5a27" providerId="AD" clId="Web-{5E9A9961-44C6-4693-80A4-C8D1F14ED8A6}"/>
+    <pc:docChg chg="mod addSld modSld sldOrd">
+      <pc:chgData name="Atef Mrad" userId="S::bwb.a.mrad@fondespierre.com::4488c457-ef99-4230-b0ca-d6b8f1ad5a27" providerId="AD" clId="Web-{5E9A9961-44C6-4693-80A4-C8D1F14ED8A6}" dt="2024-01-15T20:30:38.783" v="558" actId="20577"/>
+      <pc:docMkLst>
+        <pc:docMk/>
+      </pc:docMkLst>
+      <pc:sldChg chg="addSp delSp modSp modNotes">
+        <pc:chgData name="Atef Mrad" userId="S::bwb.a.mrad@fondespierre.com::4488c457-ef99-4230-b0ca-d6b8f1ad5a27" providerId="AD" clId="Web-{5E9A9961-44C6-4693-80A4-C8D1F14ED8A6}" dt="2024-01-15T20:26:10.303" v="525" actId="20577"/>
+        <pc:sldMkLst>
+          <pc:docMk/>
+          <pc:sldMk cId="180226005" sldId="258"/>
+        </pc:sldMkLst>
+        <pc:spChg chg="mod">
+          <ac:chgData name="Atef Mrad" userId="S::bwb.a.mrad@fondespierre.com::4488c457-ef99-4230-b0ca-d6b8f1ad5a27" providerId="AD" clId="Web-{5E9A9961-44C6-4693-80A4-C8D1F14ED8A6}" dt="2024-01-15T19:26:55.993" v="0"/>
+          <ac:spMkLst>
+            <pc:docMk/>
+            <pc:sldMk cId="180226005" sldId="258"/>
+            <ac:spMk id="5" creationId="{37EF6C40-661E-E00E-5D81-FC8A49FAA3D5}"/>
+          </ac:spMkLst>
+        </pc:spChg>
+        <pc:spChg chg="mod">
+          <ac:chgData name="Atef Mrad" userId="S::bwb.a.mrad@fondespierre.com::4488c457-ef99-4230-b0ca-d6b8f1ad5a27" providerId="AD" clId="Web-{5E9A9961-44C6-4693-80A4-C8D1F14ED8A6}" dt="2024-01-15T20:26:10.303" v="525" actId="20577"/>
+          <ac:spMkLst>
+            <pc:docMk/>
+            <pc:sldMk cId="180226005" sldId="258"/>
+            <ac:spMk id="7" creationId="{56F3D5DE-B93A-556E-58FA-A3D016079468}"/>
+          </ac:spMkLst>
+        </pc:spChg>
+        <pc:spChg chg="del">
+          <ac:chgData name="Atef Mrad" userId="S::bwb.a.mrad@fondespierre.com::4488c457-ef99-4230-b0ca-d6b8f1ad5a27" providerId="AD" clId="Web-{5E9A9961-44C6-4693-80A4-C8D1F14ED8A6}" dt="2024-01-15T19:26:55.993" v="0"/>
+          <ac:spMkLst>
+            <pc:docMk/>
+            <pc:sldMk cId="180226005" sldId="258"/>
+            <ac:spMk id="31" creationId="{665DBBEF-238B-476B-96AB-8AAC3224ECEA}"/>
+          </ac:spMkLst>
+        </pc:spChg>
+        <pc:spChg chg="del">
+          <ac:chgData name="Atef Mrad" userId="S::bwb.a.mrad@fondespierre.com::4488c457-ef99-4230-b0ca-d6b8f1ad5a27" providerId="AD" clId="Web-{5E9A9961-44C6-4693-80A4-C8D1F14ED8A6}" dt="2024-01-15T19:26:55.993" v="0"/>
+          <ac:spMkLst>
+            <pc:docMk/>
+            <pc:sldMk cId="180226005" sldId="258"/>
+            <ac:spMk id="33" creationId="{3FCFB1DE-0B7E-48CC-BA90-B2AB0889F9D6}"/>
+          </ac:spMkLst>
+        </pc:spChg>
+        <pc:spChg chg="add">
+          <ac:chgData name="Atef Mrad" userId="S::bwb.a.mrad@fondespierre.com::4488c457-ef99-4230-b0ca-d6b8f1ad5a27" providerId="AD" clId="Web-{5E9A9961-44C6-4693-80A4-C8D1F14ED8A6}" dt="2024-01-15T19:26:55.993" v="0"/>
+          <ac:spMkLst>
+            <pc:docMk/>
+            <pc:sldMk cId="180226005" sldId="258"/>
+            <ac:spMk id="38" creationId="{6B5E2835-4E47-45B3-9CFE-732FF7B05472}"/>
+          </ac:spMkLst>
+        </pc:spChg>
+        <pc:spChg chg="add">
+          <ac:chgData name="Atef Mrad" userId="S::bwb.a.mrad@fondespierre.com::4488c457-ef99-4230-b0ca-d6b8f1ad5a27" providerId="AD" clId="Web-{5E9A9961-44C6-4693-80A4-C8D1F14ED8A6}" dt="2024-01-15T19:26:55.993" v="0"/>
+          <ac:spMkLst>
+            <pc:docMk/>
+            <pc:sldMk cId="180226005" sldId="258"/>
+            <ac:spMk id="40" creationId="{5B45AD5D-AA52-4F7B-9362-576A39AD9E09}"/>
+          </ac:spMkLst>
+        </pc:spChg>
+        <pc:spChg chg="add">
+          <ac:chgData name="Atef Mrad" userId="S::bwb.a.mrad@fondespierre.com::4488c457-ef99-4230-b0ca-d6b8f1ad5a27" providerId="AD" clId="Web-{5E9A9961-44C6-4693-80A4-C8D1F14ED8A6}" dt="2024-01-15T19:26:55.993" v="0"/>
+          <ac:spMkLst>
+            <pc:docMk/>
+            <pc:sldMk cId="180226005" sldId="258"/>
+            <ac:spMk id="42" creationId="{AEDD7960-4866-4399-BEF6-DD1431AB4E34}"/>
+          </ac:spMkLst>
+        </pc:spChg>
+        <pc:spChg chg="add">
+          <ac:chgData name="Atef Mrad" userId="S::bwb.a.mrad@fondespierre.com::4488c457-ef99-4230-b0ca-d6b8f1ad5a27" providerId="AD" clId="Web-{5E9A9961-44C6-4693-80A4-C8D1F14ED8A6}" dt="2024-01-15T19:26:55.993" v="0"/>
+          <ac:spMkLst>
+            <pc:docMk/>
+            <pc:sldMk cId="180226005" sldId="258"/>
+            <ac:spMk id="44" creationId="{55D4142C-5077-457F-A6AD-3FECFDB39685}"/>
+          </ac:spMkLst>
+        </pc:spChg>
+        <pc:spChg chg="add">
+          <ac:chgData name="Atef Mrad" userId="S::bwb.a.mrad@fondespierre.com::4488c457-ef99-4230-b0ca-d6b8f1ad5a27" providerId="AD" clId="Web-{5E9A9961-44C6-4693-80A4-C8D1F14ED8A6}" dt="2024-01-15T19:26:55.993" v="0"/>
+          <ac:spMkLst>
+            <pc:docMk/>
+            <pc:sldMk cId="180226005" sldId="258"/>
+            <ac:spMk id="46" creationId="{7A5F0580-5EE9-419F-96EE-B6529EF6E7D0}"/>
+          </ac:spMkLst>
+        </pc:spChg>
+        <pc:picChg chg="mod ord">
+          <ac:chgData name="Atef Mrad" userId="S::bwb.a.mrad@fondespierre.com::4488c457-ef99-4230-b0ca-d6b8f1ad5a27" providerId="AD" clId="Web-{5E9A9961-44C6-4693-80A4-C8D1F14ED8A6}" dt="2024-01-15T19:26:55.993" v="0"/>
+          <ac:picMkLst>
+            <pc:docMk/>
+            <pc:sldMk cId="180226005" sldId="258"/>
+            <ac:picMk id="2" creationId="{C44FBADD-87A3-79D7-9012-1CB269FC5652}"/>
+          </ac:picMkLst>
+        </pc:picChg>
+      </pc:sldChg>
+      <pc:sldChg chg="addSp delSp modSp modNotes">
+        <pc:chgData name="Atef Mrad" userId="S::bwb.a.mrad@fondespierre.com::4488c457-ef99-4230-b0ca-d6b8f1ad5a27" providerId="AD" clId="Web-{5E9A9961-44C6-4693-80A4-C8D1F14ED8A6}" dt="2024-01-15T20:29:13.217" v="535" actId="20577"/>
+        <pc:sldMkLst>
+          <pc:docMk/>
+          <pc:sldMk cId="1574640382" sldId="260"/>
+        </pc:sldMkLst>
+        <pc:spChg chg="mod">
+          <ac:chgData name="Atef Mrad" userId="S::bwb.a.mrad@fondespierre.com::4488c457-ef99-4230-b0ca-d6b8f1ad5a27" providerId="AD" clId="Web-{5E9A9961-44C6-4693-80A4-C8D1F14ED8A6}" dt="2024-01-15T19:30:37.798" v="37"/>
+          <ac:spMkLst>
+            <pc:docMk/>
+            <pc:sldMk cId="1574640382" sldId="260"/>
+            <ac:spMk id="4" creationId="{3029BEB2-8B7C-C613-C587-953DAE3D5BCD}"/>
+          </ac:spMkLst>
+        </pc:spChg>
+        <pc:spChg chg="mod">
+          <ac:chgData name="Atef Mrad" userId="S::bwb.a.mrad@fondespierre.com::4488c457-ef99-4230-b0ca-d6b8f1ad5a27" providerId="AD" clId="Web-{5E9A9961-44C6-4693-80A4-C8D1F14ED8A6}" dt="2024-01-15T20:29:13.217" v="535" actId="20577"/>
+          <ac:spMkLst>
+            <pc:docMk/>
+            <pc:sldMk cId="1574640382" sldId="260"/>
+            <ac:spMk id="8" creationId="{96BD530C-2AFB-374C-D58A-78DB95EB526B}"/>
+          </ac:spMkLst>
+        </pc:spChg>
+        <pc:spChg chg="del">
+          <ac:chgData name="Atef Mrad" userId="S::bwb.a.mrad@fondespierre.com::4488c457-ef99-4230-b0ca-d6b8f1ad5a27" providerId="AD" clId="Web-{5E9A9961-44C6-4693-80A4-C8D1F14ED8A6}" dt="2024-01-15T19:30:37.798" v="37"/>
+          <ac:spMkLst>
+            <pc:docMk/>
+            <pc:sldMk cId="1574640382" sldId="260"/>
+            <ac:spMk id="13" creationId="{327D73B4-9F5C-4A64-A179-51B9500CB8B5}"/>
+          </ac:spMkLst>
+        </pc:spChg>
+        <pc:spChg chg="del">
+          <ac:chgData name="Atef Mrad" userId="S::bwb.a.mrad@fondespierre.com::4488c457-ef99-4230-b0ca-d6b8f1ad5a27" providerId="AD" clId="Web-{5E9A9961-44C6-4693-80A4-C8D1F14ED8A6}" dt="2024-01-15T19:30:37.798" v="37"/>
+          <ac:spMkLst>
+            <pc:docMk/>
+            <pc:sldMk cId="1574640382" sldId="260"/>
+            <ac:spMk id="15" creationId="{85D33C90-E0E9-4BCC-847B-53431DF7C73A}"/>
+          </ac:spMkLst>
+        </pc:spChg>
+        <pc:spChg chg="del">
+          <ac:chgData name="Atef Mrad" userId="S::bwb.a.mrad@fondespierre.com::4488c457-ef99-4230-b0ca-d6b8f1ad5a27" providerId="AD" clId="Web-{5E9A9961-44C6-4693-80A4-C8D1F14ED8A6}" dt="2024-01-15T19:30:37.798" v="37"/>
+          <ac:spMkLst>
+            <pc:docMk/>
+            <pc:sldMk cId="1574640382" sldId="260"/>
+            <ac:spMk id="17" creationId="{0743BE1B-E693-47F5-A9BA-46D13E0C9751}"/>
+          </ac:spMkLst>
+        </pc:spChg>
+        <pc:spChg chg="del">
+          <ac:chgData name="Atef Mrad" userId="S::bwb.a.mrad@fondespierre.com::4488c457-ef99-4230-b0ca-d6b8f1ad5a27" providerId="AD" clId="Web-{5E9A9961-44C6-4693-80A4-C8D1F14ED8A6}" dt="2024-01-15T19:30:37.798" v="37"/>
+          <ac:spMkLst>
+            <pc:docMk/>
+            <pc:sldMk cId="1574640382" sldId="260"/>
+            <ac:spMk id="23" creationId="{1453BF6C-B012-48B7-B4E8-6D7AC7C27D02}"/>
+          </ac:spMkLst>
+        </pc:spChg>
+        <pc:spChg chg="del">
+          <ac:chgData name="Atef Mrad" userId="S::bwb.a.mrad@fondespierre.com::4488c457-ef99-4230-b0ca-d6b8f1ad5a27" providerId="AD" clId="Web-{5E9A9961-44C6-4693-80A4-C8D1F14ED8A6}" dt="2024-01-15T19:30:37.798" v="37"/>
+          <ac:spMkLst>
+            <pc:docMk/>
+            <pc:sldMk cId="1574640382" sldId="260"/>
+            <ac:spMk id="25" creationId="{D0F14822-B1F1-4730-A131-C3416A790B0D}"/>
+          </ac:spMkLst>
+        </pc:spChg>
+        <pc:spChg chg="add">
+          <ac:chgData name="Atef Mrad" userId="S::bwb.a.mrad@fondespierre.com::4488c457-ef99-4230-b0ca-d6b8f1ad5a27" providerId="AD" clId="Web-{5E9A9961-44C6-4693-80A4-C8D1F14ED8A6}" dt="2024-01-15T19:30:37.798" v="37"/>
+          <ac:spMkLst>
+            <pc:docMk/>
+            <pc:sldMk cId="1574640382" sldId="260"/>
+            <ac:spMk id="32" creationId="{F13C74B1-5B17-4795-BED0-7140497B445A}"/>
+          </ac:spMkLst>
+        </pc:spChg>
+        <pc:spChg chg="add">
+          <ac:chgData name="Atef Mrad" userId="S::bwb.a.mrad@fondespierre.com::4488c457-ef99-4230-b0ca-d6b8f1ad5a27" providerId="AD" clId="Web-{5E9A9961-44C6-4693-80A4-C8D1F14ED8A6}" dt="2024-01-15T19:30:37.798" v="37"/>
+          <ac:spMkLst>
+            <pc:docMk/>
+            <pc:sldMk cId="1574640382" sldId="260"/>
+            <ac:spMk id="34" creationId="{D4974D33-8DC5-464E-8C6D-BE58F0669C17}"/>
+          </ac:spMkLst>
+        </pc:spChg>
+        <pc:grpChg chg="del">
+          <ac:chgData name="Atef Mrad" userId="S::bwb.a.mrad@fondespierre.com::4488c457-ef99-4230-b0ca-d6b8f1ad5a27" providerId="AD" clId="Web-{5E9A9961-44C6-4693-80A4-C8D1F14ED8A6}" dt="2024-01-15T19:30:37.798" v="37"/>
+          <ac:grpSpMkLst>
+            <pc:docMk/>
+            <pc:sldMk cId="1574640382" sldId="260"/>
+            <ac:grpSpMk id="19" creationId="{CF5BD426-789C-4E69-83C0-245370E37264}"/>
+          </ac:grpSpMkLst>
+        </pc:grpChg>
+        <pc:picChg chg="del">
+          <ac:chgData name="Atef Mrad" userId="S::bwb.a.mrad@fondespierre.com::4488c457-ef99-4230-b0ca-d6b8f1ad5a27" providerId="AD" clId="Web-{5E9A9961-44C6-4693-80A4-C8D1F14ED8A6}" dt="2024-01-15T19:30:19.469" v="34"/>
+          <ac:picMkLst>
+            <pc:docMk/>
+            <pc:sldMk cId="1574640382" sldId="260"/>
+            <ac:picMk id="2" creationId="{31D0BB37-4694-0A53-CD1A-1B4DE8538AE8}"/>
+          </ac:picMkLst>
+        </pc:picChg>
+        <pc:picChg chg="del">
+          <ac:chgData name="Atef Mrad" userId="S::bwb.a.mrad@fondespierre.com::4488c457-ef99-4230-b0ca-d6b8f1ad5a27" providerId="AD" clId="Web-{5E9A9961-44C6-4693-80A4-C8D1F14ED8A6}" dt="2024-01-15T19:30:17.532" v="33"/>
+          <ac:picMkLst>
+            <pc:docMk/>
+            <pc:sldMk cId="1574640382" sldId="260"/>
+            <ac:picMk id="3" creationId="{482E7E35-D90F-5ABB-07DA-DE23957B086F}"/>
+          </ac:picMkLst>
+        </pc:picChg>
+        <pc:picChg chg="del">
+          <ac:chgData name="Atef Mrad" userId="S::bwb.a.mrad@fondespierre.com::4488c457-ef99-4230-b0ca-d6b8f1ad5a27" providerId="AD" clId="Web-{5E9A9961-44C6-4693-80A4-C8D1F14ED8A6}" dt="2024-01-15T19:30:15.391" v="32"/>
+          <ac:picMkLst>
+            <pc:docMk/>
+            <pc:sldMk cId="1574640382" sldId="260"/>
+            <ac:picMk id="5" creationId="{55861065-D6A3-A98D-940F-98E4FD8865AD}"/>
+          </ac:picMkLst>
+        </pc:picChg>
+        <pc:picChg chg="add mod">
+          <ac:chgData name="Atef Mrad" userId="S::bwb.a.mrad@fondespierre.com::4488c457-ef99-4230-b0ca-d6b8f1ad5a27" providerId="AD" clId="Web-{5E9A9961-44C6-4693-80A4-C8D1F14ED8A6}" dt="2024-01-15T19:30:37.798" v="37"/>
+          <ac:picMkLst>
+            <pc:docMk/>
+            <pc:sldMk cId="1574640382" sldId="260"/>
+            <ac:picMk id="6" creationId="{49850487-9AF9-067F-DCD1-37A9EB20F4AE}"/>
+          </ac:picMkLst>
+        </pc:picChg>
+        <pc:cxnChg chg="del">
+          <ac:chgData name="Atef Mrad" userId="S::bwb.a.mrad@fondespierre.com::4488c457-ef99-4230-b0ca-d6b8f1ad5a27" providerId="AD" clId="Web-{5E9A9961-44C6-4693-80A4-C8D1F14ED8A6}" dt="2024-01-15T19:30:37.798" v="37"/>
+          <ac:cxnSpMkLst>
+            <pc:docMk/>
+            <pc:sldMk cId="1574640382" sldId="260"/>
+            <ac:cxnSpMk id="27" creationId="{C49DA8F6-BCC1-4447-B54C-57856834B94B}"/>
+          </ac:cxnSpMkLst>
+        </pc:cxnChg>
+      </pc:sldChg>
+      <pc:sldChg chg="modSp modNotes">
+        <pc:chgData name="Atef Mrad" userId="S::bwb.a.mrad@fondespierre.com::4488c457-ef99-4230-b0ca-d6b8f1ad5a27" providerId="AD" clId="Web-{5E9A9961-44C6-4693-80A4-C8D1F14ED8A6}" dt="2024-01-15T20:10:32.033" v="461"/>
+        <pc:sldMkLst>
+          <pc:docMk/>
+          <pc:sldMk cId="406620325" sldId="262"/>
+        </pc:sldMkLst>
+        <pc:spChg chg="mod">
+          <ac:chgData name="Atef Mrad" userId="S::bwb.a.mrad@fondespierre.com::4488c457-ef99-4230-b0ca-d6b8f1ad5a27" providerId="AD" clId="Web-{5E9A9961-44C6-4693-80A4-C8D1F14ED8A6}" dt="2024-01-15T20:09:36.827" v="459" actId="20577"/>
+          <ac:spMkLst>
+            <pc:docMk/>
+            <pc:sldMk cId="406620325" sldId="262"/>
+            <ac:spMk id="7" creationId="{56F3D5DE-B93A-556E-58FA-A3D016079468}"/>
+          </ac:spMkLst>
+        </pc:spChg>
+      </pc:sldChg>
+      <pc:sldChg chg="addSp delSp modSp modNotes">
+        <pc:chgData name="Atef Mrad" userId="S::bwb.a.mrad@fondespierre.com::4488c457-ef99-4230-b0ca-d6b8f1ad5a27" providerId="AD" clId="Web-{5E9A9961-44C6-4693-80A4-C8D1F14ED8A6}" dt="2024-01-15T20:24:45.769" v="523" actId="20577"/>
+        <pc:sldMkLst>
+          <pc:docMk/>
+          <pc:sldMk cId="2191258283" sldId="273"/>
+        </pc:sldMkLst>
+        <pc:spChg chg="mod">
+          <ac:chgData name="Atef Mrad" userId="S::bwb.a.mrad@fondespierre.com::4488c457-ef99-4230-b0ca-d6b8f1ad5a27" providerId="AD" clId="Web-{5E9A9961-44C6-4693-80A4-C8D1F14ED8A6}" dt="2024-01-15T20:02:19.998" v="354"/>
+          <ac:spMkLst>
+            <pc:docMk/>
+            <pc:sldMk cId="2191258283" sldId="273"/>
+            <ac:spMk id="4" creationId="{5A9127B8-465A-A5ED-9627-395F4258B19C}"/>
+          </ac:spMkLst>
+        </pc:spChg>
+        <pc:spChg chg="add del mod">
+          <ac:chgData name="Atef Mrad" userId="S::bwb.a.mrad@fondespierre.com::4488c457-ef99-4230-b0ca-d6b8f1ad5a27" providerId="AD" clId="Web-{5E9A9961-44C6-4693-80A4-C8D1F14ED8A6}" dt="2024-01-15T20:24:45.769" v="523" actId="20577"/>
+          <ac:spMkLst>
+            <pc:docMk/>
+            <pc:sldMk cId="2191258283" sldId="273"/>
+            <ac:spMk id="7" creationId="{982A96F1-D04C-17E5-3AE4-7914E1279374}"/>
+          </ac:spMkLst>
+        </pc:spChg>
+        <pc:spChg chg="add del mod">
+          <ac:chgData name="Atef Mrad" userId="S::bwb.a.mrad@fondespierre.com::4488c457-ef99-4230-b0ca-d6b8f1ad5a27" providerId="AD" clId="Web-{5E9A9961-44C6-4693-80A4-C8D1F14ED8A6}" dt="2024-01-15T19:56:34.609" v="240"/>
+          <ac:spMkLst>
+            <pc:docMk/>
+            <pc:sldMk cId="2191258283" sldId="273"/>
+            <ac:spMk id="8" creationId="{8773CCD0-14EE-275F-510A-64D063EE9359}"/>
+          </ac:spMkLst>
+        </pc:spChg>
+        <pc:spChg chg="add del">
+          <ac:chgData name="Atef Mrad" userId="S::bwb.a.mrad@fondespierre.com::4488c457-ef99-4230-b0ca-d6b8f1ad5a27" providerId="AD" clId="Web-{5E9A9961-44C6-4693-80A4-C8D1F14ED8A6}" dt="2024-01-15T19:47:02.399" v="149"/>
+          <ac:spMkLst>
+            <pc:docMk/>
+            <pc:sldMk cId="2191258283" sldId="273"/>
+            <ac:spMk id="29" creationId="{F58FB4AA-7058-4218-AE65-3ACD24A41226}"/>
+          </ac:spMkLst>
+        </pc:spChg>
+        <pc:spChg chg="add del">
+          <ac:chgData name="Atef Mrad" userId="S::bwb.a.mrad@fondespierre.com::4488c457-ef99-4230-b0ca-d6b8f1ad5a27" providerId="AD" clId="Web-{5E9A9961-44C6-4693-80A4-C8D1F14ED8A6}" dt="2024-01-15T19:47:02.399" v="149"/>
+          <ac:spMkLst>
+            <pc:docMk/>
+            <pc:sldMk cId="2191258283" sldId="273"/>
+            <ac:spMk id="31" creationId="{F35BC0E3-6FE4-4491-BA19-C0126066A51B}"/>
+          </ac:spMkLst>
+        </pc:spChg>
+        <pc:spChg chg="add del">
+          <ac:chgData name="Atef Mrad" userId="S::bwb.a.mrad@fondespierre.com::4488c457-ef99-4230-b0ca-d6b8f1ad5a27" providerId="AD" clId="Web-{5E9A9961-44C6-4693-80A4-C8D1F14ED8A6}" dt="2024-01-15T19:47:02.399" v="149"/>
+          <ac:spMkLst>
+            <pc:docMk/>
+            <pc:sldMk cId="2191258283" sldId="273"/>
+            <ac:spMk id="33" creationId="{DB11BD18-218F-49C7-BE16-82AEA08B237B}"/>
+          </ac:spMkLst>
+        </pc:spChg>
+        <pc:spChg chg="add del">
+          <ac:chgData name="Atef Mrad" userId="S::bwb.a.mrad@fondespierre.com::4488c457-ef99-4230-b0ca-d6b8f1ad5a27" providerId="AD" clId="Web-{5E9A9961-44C6-4693-80A4-C8D1F14ED8A6}" dt="2024-01-15T19:47:02.399" v="149"/>
+          <ac:spMkLst>
+            <pc:docMk/>
+            <pc:sldMk cId="2191258283" sldId="273"/>
+            <ac:spMk id="37" creationId="{EA996627-3E00-4A50-8640-F4F7D38C556C}"/>
+          </ac:spMkLst>
+        </pc:spChg>
+        <pc:spChg chg="add del">
+          <ac:chgData name="Atef Mrad" userId="S::bwb.a.mrad@fondespierre.com::4488c457-ef99-4230-b0ca-d6b8f1ad5a27" providerId="AD" clId="Web-{5E9A9961-44C6-4693-80A4-C8D1F14ED8A6}" dt="2024-01-15T19:47:02.399" v="149"/>
+          <ac:spMkLst>
+            <pc:docMk/>
+            <pc:sldMk cId="2191258283" sldId="273"/>
+            <ac:spMk id="39" creationId="{A619555D-3337-4F1A-9AFF-1DA3B921C57C}"/>
+          </ac:spMkLst>
+        </pc:spChg>
+        <pc:spChg chg="add del">
+          <ac:chgData name="Atef Mrad" userId="S::bwb.a.mrad@fondespierre.com::4488c457-ef99-4230-b0ca-d6b8f1ad5a27" providerId="AD" clId="Web-{5E9A9961-44C6-4693-80A4-C8D1F14ED8A6}" dt="2024-01-15T19:47:02.399" v="149"/>
+          <ac:spMkLst>
+            <pc:docMk/>
+            <pc:sldMk cId="2191258283" sldId="273"/>
+            <ac:spMk id="41" creationId="{CF5E7AE0-415D-4236-B5E6-F2FC68DB94EE}"/>
+          </ac:spMkLst>
+        </pc:spChg>
+        <pc:spChg chg="add del">
+          <ac:chgData name="Atef Mrad" userId="S::bwb.a.mrad@fondespierre.com::4488c457-ef99-4230-b0ca-d6b8f1ad5a27" providerId="AD" clId="Web-{5E9A9961-44C6-4693-80A4-C8D1F14ED8A6}" dt="2024-01-15T19:47:02.383" v="148"/>
+          <ac:spMkLst>
+            <pc:docMk/>
+            <pc:sldMk cId="2191258283" sldId="273"/>
+            <ac:spMk id="46" creationId="{B3684CCF-CEBB-4D8E-A366-95E43D4C790B}"/>
+          </ac:spMkLst>
+        </pc:spChg>
+        <pc:spChg chg="add del">
+          <ac:chgData name="Atef Mrad" userId="S::bwb.a.mrad@fondespierre.com::4488c457-ef99-4230-b0ca-d6b8f1ad5a27" providerId="AD" clId="Web-{5E9A9961-44C6-4693-80A4-C8D1F14ED8A6}" dt="2024-01-15T19:47:02.383" v="148"/>
+          <ac:spMkLst>
+            <pc:docMk/>
+            <pc:sldMk cId="2191258283" sldId="273"/>
+            <ac:spMk id="48" creationId="{70BEB1E7-2F88-40BC-B73D-42E5B6F80BFC}"/>
+          </ac:spMkLst>
+        </pc:spChg>
+        <pc:spChg chg="add del">
+          <ac:chgData name="Atef Mrad" userId="S::bwb.a.mrad@fondespierre.com::4488c457-ef99-4230-b0ca-d6b8f1ad5a27" providerId="AD" clId="Web-{5E9A9961-44C6-4693-80A4-C8D1F14ED8A6}" dt="2024-01-15T20:02:19.998" v="354"/>
+          <ac:spMkLst>
+            <pc:docMk/>
+            <pc:sldMk cId="2191258283" sldId="273"/>
+            <ac:spMk id="50" creationId="{AD96FDFD-4E42-4A06-B8B5-768A1DB9C2A9}"/>
+          </ac:spMkLst>
+        </pc:spChg>
+        <pc:spChg chg="add">
+          <ac:chgData name="Atef Mrad" userId="S::bwb.a.mrad@fondespierre.com::4488c457-ef99-4230-b0ca-d6b8f1ad5a27" providerId="AD" clId="Web-{5E9A9961-44C6-4693-80A4-C8D1F14ED8A6}" dt="2024-01-15T20:02:19.998" v="354"/>
+          <ac:spMkLst>
+            <pc:docMk/>
+            <pc:sldMk cId="2191258283" sldId="273"/>
+            <ac:spMk id="55" creationId="{394842B0-684D-44CC-B4BC-D13331CFD290}"/>
+          </ac:spMkLst>
+        </pc:spChg>
+        <pc:spChg chg="add">
+          <ac:chgData name="Atef Mrad" userId="S::bwb.a.mrad@fondespierre.com::4488c457-ef99-4230-b0ca-d6b8f1ad5a27" providerId="AD" clId="Web-{5E9A9961-44C6-4693-80A4-C8D1F14ED8A6}" dt="2024-01-15T20:02:19.998" v="354"/>
+          <ac:spMkLst>
+            <pc:docMk/>
+            <pc:sldMk cId="2191258283" sldId="273"/>
+            <ac:spMk id="57" creationId="{4C2A3DC3-F495-4B99-9FF3-3FB30D63235E}"/>
+          </ac:spMkLst>
+        </pc:spChg>
+        <pc:picChg chg="del mod ord">
+          <ac:chgData name="Atef Mrad" userId="S::bwb.a.mrad@fondespierre.com::4488c457-ef99-4230-b0ca-d6b8f1ad5a27" providerId="AD" clId="Web-{5E9A9961-44C6-4693-80A4-C8D1F14ED8A6}" dt="2024-01-15T19:56:57.578" v="247"/>
+          <ac:picMkLst>
+            <pc:docMk/>
+            <pc:sldMk cId="2191258283" sldId="273"/>
+            <ac:picMk id="2" creationId="{DA678507-F958-669D-584C-AC478D1639CC}"/>
+          </ac:picMkLst>
+        </pc:picChg>
+        <pc:picChg chg="del mod ord">
+          <ac:chgData name="Atef Mrad" userId="S::bwb.a.mrad@fondespierre.com::4488c457-ef99-4230-b0ca-d6b8f1ad5a27" providerId="AD" clId="Web-{5E9A9961-44C6-4693-80A4-C8D1F14ED8A6}" dt="2024-01-15T19:56:56.125" v="246"/>
+          <ac:picMkLst>
+            <pc:docMk/>
+            <pc:sldMk cId="2191258283" sldId="273"/>
+            <ac:picMk id="3" creationId="{DE8488E2-0F7D-CE4C-EF8B-5BA484D9BCF6}"/>
+          </ac:picMkLst>
+        </pc:picChg>
+        <pc:picChg chg="del mod ord">
+          <ac:chgData name="Atef Mrad" userId="S::bwb.a.mrad@fondespierre.com::4488c457-ef99-4230-b0ca-d6b8f1ad5a27" providerId="AD" clId="Web-{5E9A9961-44C6-4693-80A4-C8D1F14ED8A6}" dt="2024-01-15T19:56:54.766" v="245"/>
+          <ac:picMkLst>
+            <pc:docMk/>
+            <pc:sldMk cId="2191258283" sldId="273"/>
+            <ac:picMk id="5" creationId="{541744BF-B421-EB02-F6CA-8E2F270DB08B}"/>
+          </ac:picMkLst>
+        </pc:picChg>
+        <pc:picChg chg="add mod">
+          <ac:chgData name="Atef Mrad" userId="S::bwb.a.mrad@fondespierre.com::4488c457-ef99-4230-b0ca-d6b8f1ad5a27" providerId="AD" clId="Web-{5E9A9961-44C6-4693-80A4-C8D1F14ED8A6}" dt="2024-01-15T20:02:39.217" v="357" actId="14100"/>
+          <ac:picMkLst>
+            <pc:docMk/>
+            <pc:sldMk cId="2191258283" sldId="273"/>
+            <ac:picMk id="9" creationId="{0691D244-F0D1-BCE4-C1C3-329B39DB8B68}"/>
+          </ac:picMkLst>
+        </pc:picChg>
+        <pc:picChg chg="add mod">
+          <ac:chgData name="Atef Mrad" userId="S::bwb.a.mrad@fondespierre.com::4488c457-ef99-4230-b0ca-d6b8f1ad5a27" providerId="AD" clId="Web-{5E9A9961-44C6-4693-80A4-C8D1F14ED8A6}" dt="2024-01-15T20:02:42.483" v="358" actId="14100"/>
+          <ac:picMkLst>
+            <pc:docMk/>
+            <pc:sldMk cId="2191258283" sldId="273"/>
+            <ac:picMk id="10" creationId="{C4910B2A-4490-A145-E8A0-6EE2C03D2E08}"/>
+          </ac:picMkLst>
+        </pc:picChg>
+        <pc:cxnChg chg="add del">
+          <ac:chgData name="Atef Mrad" userId="S::bwb.a.mrad@fondespierre.com::4488c457-ef99-4230-b0ca-d6b8f1ad5a27" providerId="AD" clId="Web-{5E9A9961-44C6-4693-80A4-C8D1F14ED8A6}" dt="2024-01-15T19:47:02.399" v="149"/>
+          <ac:cxnSpMkLst>
+            <pc:docMk/>
+            <pc:sldMk cId="2191258283" sldId="273"/>
+            <ac:cxnSpMk id="35" creationId="{A054EDF5-7644-4A95-AB88-057FAB414FEE}"/>
+          </ac:cxnSpMkLst>
+        </pc:cxnChg>
+      </pc:sldChg>
+      <pc:sldChg chg="addSp modSp new mod setBg addCm">
+        <pc:chgData name="Atef Mrad" userId="S::bwb.a.mrad@fondespierre.com::4488c457-ef99-4230-b0ca-d6b8f1ad5a27" providerId="AD" clId="Web-{5E9A9961-44C6-4693-80A4-C8D1F14ED8A6}" dt="2024-01-15T20:03:41.360" v="360"/>
+        <pc:sldMkLst>
+          <pc:docMk/>
+          <pc:sldMk cId="2191452943" sldId="274"/>
+        </pc:sldMkLst>
+        <pc:spChg chg="mod">
+          <ac:chgData name="Atef Mrad" userId="S::bwb.a.mrad@fondespierre.com::4488c457-ef99-4230-b0ca-d6b8f1ad5a27" providerId="AD" clId="Web-{5E9A9961-44C6-4693-80A4-C8D1F14ED8A6}" dt="2024-01-15T19:46:23.444" v="146" actId="20577"/>
+          <ac:spMkLst>
+            <pc:docMk/>
+            <pc:sldMk cId="2191452943" sldId="274"/>
+            <ac:spMk id="2" creationId="{E1ABFEBE-89B1-8032-852B-762AD86B607A}"/>
+          </ac:spMkLst>
+        </pc:spChg>
+        <pc:spChg chg="mod">
+          <ac:chgData name="Atef Mrad" userId="S::bwb.a.mrad@fondespierre.com::4488c457-ef99-4230-b0ca-d6b8f1ad5a27" providerId="AD" clId="Web-{5E9A9961-44C6-4693-80A4-C8D1F14ED8A6}" dt="2024-01-15T19:45:55.506" v="142"/>
+          <ac:spMkLst>
+            <pc:docMk/>
+            <pc:sldMk cId="2191452943" sldId="274"/>
+            <ac:spMk id="3" creationId="{3CEA4403-45F8-D8CD-D438-D85FDE05C5A2}"/>
+          </ac:spMkLst>
+        </pc:spChg>
+        <pc:spChg chg="add">
+          <ac:chgData name="Atef Mrad" userId="S::bwb.a.mrad@fondespierre.com::4488c457-ef99-4230-b0ca-d6b8f1ad5a27" providerId="AD" clId="Web-{5E9A9961-44C6-4693-80A4-C8D1F14ED8A6}" dt="2024-01-15T19:45:55.506" v="142"/>
+          <ac:spMkLst>
+            <pc:docMk/>
+            <pc:sldMk cId="2191452943" sldId="274"/>
+            <ac:spMk id="9" creationId="{F13C74B1-5B17-4795-BED0-7140497B445A}"/>
+          </ac:spMkLst>
+        </pc:spChg>
+        <pc:spChg chg="add">
+          <ac:chgData name="Atef Mrad" userId="S::bwb.a.mrad@fondespierre.com::4488c457-ef99-4230-b0ca-d6b8f1ad5a27" providerId="AD" clId="Web-{5E9A9961-44C6-4693-80A4-C8D1F14ED8A6}" dt="2024-01-15T19:45:55.506" v="142"/>
+          <ac:spMkLst>
+            <pc:docMk/>
+            <pc:sldMk cId="2191452943" sldId="274"/>
+            <ac:spMk id="11" creationId="{D4974D33-8DC5-464E-8C6D-BE58F0669C17}"/>
+          </ac:spMkLst>
+        </pc:spChg>
+        <pc:picChg chg="add mod">
+          <ac:chgData name="Atef Mrad" userId="S::bwb.a.mrad@fondespierre.com::4488c457-ef99-4230-b0ca-d6b8f1ad5a27" providerId="AD" clId="Web-{5E9A9961-44C6-4693-80A4-C8D1F14ED8A6}" dt="2024-01-15T19:45:55.506" v="142"/>
+          <ac:picMkLst>
+            <pc:docMk/>
+            <pc:sldMk cId="2191452943" sldId="274"/>
+            <ac:picMk id="4" creationId="{D1CF49A7-6669-7447-A39F-A8A8061DA4C8}"/>
+          </ac:picMkLst>
+        </pc:picChg>
+        <pc:extLst>
+          <p:ext xmlns:p="http://schemas.openxmlformats.org/presentationml/2006/main" uri="{D6D511B9-2390-475A-947B-AFAB55BFBCF1}">
+            <pc226:cmChg xmlns:pc226="http://schemas.microsoft.com/office/powerpoint/2022/06/main/command" chg="add">
+              <pc226:chgData name="Atef Mrad" userId="S::bwb.a.mrad@fondespierre.com::4488c457-ef99-4230-b0ca-d6b8f1ad5a27" providerId="AD" clId="Web-{5E9A9961-44C6-4693-80A4-C8D1F14ED8A6}" dt="2024-01-15T20:03:41.360" v="360"/>
+              <pc2:cmMkLst xmlns:pc2="http://schemas.microsoft.com/office/powerpoint/2019/9/main/command">
+                <pc:docMk/>
+                <pc:sldMk cId="2191452943" sldId="274"/>
+                <pc2:cmMk id="{748825A9-048C-4F05-A29A-AEEB0559E3AA}"/>
+              </pc2:cmMkLst>
+            </pc226:cmChg>
+          </p:ext>
+        </pc:extLst>
+      </pc:sldChg>
+      <pc:sldChg chg="addSp modSp new mod ord setBg">
+        <pc:chgData name="Atef Mrad" userId="S::bwb.a.mrad@fondespierre.com::4488c457-ef99-4230-b0ca-d6b8f1ad5a27" providerId="AD" clId="Web-{5E9A9961-44C6-4693-80A4-C8D1F14ED8A6}" dt="2024-01-15T20:30:38.783" v="558" actId="20577"/>
+        <pc:sldMkLst>
+          <pc:docMk/>
+          <pc:sldMk cId="3921660627" sldId="275"/>
+        </pc:sldMkLst>
+        <pc:spChg chg="mod">
+          <ac:chgData name="Atef Mrad" userId="S::bwb.a.mrad@fondespierre.com::4488c457-ef99-4230-b0ca-d6b8f1ad5a27" providerId="AD" clId="Web-{5E9A9961-44C6-4693-80A4-C8D1F14ED8A6}" dt="2024-01-15T20:30:38.783" v="558" actId="20577"/>
+          <ac:spMkLst>
+            <pc:docMk/>
+            <pc:sldMk cId="3921660627" sldId="275"/>
+            <ac:spMk id="2" creationId="{B8A5D022-49CD-F031-5CF4-E6BD0CDE50BF}"/>
+          </ac:spMkLst>
+        </pc:spChg>
+        <pc:spChg chg="mod">
+          <ac:chgData name="Atef Mrad" userId="S::bwb.a.mrad@fondespierre.com::4488c457-ef99-4230-b0ca-d6b8f1ad5a27" providerId="AD" clId="Web-{5E9A9961-44C6-4693-80A4-C8D1F14ED8A6}" dt="2024-01-15T19:53:45.852" v="220" actId="20577"/>
+          <ac:spMkLst>
+            <pc:docMk/>
+            <pc:sldMk cId="3921660627" sldId="275"/>
+            <ac:spMk id="3" creationId="{7B84777B-C837-DD2A-B516-875BC7CD4784}"/>
+          </ac:spMkLst>
+        </pc:spChg>
+        <pc:spChg chg="add">
+          <ac:chgData name="Atef Mrad" userId="S::bwb.a.mrad@fondespierre.com::4488c457-ef99-4230-b0ca-d6b8f1ad5a27" providerId="AD" clId="Web-{5E9A9961-44C6-4693-80A4-C8D1F14ED8A6}" dt="2024-01-15T19:53:27.039" v="219"/>
+          <ac:spMkLst>
+            <pc:docMk/>
+            <pc:sldMk cId="3921660627" sldId="275"/>
+            <ac:spMk id="9" creationId="{743AA782-23D1-4521-8CAD-47662984AA08}"/>
+          </ac:spMkLst>
+        </pc:spChg>
+        <pc:spChg chg="add">
+          <ac:chgData name="Atef Mrad" userId="S::bwb.a.mrad@fondespierre.com::4488c457-ef99-4230-b0ca-d6b8f1ad5a27" providerId="AD" clId="Web-{5E9A9961-44C6-4693-80A4-C8D1F14ED8A6}" dt="2024-01-15T19:53:27.039" v="219"/>
+          <ac:spMkLst>
+            <pc:docMk/>
+            <pc:sldMk cId="3921660627" sldId="275"/>
+            <ac:spMk id="11" creationId="{71877DBC-BB60-40F0-AC93-2ACDBAAE60CE}"/>
+          </ac:spMkLst>
+        </pc:spChg>
+        <pc:picChg chg="add mod">
+          <ac:chgData name="Atef Mrad" userId="S::bwb.a.mrad@fondespierre.com::4488c457-ef99-4230-b0ca-d6b8f1ad5a27" providerId="AD" clId="Web-{5E9A9961-44C6-4693-80A4-C8D1F14ED8A6}" dt="2024-01-15T19:53:27.039" v="219"/>
+          <ac:picMkLst>
+            <pc:docMk/>
+            <pc:sldMk cId="3921660627" sldId="275"/>
+            <ac:picMk id="4" creationId="{450FFC09-1AB2-F2B8-623A-DAC22C955732}"/>
+          </ac:picMkLst>
+        </pc:picChg>
+      </pc:sldChg>
+      <pc:sldChg chg="addSp modSp new mod setBg modNotes">
+        <pc:chgData name="Atef Mrad" userId="S::bwb.a.mrad@fondespierre.com::4488c457-ef99-4230-b0ca-d6b8f1ad5a27" providerId="AD" clId="Web-{5E9A9961-44C6-4693-80A4-C8D1F14ED8A6}" dt="2024-01-15T20:22:21.310" v="521" actId="20577"/>
+        <pc:sldMkLst>
+          <pc:docMk/>
+          <pc:sldMk cId="1303324382" sldId="276"/>
+        </pc:sldMkLst>
+        <pc:spChg chg="mod">
+          <ac:chgData name="Atef Mrad" userId="S::bwb.a.mrad@fondespierre.com::4488c457-ef99-4230-b0ca-d6b8f1ad5a27" providerId="AD" clId="Web-{5E9A9961-44C6-4693-80A4-C8D1F14ED8A6}" dt="2024-01-15T20:06:50.040" v="406"/>
+          <ac:spMkLst>
+            <pc:docMk/>
+            <pc:sldMk cId="1303324382" sldId="276"/>
+            <ac:spMk id="2" creationId="{7D58A86C-0BA0-14BB-3E81-B64FE792C4FD}"/>
+          </ac:spMkLst>
+        </pc:spChg>
+        <pc:spChg chg="mod">
+          <ac:chgData name="Atef Mrad" userId="S::bwb.a.mrad@fondespierre.com::4488c457-ef99-4230-b0ca-d6b8f1ad5a27" providerId="AD" clId="Web-{5E9A9961-44C6-4693-80A4-C8D1F14ED8A6}" dt="2024-01-15T20:22:21.310" v="521" actId="20577"/>
+          <ac:spMkLst>
+            <pc:docMk/>
+            <pc:sldMk cId="1303324382" sldId="276"/>
+            <ac:spMk id="3" creationId="{0FBA8A1B-7A93-B73D-F568-AF1A5EAA0393}"/>
+          </ac:spMkLst>
+        </pc:spChg>
+        <pc:spChg chg="add">
+          <ac:chgData name="Atef Mrad" userId="S::bwb.a.mrad@fondespierre.com::4488c457-ef99-4230-b0ca-d6b8f1ad5a27" providerId="AD" clId="Web-{5E9A9961-44C6-4693-80A4-C8D1F14ED8A6}" dt="2024-01-15T20:06:50.040" v="406"/>
+          <ac:spMkLst>
+            <pc:docMk/>
+            <pc:sldMk cId="1303324382" sldId="276"/>
+            <ac:spMk id="9" creationId="{F13C74B1-5B17-4795-BED0-7140497B445A}"/>
+          </ac:spMkLst>
+        </pc:spChg>
+        <pc:spChg chg="add">
+          <ac:chgData name="Atef Mrad" userId="S::bwb.a.mrad@fondespierre.com::4488c457-ef99-4230-b0ca-d6b8f1ad5a27" providerId="AD" clId="Web-{5E9A9961-44C6-4693-80A4-C8D1F14ED8A6}" dt="2024-01-15T20:06:50.040" v="406"/>
+          <ac:spMkLst>
+            <pc:docMk/>
+            <pc:sldMk cId="1303324382" sldId="276"/>
+            <ac:spMk id="11" creationId="{D4974D33-8DC5-464E-8C6D-BE58F0669C17}"/>
+          </ac:spMkLst>
+        </pc:spChg>
+        <pc:picChg chg="add mod">
+          <ac:chgData name="Atef Mrad" userId="S::bwb.a.mrad@fondespierre.com::4488c457-ef99-4230-b0ca-d6b8f1ad5a27" providerId="AD" clId="Web-{5E9A9961-44C6-4693-80A4-C8D1F14ED8A6}" dt="2024-01-15T20:06:50.040" v="406"/>
+          <ac:picMkLst>
+            <pc:docMk/>
+            <pc:sldMk cId="1303324382" sldId="276"/>
+            <ac:picMk id="4" creationId="{F440C707-FEEA-7DAC-C40A-A6D1EF9A8225}"/>
+          </ac:picMkLst>
+        </pc:picChg>
       </pc:sldChg>
     </pc:docChg>
   </pc:docChgLst>
@@ -1108,7 +1109,7 @@
   <pc:docChgLst>
     <pc:chgData name="Yann Verdier" userId="d572732d-2761-4823-8cfa-19108bdddf1f" providerId="ADAL" clId="{4BFF2F48-6638-484E-B9AC-4C7D5C1CFC2C}"/>
     <pc:docChg chg="undo redo custSel addSld delSld modSld sldOrd">
-      <pc:chgData name="Yann Verdier" userId="d572732d-2761-4823-8cfa-19108bdddf1f" providerId="ADAL" clId="{4BFF2F48-6638-484E-B9AC-4C7D5C1CFC2C}" dt="2024-01-15T20:59:15.500" v="1838" actId="1076"/>
+      <pc:chgData name="Yann Verdier" userId="d572732d-2761-4823-8cfa-19108bdddf1f" providerId="ADAL" clId="{4BFF2F48-6638-484E-B9AC-4C7D5C1CFC2C}" dt="2024-01-15T21:44:18.876" v="2472" actId="5793"/>
       <pc:docMkLst>
         <pc:docMk/>
       </pc:docMkLst>
@@ -1455,7 +1456,7 @@
         </pc:picChg>
       </pc:sldChg>
       <pc:sldChg chg="addSp delSp modSp add del mod setBg delDesignElem">
-        <pc:chgData name="Yann Verdier" userId="d572732d-2761-4823-8cfa-19108bdddf1f" providerId="ADAL" clId="{4BFF2F48-6638-484E-B9AC-4C7D5C1CFC2C}" dt="2024-01-11T11:02:12.197" v="1736" actId="26606"/>
+        <pc:chgData name="Yann Verdier" userId="d572732d-2761-4823-8cfa-19108bdddf1f" providerId="ADAL" clId="{4BFF2F48-6638-484E-B9AC-4C7D5C1CFC2C}" dt="2024-01-15T21:31:48.582" v="1903" actId="20577"/>
         <pc:sldMkLst>
           <pc:docMk/>
           <pc:sldMk cId="180226005" sldId="258"/>
@@ -1469,7 +1470,7 @@
           </ac:spMkLst>
         </pc:spChg>
         <pc:spChg chg="mod">
-          <ac:chgData name="Yann Verdier" userId="d572732d-2761-4823-8cfa-19108bdddf1f" providerId="ADAL" clId="{4BFF2F48-6638-484E-B9AC-4C7D5C1CFC2C}" dt="2024-01-11T11:02:12.197" v="1736" actId="26606"/>
+          <ac:chgData name="Yann Verdier" userId="d572732d-2761-4823-8cfa-19108bdddf1f" providerId="ADAL" clId="{4BFF2F48-6638-484E-B9AC-4C7D5C1CFC2C}" dt="2024-01-15T21:31:48.582" v="1903" actId="20577"/>
           <ac:spMkLst>
             <pc:docMk/>
             <pc:sldMk cId="180226005" sldId="258"/>
@@ -1574,7 +1575,7 @@
         </pc:picChg>
       </pc:sldChg>
       <pc:sldChg chg="addSp delSp modSp mod">
-        <pc:chgData name="Yann Verdier" userId="d572732d-2761-4823-8cfa-19108bdddf1f" providerId="ADAL" clId="{4BFF2F48-6638-484E-B9AC-4C7D5C1CFC2C}" dt="2024-01-15T20:47:42.158" v="1807" actId="26606"/>
+        <pc:chgData name="Yann Verdier" userId="d572732d-2761-4823-8cfa-19108bdddf1f" providerId="ADAL" clId="{4BFF2F48-6638-484E-B9AC-4C7D5C1CFC2C}" dt="2024-01-15T21:28:07.873" v="1846" actId="5793"/>
         <pc:sldMkLst>
           <pc:docMk/>
           <pc:sldMk cId="2776648252" sldId="259"/>
@@ -1588,7 +1589,7 @@
           </ac:spMkLst>
         </pc:spChg>
         <pc:spChg chg="mod ord">
-          <ac:chgData name="Yann Verdier" userId="d572732d-2761-4823-8cfa-19108bdddf1f" providerId="ADAL" clId="{4BFF2F48-6638-484E-B9AC-4C7D5C1CFC2C}" dt="2024-01-15T20:47:42.158" v="1807" actId="26606"/>
+          <ac:chgData name="Yann Verdier" userId="d572732d-2761-4823-8cfa-19108bdddf1f" providerId="ADAL" clId="{4BFF2F48-6638-484E-B9AC-4C7D5C1CFC2C}" dt="2024-01-15T21:28:07.873" v="1846" actId="5793"/>
           <ac:spMkLst>
             <pc:docMk/>
             <pc:sldMk cId="2776648252" sldId="259"/>
@@ -1669,7 +1670,7 @@
         </pc:picChg>
       </pc:sldChg>
       <pc:sldChg chg="addSp delSp modSp add del mod setBg delDesignElem">
-        <pc:chgData name="Yann Verdier" userId="d572732d-2761-4823-8cfa-19108bdddf1f" providerId="ADAL" clId="{4BFF2F48-6638-484E-B9AC-4C7D5C1CFC2C}" dt="2024-01-11T11:04:24.902" v="1741" actId="26606"/>
+        <pc:chgData name="Yann Verdier" userId="d572732d-2761-4823-8cfa-19108bdddf1f" providerId="ADAL" clId="{4BFF2F48-6638-484E-B9AC-4C7D5C1CFC2C}" dt="2024-01-15T21:44:18.876" v="2472" actId="5793"/>
         <pc:sldMkLst>
           <pc:docMk/>
           <pc:sldMk cId="1574640382" sldId="260"/>
@@ -1683,7 +1684,7 @@
           </ac:spMkLst>
         </pc:spChg>
         <pc:spChg chg="mod">
-          <ac:chgData name="Yann Verdier" userId="d572732d-2761-4823-8cfa-19108bdddf1f" providerId="ADAL" clId="{4BFF2F48-6638-484E-B9AC-4C7D5C1CFC2C}" dt="2024-01-11T11:04:24.902" v="1741" actId="26606"/>
+          <ac:chgData name="Yann Verdier" userId="d572732d-2761-4823-8cfa-19108bdddf1f" providerId="ADAL" clId="{4BFF2F48-6638-484E-B9AC-4C7D5C1CFC2C}" dt="2024-01-15T21:44:18.876" v="2472" actId="5793"/>
           <ac:spMkLst>
             <pc:docMk/>
             <pc:sldMk cId="1574640382" sldId="260"/>
@@ -1787,7 +1788,7 @@
         </pc:sldMkLst>
       </pc:sldChg>
       <pc:sldChg chg="addSp delSp modSp add del mod setBg delDesignElem">
-        <pc:chgData name="Yann Verdier" userId="d572732d-2761-4823-8cfa-19108bdddf1f" providerId="ADAL" clId="{4BFF2F48-6638-484E-B9AC-4C7D5C1CFC2C}" dt="2024-01-11T11:03:27.292" v="1739" actId="26606"/>
+        <pc:chgData name="Yann Verdier" userId="d572732d-2761-4823-8cfa-19108bdddf1f" providerId="ADAL" clId="{4BFF2F48-6638-484E-B9AC-4C7D5C1CFC2C}" dt="2024-01-15T21:32:37.045" v="1906" actId="5793"/>
         <pc:sldMkLst>
           <pc:docMk/>
           <pc:sldMk cId="406620325" sldId="262"/>
@@ -1801,7 +1802,7 @@
           </ac:spMkLst>
         </pc:spChg>
         <pc:spChg chg="mod ord">
-          <ac:chgData name="Yann Verdier" userId="d572732d-2761-4823-8cfa-19108bdddf1f" providerId="ADAL" clId="{4BFF2F48-6638-484E-B9AC-4C7D5C1CFC2C}" dt="2024-01-11T11:03:27.292" v="1739" actId="26606"/>
+          <ac:chgData name="Yann Verdier" userId="d572732d-2761-4823-8cfa-19108bdddf1f" providerId="ADAL" clId="{4BFF2F48-6638-484E-B9AC-4C7D5C1CFC2C}" dt="2024-01-15T21:32:37.045" v="1906" actId="5793"/>
           <ac:spMkLst>
             <pc:docMk/>
             <pc:sldMk cId="406620325" sldId="262"/>
@@ -2853,13 +2854,13 @@
         </pc:spChg>
       </pc:sldChg>
       <pc:sldChg chg="addSp delSp modSp new mod ord setBg">
-        <pc:chgData name="Yann Verdier" userId="d572732d-2761-4823-8cfa-19108bdddf1f" providerId="ADAL" clId="{4BFF2F48-6638-484E-B9AC-4C7D5C1CFC2C}" dt="2023-11-22T17:41:38.954" v="1063" actId="26606"/>
+        <pc:chgData name="Yann Verdier" userId="d572732d-2761-4823-8cfa-19108bdddf1f" providerId="ADAL" clId="{4BFF2F48-6638-484E-B9AC-4C7D5C1CFC2C}" dt="2024-01-15T21:24:57.668" v="1842" actId="26606"/>
         <pc:sldMkLst>
           <pc:docMk/>
           <pc:sldMk cId="738198927" sldId="268"/>
         </pc:sldMkLst>
         <pc:spChg chg="mod">
-          <ac:chgData name="Yann Verdier" userId="d572732d-2761-4823-8cfa-19108bdddf1f" providerId="ADAL" clId="{4BFF2F48-6638-484E-B9AC-4C7D5C1CFC2C}" dt="2023-11-22T17:41:38.954" v="1063" actId="26606"/>
+          <ac:chgData name="Yann Verdier" userId="d572732d-2761-4823-8cfa-19108bdddf1f" providerId="ADAL" clId="{4BFF2F48-6638-484E-B9AC-4C7D5C1CFC2C}" dt="2024-01-15T21:24:57.668" v="1842" actId="26606"/>
           <ac:spMkLst>
             <pc:docMk/>
             <pc:sldMk cId="738198927" sldId="268"/>
@@ -2914,44 +2915,76 @@
             <ac:spMk id="22" creationId="{2E92FA66-67D7-4CB4-94D3-E643A9AD4757}"/>
           </ac:spMkLst>
         </pc:spChg>
-        <pc:spChg chg="add">
-          <ac:chgData name="Yann Verdier" userId="d572732d-2761-4823-8cfa-19108bdddf1f" providerId="ADAL" clId="{4BFF2F48-6638-484E-B9AC-4C7D5C1CFC2C}" dt="2023-11-22T17:41:38.954" v="1063" actId="26606"/>
+        <pc:spChg chg="add del">
+          <ac:chgData name="Yann Verdier" userId="d572732d-2761-4823-8cfa-19108bdddf1f" providerId="ADAL" clId="{4BFF2F48-6638-484E-B9AC-4C7D5C1CFC2C}" dt="2024-01-15T21:24:57.668" v="1842" actId="26606"/>
           <ac:spMkLst>
             <pc:docMk/>
             <pc:sldMk cId="738198927" sldId="268"/>
             <ac:spMk id="27" creationId="{2550BE34-C2B8-49B8-8519-67A8CAD51AE9}"/>
           </ac:spMkLst>
         </pc:spChg>
-        <pc:spChg chg="add">
-          <ac:chgData name="Yann Verdier" userId="d572732d-2761-4823-8cfa-19108bdddf1f" providerId="ADAL" clId="{4BFF2F48-6638-484E-B9AC-4C7D5C1CFC2C}" dt="2023-11-22T17:41:38.954" v="1063" actId="26606"/>
+        <pc:spChg chg="add mod ord">
+          <ac:chgData name="Yann Verdier" userId="d572732d-2761-4823-8cfa-19108bdddf1f" providerId="ADAL" clId="{4BFF2F48-6638-484E-B9AC-4C7D5C1CFC2C}" dt="2024-01-15T21:24:57.668" v="1842" actId="26606"/>
           <ac:spMkLst>
             <pc:docMk/>
             <pc:sldMk cId="738198927" sldId="268"/>
             <ac:spMk id="28" creationId="{8ED104B0-1850-73F1-BF0A-3D8815861679}"/>
           </ac:spMkLst>
         </pc:spChg>
-        <pc:spChg chg="add">
-          <ac:chgData name="Yann Verdier" userId="d572732d-2761-4823-8cfa-19108bdddf1f" providerId="ADAL" clId="{4BFF2F48-6638-484E-B9AC-4C7D5C1CFC2C}" dt="2023-11-22T17:41:38.954" v="1063" actId="26606"/>
+        <pc:spChg chg="add del">
+          <ac:chgData name="Yann Verdier" userId="d572732d-2761-4823-8cfa-19108bdddf1f" providerId="ADAL" clId="{4BFF2F48-6638-484E-B9AC-4C7D5C1CFC2C}" dt="2024-01-15T21:24:57.668" v="1842" actId="26606"/>
           <ac:spMkLst>
             <pc:docMk/>
             <pc:sldMk cId="738198927" sldId="268"/>
             <ac:spMk id="29" creationId="{A7457DD9-5A45-400A-AB4B-4B4EDECA25F1}"/>
           </ac:spMkLst>
         </pc:spChg>
-        <pc:spChg chg="add">
-          <ac:chgData name="Yann Verdier" userId="d572732d-2761-4823-8cfa-19108bdddf1f" providerId="ADAL" clId="{4BFF2F48-6638-484E-B9AC-4C7D5C1CFC2C}" dt="2023-11-22T17:41:38.954" v="1063" actId="26606"/>
+        <pc:spChg chg="add del">
+          <ac:chgData name="Yann Verdier" userId="d572732d-2761-4823-8cfa-19108bdddf1f" providerId="ADAL" clId="{4BFF2F48-6638-484E-B9AC-4C7D5C1CFC2C}" dt="2024-01-15T21:24:57.668" v="1842" actId="26606"/>
           <ac:spMkLst>
             <pc:docMk/>
             <pc:sldMk cId="738198927" sldId="268"/>
             <ac:spMk id="31" creationId="{441CF7D6-A660-431A-B0BB-140A0D5556B6}"/>
           </ac:spMkLst>
         </pc:spChg>
-        <pc:spChg chg="add">
-          <ac:chgData name="Yann Verdier" userId="d572732d-2761-4823-8cfa-19108bdddf1f" providerId="ADAL" clId="{4BFF2F48-6638-484E-B9AC-4C7D5C1CFC2C}" dt="2023-11-22T17:41:38.954" v="1063" actId="26606"/>
+        <pc:spChg chg="add del">
+          <ac:chgData name="Yann Verdier" userId="d572732d-2761-4823-8cfa-19108bdddf1f" providerId="ADAL" clId="{4BFF2F48-6638-484E-B9AC-4C7D5C1CFC2C}" dt="2024-01-15T21:24:57.668" v="1842" actId="26606"/>
           <ac:spMkLst>
             <pc:docMk/>
             <pc:sldMk cId="738198927" sldId="268"/>
             <ac:spMk id="33" creationId="{0570A85B-3810-4F95-97B0-CBF4CCDB381C}"/>
+          </ac:spMkLst>
+        </pc:spChg>
+        <pc:spChg chg="add del">
+          <ac:chgData name="Yann Verdier" userId="d572732d-2761-4823-8cfa-19108bdddf1f" providerId="ADAL" clId="{4BFF2F48-6638-484E-B9AC-4C7D5C1CFC2C}" dt="2024-01-15T21:24:57.662" v="1841" actId="26606"/>
+          <ac:spMkLst>
+            <pc:docMk/>
+            <pc:sldMk cId="738198927" sldId="268"/>
+            <ac:spMk id="38" creationId="{32AEEBC8-9D30-42EF-95F2-386C2653FBF0}"/>
+          </ac:spMkLst>
+        </pc:spChg>
+        <pc:spChg chg="add del">
+          <ac:chgData name="Yann Verdier" userId="d572732d-2761-4823-8cfa-19108bdddf1f" providerId="ADAL" clId="{4BFF2F48-6638-484E-B9AC-4C7D5C1CFC2C}" dt="2024-01-15T21:24:57.662" v="1841" actId="26606"/>
+          <ac:spMkLst>
+            <pc:docMk/>
+            <pc:sldMk cId="738198927" sldId="268"/>
+            <ac:spMk id="40" creationId="{2E92FA66-67D7-4CB4-94D3-E643A9AD4757}"/>
+          </ac:spMkLst>
+        </pc:spChg>
+        <pc:spChg chg="add">
+          <ac:chgData name="Yann Verdier" userId="d572732d-2761-4823-8cfa-19108bdddf1f" providerId="ADAL" clId="{4BFF2F48-6638-484E-B9AC-4C7D5C1CFC2C}" dt="2024-01-15T21:24:57.668" v="1842" actId="26606"/>
+          <ac:spMkLst>
+            <pc:docMk/>
+            <pc:sldMk cId="738198927" sldId="268"/>
+            <ac:spMk id="42" creationId="{A8908DB7-C3A6-4FCB-9820-CEE02B398C4A}"/>
+          </ac:spMkLst>
+        </pc:spChg>
+        <pc:spChg chg="add">
+          <ac:chgData name="Yann Verdier" userId="d572732d-2761-4823-8cfa-19108bdddf1f" providerId="ADAL" clId="{4BFF2F48-6638-484E-B9AC-4C7D5C1CFC2C}" dt="2024-01-15T21:24:57.668" v="1842" actId="26606"/>
+          <ac:spMkLst>
+            <pc:docMk/>
+            <pc:sldMk cId="738198927" sldId="268"/>
+            <ac:spMk id="43" creationId="{535742DD-1B16-4E9D-B715-0D74B4574A68}"/>
           </ac:spMkLst>
         </pc:spChg>
         <pc:graphicFrameChg chg="add del">
@@ -2971,7 +3004,7 @@
           </ac:graphicFrameMkLst>
         </pc:graphicFrameChg>
         <pc:picChg chg="add mod ord">
-          <ac:chgData name="Yann Verdier" userId="d572732d-2761-4823-8cfa-19108bdddf1f" providerId="ADAL" clId="{4BFF2F48-6638-484E-B9AC-4C7D5C1CFC2C}" dt="2023-11-22T17:41:38.954" v="1063" actId="26606"/>
+          <ac:chgData name="Yann Verdier" userId="d572732d-2761-4823-8cfa-19108bdddf1f" providerId="ADAL" clId="{4BFF2F48-6638-484E-B9AC-4C7D5C1CFC2C}" dt="2024-01-15T21:24:57.668" v="1842" actId="26606"/>
           <ac:picMkLst>
             <pc:docMk/>
             <pc:sldMk cId="738198927" sldId="268"/>
@@ -3368,7 +3401,7 @@
         </pc:sldMkLst>
       </pc:sldChg>
       <pc:sldChg chg="addSp delSp modSp add mod setBg delDesignElem">
-        <pc:chgData name="Yann Verdier" userId="d572732d-2761-4823-8cfa-19108bdddf1f" providerId="ADAL" clId="{4BFF2F48-6638-484E-B9AC-4C7D5C1CFC2C}" dt="2024-01-11T11:04:08.656" v="1740" actId="26606"/>
+        <pc:chgData name="Yann Verdier" userId="d572732d-2761-4823-8cfa-19108bdddf1f" providerId="ADAL" clId="{4BFF2F48-6638-484E-B9AC-4C7D5C1CFC2C}" dt="2024-01-15T21:30:38.294" v="1872" actId="5793"/>
         <pc:sldMkLst>
           <pc:docMk/>
           <pc:sldMk cId="2191258283" sldId="273"/>
@@ -3382,7 +3415,7 @@
           </ac:spMkLst>
         </pc:spChg>
         <pc:spChg chg="mod">
-          <ac:chgData name="Yann Verdier" userId="d572732d-2761-4823-8cfa-19108bdddf1f" providerId="ADAL" clId="{4BFF2F48-6638-484E-B9AC-4C7D5C1CFC2C}" dt="2024-01-11T11:04:08.656" v="1740" actId="26606"/>
+          <ac:chgData name="Yann Verdier" userId="d572732d-2761-4823-8cfa-19108bdddf1f" providerId="ADAL" clId="{4BFF2F48-6638-484E-B9AC-4C7D5C1CFC2C}" dt="2024-01-15T21:30:38.294" v="1872" actId="5793"/>
           <ac:spMkLst>
             <pc:docMk/>
             <pc:sldMk cId="2191258283" sldId="273"/>
@@ -3533,6 +3566,83 @@
             <ac:cxnSpMk id="35" creationId="{A054EDF5-7644-4A95-AB88-057FAB414FEE}"/>
           </ac:cxnSpMkLst>
         </pc:cxnChg>
+      </pc:sldChg>
+      <pc:sldChg chg="del">
+        <pc:chgData name="Yann Verdier" userId="d572732d-2761-4823-8cfa-19108bdddf1f" providerId="ADAL" clId="{4BFF2F48-6638-484E-B9AC-4C7D5C1CFC2C}" dt="2024-01-15T21:29:48.829" v="1847" actId="47"/>
+        <pc:sldMkLst>
+          <pc:docMk/>
+          <pc:sldMk cId="2191452943" sldId="274"/>
+        </pc:sldMkLst>
+      </pc:sldChg>
+      <pc:sldChg chg="modSp mod ord">
+        <pc:chgData name="Yann Verdier" userId="d572732d-2761-4823-8cfa-19108bdddf1f" providerId="ADAL" clId="{4BFF2F48-6638-484E-B9AC-4C7D5C1CFC2C}" dt="2024-01-15T21:43:43.983" v="2470" actId="20577"/>
+        <pc:sldMkLst>
+          <pc:docMk/>
+          <pc:sldMk cId="3921660627" sldId="275"/>
+        </pc:sldMkLst>
+        <pc:spChg chg="mod">
+          <ac:chgData name="Yann Verdier" userId="d572732d-2761-4823-8cfa-19108bdddf1f" providerId="ADAL" clId="{4BFF2F48-6638-484E-B9AC-4C7D5C1CFC2C}" dt="2024-01-15T21:43:43.983" v="2470" actId="20577"/>
+          <ac:spMkLst>
+            <pc:docMk/>
+            <pc:sldMk cId="3921660627" sldId="275"/>
+            <ac:spMk id="3" creationId="{7B84777B-C837-DD2A-B516-875BC7CD4784}"/>
+          </ac:spMkLst>
+        </pc:spChg>
+        <pc:picChg chg="mod">
+          <ac:chgData name="Yann Verdier" userId="d572732d-2761-4823-8cfa-19108bdddf1f" providerId="ADAL" clId="{4BFF2F48-6638-484E-B9AC-4C7D5C1CFC2C}" dt="2024-01-15T21:36:17.727" v="2171" actId="1076"/>
+          <ac:picMkLst>
+            <pc:docMk/>
+            <pc:sldMk cId="3921660627" sldId="275"/>
+            <ac:picMk id="4" creationId="{450FFC09-1AB2-F2B8-623A-DAC22C955732}"/>
+          </ac:picMkLst>
+        </pc:picChg>
+      </pc:sldChg>
+      <pc:sldChg chg="modSp mod">
+        <pc:chgData name="Yann Verdier" userId="d572732d-2761-4823-8cfa-19108bdddf1f" providerId="ADAL" clId="{4BFF2F48-6638-484E-B9AC-4C7D5C1CFC2C}" dt="2024-01-15T21:26:58.974" v="1843" actId="20577"/>
+        <pc:sldMkLst>
+          <pc:docMk/>
+          <pc:sldMk cId="1303324382" sldId="276"/>
+        </pc:sldMkLst>
+        <pc:spChg chg="mod">
+          <ac:chgData name="Yann Verdier" userId="d572732d-2761-4823-8cfa-19108bdddf1f" providerId="ADAL" clId="{4BFF2F48-6638-484E-B9AC-4C7D5C1CFC2C}" dt="2024-01-15T21:26:58.974" v="1843" actId="20577"/>
+          <ac:spMkLst>
+            <pc:docMk/>
+            <pc:sldMk cId="1303324382" sldId="276"/>
+            <ac:spMk id="3" creationId="{0FBA8A1B-7A93-B73D-F568-AF1A5EAA0393}"/>
+          </ac:spMkLst>
+        </pc:spChg>
+      </pc:sldChg>
+    </pc:docChg>
+  </pc:docChgLst>
+  <pc:docChgLst>
+    <pc:chgData name="Mikael Very" userId="S::bwb.m.very@fondespierre.com::45e2a2b5-52d0-4b1b-9de7-a11dfef9e9e8" providerId="AD" clId="Web-{4422DB98-549F-6814-9FFB-CA30D1A2C8C2}"/>
+    <pc:docChg chg="addSld modSld">
+      <pc:chgData name="Mikael Very" userId="S::bwb.m.very@fondespierre.com::45e2a2b5-52d0-4b1b-9de7-a11dfef9e9e8" providerId="AD" clId="Web-{4422DB98-549F-6814-9FFB-CA30D1A2C8C2}" dt="2024-01-15T21:50:59.259" v="39" actId="20577"/>
+      <pc:docMkLst>
+        <pc:docMk/>
+      </pc:docMkLst>
+      <pc:sldChg chg="modSp new">
+        <pc:chgData name="Mikael Very" userId="S::bwb.m.very@fondespierre.com::45e2a2b5-52d0-4b1b-9de7-a11dfef9e9e8" providerId="AD" clId="Web-{4422DB98-549F-6814-9FFB-CA30D1A2C8C2}" dt="2024-01-15T21:50:59.259" v="39" actId="20577"/>
+        <pc:sldMkLst>
+          <pc:docMk/>
+          <pc:sldMk cId="1173996352" sldId="277"/>
+        </pc:sldMkLst>
+        <pc:spChg chg="mod">
+          <ac:chgData name="Mikael Very" userId="S::bwb.m.very@fondespierre.com::45e2a2b5-52d0-4b1b-9de7-a11dfef9e9e8" providerId="AD" clId="Web-{4422DB98-549F-6814-9FFB-CA30D1A2C8C2}" dt="2024-01-15T21:49:34.616" v="20" actId="20577"/>
+          <ac:spMkLst>
+            <pc:docMk/>
+            <pc:sldMk cId="1173996352" sldId="277"/>
+            <ac:spMk id="2" creationId="{BB0B9FDE-55F1-C744-2628-0D9E143F8A57}"/>
+          </ac:spMkLst>
+        </pc:spChg>
+        <pc:spChg chg="mod">
+          <ac:chgData name="Mikael Very" userId="S::bwb.m.very@fondespierre.com::45e2a2b5-52d0-4b1b-9de7-a11dfef9e9e8" providerId="AD" clId="Web-{4422DB98-549F-6814-9FFB-CA30D1A2C8C2}" dt="2024-01-15T21:50:59.259" v="39" actId="20577"/>
+          <ac:spMkLst>
+            <pc:docMk/>
+            <pc:sldMk cId="1173996352" sldId="277"/>
+            <ac:spMk id="3" creationId="{41E13E7E-6D93-8E33-9710-9FAEE4813A21}"/>
+          </ac:spMkLst>
+        </pc:spChg>
       </pc:sldChg>
     </pc:docChg>
   </pc:docChgLst>
@@ -3569,41 +3679,6 @@
     </pc:docChg>
   </pc:docChgLst>
 </pc:chgInfo>
-</file>
-
-<file path=ppt/comments/modernComment_112_829EEB0F.xml><?xml version="1.0" encoding="utf-8"?>
-<p188:cmLst xmlns:a="http://schemas.openxmlformats.org/drawingml/2006/main" xmlns:r="http://schemas.openxmlformats.org/officeDocument/2006/relationships" xmlns:p188="http://schemas.microsoft.com/office/powerpoint/2018/8/main">
-  <p188:cm id="{748825A9-048C-4F05-A29A-AEEB0559E3AA}" authorId="{14CB8BD9-864D-38DC-9D51-9AF29A756AF7}" created="2024-01-15T20:03:41.360">
-    <pc:sldMkLst xmlns:pc="http://schemas.microsoft.com/office/powerpoint/2013/main/command">
-      <pc:docMk/>
-      <pc:sldMk cId="2191452943" sldId="274"/>
-    </pc:sldMkLst>
-    <p188:replyLst>
-      <p188:reply id="{574B5D40-6F6E-4421-B7DC-B799E25F9245}" authorId="{14CB8BD9-864D-38DC-9D51-9AF29A756AF7}" created="2024-01-15T20:46:42.084">
-        <p188:txBody>
-          <a:bodyPr/>
-          <a:lstStyle/>
-          <a:p>
-            <a:r>
-              <a:rPr lang="fr-FR"/>
-              <a:t>c'est en conclusion</a:t>
-            </a:r>
-          </a:p>
-        </p188:txBody>
-      </p188:reply>
-    </p188:replyLst>
-    <p188:txBody>
-      <a:bodyPr/>
-      <a:lstStyle/>
-      <a:p>
-        <a:r>
-          <a:rPr lang="fr-FR"/>
-          <a:t>En cc ? </a:t>
-        </a:r>
-      </a:p>
-    </p188:txBody>
-  </p188:cm>
-</p188:cmLst>
 </file>
 
 <file path=ppt/diagrams/colors1.xml><?xml version="1.0" encoding="utf-8"?>
@@ -8669,7 +8744,7 @@
           <a:p>
             <a:fld id="{BD6D19D5-D423-4C7D-BE37-350F3D82A961}" type="slidenum">
               <a:rPr lang="fr-FR" smtClean="0"/>
-              <a:t>‹#›</a:t>
+              <a:t>‹N°›</a:t>
             </a:fld>
             <a:endParaRPr lang="fr-FR"/>
           </a:p>
@@ -8928,7 +9003,7 @@
           <a:p>
             <a:fld id="{109D9EE5-14A8-4D2F-A0BD-1BB33ACFF757}" type="slidenum">
               <a:rPr lang="fr-FR" smtClean="0"/>
-              <a:t>‹#›</a:t>
+              <a:t>‹N°›</a:t>
             </a:fld>
             <a:endParaRPr lang="fr-FR"/>
           </a:p>
@@ -9876,7 +9951,7 @@
           <a:p>
             <a:fld id="{109D9EE5-14A8-4D2F-A0BD-1BB33ACFF757}" type="slidenum">
               <a:rPr lang="fr-FR" smtClean="0"/>
-              <a:t>3</a:t>
+              <a:t>4</a:t>
             </a:fld>
             <a:endParaRPr lang="fr-FR"/>
           </a:p>
@@ -11491,6 +11566,90 @@
           <a:p>
             <a:fld id="{109D9EE5-14A8-4D2F-A0BD-1BB33ACFF757}" type="slidenum">
               <a:rPr lang="fr-FR" smtClean="0"/>
+              <a:t>11</a:t>
+            </a:fld>
+            <a:endParaRPr lang="fr-FR"/>
+          </a:p>
+        </p:txBody>
+      </p:sp>
+    </p:spTree>
+    <p:extLst>
+      <p:ext uri="{BB962C8B-B14F-4D97-AF65-F5344CB8AC3E}">
+        <p14:creationId xmlns:p14="http://schemas.microsoft.com/office/powerpoint/2010/main" val="1495113762"/>
+      </p:ext>
+    </p:extLst>
+  </p:cSld>
+  <p:clrMapOvr>
+    <a:masterClrMapping/>
+  </p:clrMapOvr>
+</p:notes>
+</file>
+
+<file path=ppt/notesSlides/notesSlide9.xml><?xml version="1.0" encoding="utf-8"?>
+<p:notes xmlns:a="http://schemas.openxmlformats.org/drawingml/2006/main" xmlns:r="http://schemas.openxmlformats.org/officeDocument/2006/relationships" xmlns:p="http://schemas.openxmlformats.org/presentationml/2006/main">
+  <p:cSld>
+    <p:spTree>
+      <p:nvGrpSpPr>
+        <p:cNvPr id="1" name=""/>
+        <p:cNvGrpSpPr/>
+        <p:nvPr/>
+      </p:nvGrpSpPr>
+      <p:grpSpPr>
+        <a:xfrm>
+          <a:off x="0" y="0"/>
+          <a:ext cx="0" cy="0"/>
+          <a:chOff x="0" y="0"/>
+          <a:chExt cx="0" cy="0"/>
+        </a:xfrm>
+      </p:grpSpPr>
+      <p:sp>
+        <p:nvSpPr>
+          <p:cNvPr id="2" name="Espace réservé de l'image des diapositives 1"/>
+          <p:cNvSpPr>
+            <a:spLocks noGrp="1" noRot="1" noChangeAspect="1"/>
+          </p:cNvSpPr>
+          <p:nvPr>
+            <p:ph type="sldImg"/>
+          </p:nvPr>
+        </p:nvSpPr>
+        <p:spPr/>
+      </p:sp>
+      <p:sp>
+        <p:nvSpPr>
+          <p:cNvPr id="3" name="Espace réservé des notes 2"/>
+          <p:cNvSpPr>
+            <a:spLocks noGrp="1"/>
+          </p:cNvSpPr>
+          <p:nvPr>
+            <p:ph type="body" idx="1"/>
+          </p:nvPr>
+        </p:nvSpPr>
+        <p:spPr/>
+        <p:txBody>
+          <a:bodyPr/>
+          <a:lstStyle/>
+          <a:p>
+            <a:endParaRPr lang="fr-FR"/>
+          </a:p>
+        </p:txBody>
+      </p:sp>
+      <p:sp>
+        <p:nvSpPr>
+          <p:cNvPr id="4" name="Espace réservé du numéro de diapositive 3"/>
+          <p:cNvSpPr>
+            <a:spLocks noGrp="1"/>
+          </p:cNvSpPr>
+          <p:nvPr>
+            <p:ph type="sldNum" sz="quarter" idx="5"/>
+          </p:nvPr>
+        </p:nvSpPr>
+        <p:spPr/>
+        <p:txBody>
+          <a:bodyPr/>
+          <a:lstStyle/>
+          <a:p>
+            <a:fld id="{109D9EE5-14A8-4D2F-A0BD-1BB33ACFF757}" type="slidenum">
+              <a:rPr lang="fr-FR" smtClean="0"/>
               <a:t>16</a:t>
             </a:fld>
             <a:endParaRPr lang="fr-FR"/>
@@ -11681,7 +11840,7 @@
           <a:p>
             <a:fld id="{48F63A3B-78C7-47BE-AE5E-E10140E04643}" type="slidenum">
               <a:rPr lang="en-US" dirty="0"/>
-              <a:t>‹#›</a:t>
+              <a:t>‹N°›</a:t>
             </a:fld>
             <a:endParaRPr lang="en-US"/>
           </a:p>
@@ -11849,7 +12008,7 @@
           <a:p>
             <a:fld id="{48F63A3B-78C7-47BE-AE5E-E10140E04643}" type="slidenum">
               <a:rPr lang="en-US" dirty="0"/>
-              <a:t>‹#›</a:t>
+              <a:t>‹N°›</a:t>
             </a:fld>
             <a:endParaRPr lang="en-US"/>
           </a:p>
@@ -12027,7 +12186,7 @@
           <a:p>
             <a:fld id="{48F63A3B-78C7-47BE-AE5E-E10140E04643}" type="slidenum">
               <a:rPr lang="en-US" dirty="0"/>
-              <a:t>‹#›</a:t>
+              <a:t>‹N°›</a:t>
             </a:fld>
             <a:endParaRPr lang="en-US"/>
           </a:p>
@@ -12195,7 +12354,7 @@
           <a:p>
             <a:fld id="{48F63A3B-78C7-47BE-AE5E-E10140E04643}" type="slidenum">
               <a:rPr lang="en-US" dirty="0"/>
-              <a:t>‹#›</a:t>
+              <a:t>‹N°›</a:t>
             </a:fld>
             <a:endParaRPr lang="en-US"/>
           </a:p>
@@ -12440,7 +12599,7 @@
           <a:p>
             <a:fld id="{48F63A3B-78C7-47BE-AE5E-E10140E04643}" type="slidenum">
               <a:rPr lang="en-US" dirty="0"/>
-              <a:t>‹#›</a:t>
+              <a:t>‹N°›</a:t>
             </a:fld>
             <a:endParaRPr lang="en-US"/>
           </a:p>
@@ -12669,7 +12828,7 @@
           <a:p>
             <a:fld id="{48F63A3B-78C7-47BE-AE5E-E10140E04643}" type="slidenum">
               <a:rPr lang="en-US" dirty="0"/>
-              <a:t>‹#›</a:t>
+              <a:t>‹N°›</a:t>
             </a:fld>
             <a:endParaRPr lang="en-US"/>
           </a:p>
@@ -13033,7 +13192,7 @@
           <a:p>
             <a:fld id="{48F63A3B-78C7-47BE-AE5E-E10140E04643}" type="slidenum">
               <a:rPr lang="en-US" dirty="0"/>
-              <a:t>‹#›</a:t>
+              <a:t>‹N°›</a:t>
             </a:fld>
             <a:endParaRPr lang="en-US"/>
           </a:p>
@@ -13150,7 +13309,7 @@
           <a:p>
             <a:fld id="{48F63A3B-78C7-47BE-AE5E-E10140E04643}" type="slidenum">
               <a:rPr lang="en-US" dirty="0"/>
-              <a:t>‹#›</a:t>
+              <a:t>‹N°›</a:t>
             </a:fld>
             <a:endParaRPr lang="en-US"/>
           </a:p>
@@ -13245,7 +13404,7 @@
           <a:p>
             <a:fld id="{48F63A3B-78C7-47BE-AE5E-E10140E04643}" type="slidenum">
               <a:rPr lang="en-US" dirty="0"/>
-              <a:t>‹#›</a:t>
+              <a:t>‹N°›</a:t>
             </a:fld>
             <a:endParaRPr lang="en-US"/>
           </a:p>
@@ -13520,7 +13679,7 @@
           <a:p>
             <a:fld id="{48F63A3B-78C7-47BE-AE5E-E10140E04643}" type="slidenum">
               <a:rPr lang="en-US" dirty="0"/>
-              <a:t>‹#›</a:t>
+              <a:t>‹N°›</a:t>
             </a:fld>
             <a:endParaRPr lang="en-US"/>
           </a:p>
@@ -13772,7 +13931,7 @@
           <a:p>
             <a:fld id="{48F63A3B-78C7-47BE-AE5E-E10140E04643}" type="slidenum">
               <a:rPr lang="en-US" dirty="0"/>
-              <a:t>‹#›</a:t>
+              <a:t>‹N°›</a:t>
             </a:fld>
             <a:endParaRPr lang="en-US"/>
           </a:p>
@@ -14019,7 +14178,7 @@
           <a:p>
             <a:fld id="{48F63A3B-78C7-47BE-AE5E-E10140E04643}" type="slidenum">
               <a:rPr lang="en-US" dirty="0"/>
-              <a:t>‹#›</a:t>
+              <a:t>‹N°›</a:t>
             </a:fld>
             <a:endParaRPr lang="en-US"/>
           </a:p>
@@ -15277,8 +15436,36 @@
               <a:buChar char="•"/>
             </a:pPr>
             <a:r>
+              <a:rPr lang="en-US" sz="1400" b="1" err="1"/>
+              <a:t>Protocole</a:t>
+            </a:r>
+            <a:r>
               <a:rPr lang="en-US" sz="1400" b="1"/>
-              <a:t>Protocole NCP (NetWork Control Program = remplacé en 1983 par le TCP/IP (Transmission Control Protocol/Internet Protocol) :</a:t>
+              <a:t> NCP (</a:t>
+            </a:r>
+            <a:r>
+              <a:rPr lang="en-US" sz="1400" b="1" err="1"/>
+              <a:t>NetWork</a:t>
+            </a:r>
+            <a:r>
+              <a:rPr lang="en-US" sz="1400" b="1"/>
+              <a:t> Control Program = </a:t>
+            </a:r>
+            <a:r>
+              <a:rPr lang="en-US" sz="1400" b="1" err="1"/>
+              <a:t>remplacé</a:t>
+            </a:r>
+            <a:r>
+              <a:rPr lang="en-US" sz="1400" b="1"/>
+              <a:t> </a:t>
+            </a:r>
+            <a:r>
+              <a:rPr lang="en-US" sz="1400" b="1" err="1"/>
+              <a:t>en</a:t>
+            </a:r>
+            <a:r>
+              <a:rPr lang="en-US" sz="1400" b="1"/>
+              <a:t> 1983 par le TCP/IP (Transmission Control Protocol/Internet Protocol) :</a:t>
             </a:r>
           </a:p>
           <a:p>
@@ -15295,7 +15482,15 @@
             </a:pPr>
             <a:r>
               <a:rPr lang="en-US" sz="1400" b="1"/>
-              <a:t>Commutation de paquets :</a:t>
+              <a:t>Commutation de </a:t>
+            </a:r>
+            <a:r>
+              <a:rPr lang="en-US" sz="1400" b="1" err="1"/>
+              <a:t>paquets</a:t>
+            </a:r>
+            <a:r>
+              <a:rPr lang="en-US" sz="1400" b="1"/>
+              <a:t> :</a:t>
             </a:r>
           </a:p>
           <a:p>
@@ -15334,14 +15529,8 @@
             <a:endParaRPr lang="en-US" sz="1400"/>
           </a:p>
           <a:p>
-            <a:pPr indent="-228600" algn="l">
-              <a:buFont typeface="Arial" panose="020B0604020202020204" pitchFamily="34" charset="0"/>
-              <a:buChar char="•"/>
-            </a:pPr>
-            <a:r>
-              <a:rPr lang="en-US" sz="1400" b="1"/>
-              <a:t>  </a:t>
-            </a:r>
+            <a:pPr algn="l"/>
+            <a:endParaRPr lang="en-US" sz="1400" b="1"/>
           </a:p>
           <a:p>
             <a:pPr indent="-228600" algn="l">
@@ -15540,10 +15729,10 @@
       </p:grpSpPr>
       <p:sp useBgFill="1">
         <p:nvSpPr>
-          <p:cNvPr id="27" name="Rectangle 26">
+          <p:cNvPr id="42" name="Rectangle 41">
             <a:extLst>
               <a:ext uri="{FF2B5EF4-FFF2-40B4-BE49-F238E27FC236}">
-                <a16:creationId xmlns:a16="http://schemas.microsoft.com/office/drawing/2014/main" id="{2550BE34-C2B8-49B8-8519-67A8CAD51AE9}"/>
+                <a16:creationId xmlns:a16="http://schemas.microsoft.com/office/drawing/2014/main" id="{A8908DB7-C3A6-4FCB-9820-CEE02B398C4A}"/>
               </a:ext>
               <a:ext uri="{C183D7F6-B498-43B3-948B-1728B52AA6E4}">
                 <adec:decorative xmlns:adec="http://schemas.microsoft.com/office/drawing/2017/decorative" val="1"/>
@@ -15598,12 +15787,51 @@
           </a:p>
         </p:txBody>
       </p:sp>
-      <p:sp useBgFill="1">
+      <p:sp>
         <p:nvSpPr>
-          <p:cNvPr id="29" name="Rectangle 28">
+          <p:cNvPr id="2" name="Titre 1">
             <a:extLst>
               <a:ext uri="{FF2B5EF4-FFF2-40B4-BE49-F238E27FC236}">
-                <a16:creationId xmlns:a16="http://schemas.microsoft.com/office/drawing/2014/main" id="{A7457DD9-5A45-400A-AB4B-4B4EDECA25F1}"/>
+                <a16:creationId xmlns:a16="http://schemas.microsoft.com/office/drawing/2014/main" id="{AF54B093-63A8-4E77-8EF6-218285526E41}"/>
+              </a:ext>
+            </a:extLst>
+          </p:cNvPr>
+          <p:cNvSpPr>
+            <a:spLocks noGrp="1"/>
+          </p:cNvSpPr>
+          <p:nvPr>
+            <p:ph type="title"/>
+          </p:nvPr>
+        </p:nvSpPr>
+        <p:spPr>
+          <a:xfrm>
+            <a:off x="630936" y="640823"/>
+            <a:ext cx="3419856" cy="5583148"/>
+          </a:xfrm>
+        </p:spPr>
+        <p:txBody>
+          <a:bodyPr anchor="ctr">
+            <a:normAutofit/>
+          </a:bodyPr>
+          <a:lstStyle/>
+          <a:p>
+            <a:r>
+              <a:rPr lang="fr-FR" sz="5400"/>
+              <a:t>Le protocole NCP</a:t>
+            </a:r>
+            <a:br>
+              <a:rPr lang="fr-FR" sz="5400"/>
+            </a:br>
+            <a:endParaRPr lang="fr-FR" sz="5400"/>
+          </a:p>
+        </p:txBody>
+      </p:sp>
+      <p:sp>
+        <p:nvSpPr>
+          <p:cNvPr id="43" name="sketch line">
+            <a:extLst>
+              <a:ext uri="{FF2B5EF4-FFF2-40B4-BE49-F238E27FC236}">
+                <a16:creationId xmlns:a16="http://schemas.microsoft.com/office/drawing/2014/main" id="{535742DD-1B16-4E9D-B715-0D74B4574A68}"/>
               </a:ext>
               <a:ext uri="{C183D7F6-B498-43B3-948B-1728B52AA6E4}">
                 <adec:decorative xmlns:adec="http://schemas.microsoft.com/office/drawing/2017/decorative" val="1"/>
@@ -15622,156 +15850,333 @@
           </p:nvPr>
         </p:nvSpPr>
         <p:spPr>
-          <a:xfrm>
-            <a:off x="554416" y="365125"/>
-            <a:ext cx="11167447" cy="2089317"/>
+          <a:xfrm flipH="1">
+            <a:off x="4267200" y="630936"/>
+            <a:ext cx="18288" cy="5590381"/>
           </a:xfrm>
-          <a:prstGeom prst="rect">
+          <a:custGeom>
             <a:avLst/>
-          </a:prstGeom>
-          <a:ln w="12700">
-            <a:solidFill>
-              <a:srgbClr val="DEDEDE"/>
-            </a:solidFill>
-          </a:ln>
-          <a:effectLst>
-            <a:outerShdw blurRad="50800" dist="38100" dir="2700000" algn="tl" rotWithShape="0">
-              <a:schemeClr val="bg2">
-                <a:lumMod val="85000"/>
-                <a:alpha val="50000"/>
-              </a:schemeClr>
-            </a:outerShdw>
-          </a:effectLst>
-        </p:spPr>
-        <p:style>
-          <a:lnRef idx="2">
-            <a:schemeClr val="accent1">
-              <a:shade val="50000"/>
-            </a:schemeClr>
-          </a:lnRef>
-          <a:fillRef idx="1">
-            <a:schemeClr val="accent1"/>
-          </a:fillRef>
-          <a:effectRef idx="0">
-            <a:schemeClr val="accent1"/>
-          </a:effectRef>
-          <a:fontRef idx="minor">
-            <a:schemeClr val="lt1"/>
-          </a:fontRef>
-        </p:style>
-        <p:txBody>
-          <a:bodyPr rtlCol="0" anchor="ctr"/>
-          <a:lstStyle/>
-          <a:p>
-            <a:pPr marL="0" marR="0" lvl="0" indent="0" algn="ctr" defTabSz="914400" rtl="0" eaLnBrk="1" fontAlgn="auto" latinLnBrk="0" hangingPunct="1">
-              <a:lnSpc>
-                <a:spcPct val="100000"/>
-              </a:lnSpc>
-              <a:spcBef>
-                <a:spcPts val="0"/>
-              </a:spcBef>
-              <a:spcAft>
-                <a:spcPts val="0"/>
-              </a:spcAft>
-              <a:buClrTx/>
-              <a:buSzTx/>
-              <a:buFontTx/>
-              <a:buNone/>
-              <a:tabLst/>
-              <a:defRPr/>
-            </a:pPr>
-            <a:endParaRPr kumimoji="0" lang="en-US" sz="1800" b="0" i="0" u="none" strike="noStrike" kern="1200" cap="none" spc="0" normalizeH="0" baseline="0" noProof="0">
-              <a:ln>
-                <a:noFill/>
-              </a:ln>
-              <a:solidFill>
-                <a:prstClr val="white"/>
-              </a:solidFill>
-              <a:effectLst/>
-              <a:uLnTx/>
-              <a:uFillTx/>
-              <a:latin typeface="Calibri" panose="020F0502020204030204"/>
-              <a:ea typeface="+mn-ea"/>
-              <a:cs typeface="+mn-cs"/>
-            </a:endParaRPr>
-          </a:p>
-        </p:txBody>
-      </p:sp>
-      <p:sp>
-        <p:nvSpPr>
-          <p:cNvPr id="2" name="Titre 1">
-            <a:extLst>
-              <a:ext uri="{FF2B5EF4-FFF2-40B4-BE49-F238E27FC236}">
-                <a16:creationId xmlns:a16="http://schemas.microsoft.com/office/drawing/2014/main" id="{AF54B093-63A8-4E77-8EF6-218285526E41}"/>
-              </a:ext>
-            </a:extLst>
-          </p:cNvPr>
-          <p:cNvSpPr>
-            <a:spLocks noGrp="1"/>
-          </p:cNvSpPr>
-          <p:nvPr>
-            <p:ph type="title"/>
-          </p:nvPr>
-        </p:nvSpPr>
-        <p:spPr>
-          <a:xfrm>
-            <a:off x="1046746" y="586822"/>
-            <a:ext cx="3560252" cy="1645920"/>
-          </a:xfrm>
-        </p:spPr>
-        <p:txBody>
-          <a:bodyPr>
-            <a:normAutofit/>
-          </a:bodyPr>
-          <a:lstStyle/>
-          <a:p>
-            <a:r>
-              <a:rPr lang="fr-FR" sz="3200"/>
-              <a:t>Le protocole NCP</a:t>
-            </a:r>
-            <a:br>
-              <a:rPr lang="fr-FR" sz="3200"/>
-            </a:br>
-            <a:endParaRPr lang="fr-FR" sz="3200"/>
-          </a:p>
-        </p:txBody>
-      </p:sp>
-      <p:sp>
-        <p:nvSpPr>
-          <p:cNvPr id="31" name="Rectangle 30">
-            <a:extLst>
-              <a:ext uri="{FF2B5EF4-FFF2-40B4-BE49-F238E27FC236}">
-                <a16:creationId xmlns:a16="http://schemas.microsoft.com/office/drawing/2014/main" id="{441CF7D6-A660-431A-B0BB-140A0D5556B6}"/>
-              </a:ext>
-              <a:ext uri="{C183D7F6-B498-43B3-948B-1728B52AA6E4}">
-                <adec:decorative xmlns:adec="http://schemas.microsoft.com/office/drawing/2017/decorative" val="1"/>
-              </a:ext>
-            </a:extLst>
-          </p:cNvPr>
-          <p:cNvSpPr>
-            <a:spLocks noGrp="1" noRot="1" noChangeAspect="1" noMove="1" noResize="1" noEditPoints="1" noAdjustHandles="1" noChangeArrowheads="1" noChangeShapeType="1" noTextEdit="1"/>
-          </p:cNvSpPr>
-          <p:nvPr>
-            <p:extLst>
-              <p:ext uri="{386F3935-93C4-4BCD-93E2-E3B085C9AB24}">
-                <p16:designElem xmlns:p16="http://schemas.microsoft.com/office/powerpoint/2015/main" val="1"/>
-              </p:ext>
-            </p:extLst>
-          </p:nvPr>
-        </p:nvSpPr>
-        <p:spPr>
-          <a:xfrm>
-            <a:off x="490408" y="1057739"/>
-            <a:ext cx="128016" cy="704088"/>
-          </a:xfrm>
-          <a:prstGeom prst="rect">
-            <a:avLst/>
-          </a:prstGeom>
+            <a:gdLst>
+              <a:gd name="connsiteX0" fmla="*/ 0 w 18288"/>
+              <a:gd name="connsiteY0" fmla="*/ 0 h 5590381"/>
+              <a:gd name="connsiteX1" fmla="*/ 18288 w 18288"/>
+              <a:gd name="connsiteY1" fmla="*/ 0 h 5590381"/>
+              <a:gd name="connsiteX2" fmla="*/ 18288 w 18288"/>
+              <a:gd name="connsiteY2" fmla="*/ 754701 h 5590381"/>
+              <a:gd name="connsiteX3" fmla="*/ 18288 w 18288"/>
+              <a:gd name="connsiteY3" fmla="*/ 1565307 h 5590381"/>
+              <a:gd name="connsiteX4" fmla="*/ 18288 w 18288"/>
+              <a:gd name="connsiteY4" fmla="*/ 2152297 h 5590381"/>
+              <a:gd name="connsiteX5" fmla="*/ 18288 w 18288"/>
+              <a:gd name="connsiteY5" fmla="*/ 2906998 h 5590381"/>
+              <a:gd name="connsiteX6" fmla="*/ 18288 w 18288"/>
+              <a:gd name="connsiteY6" fmla="*/ 3549892 h 5590381"/>
+              <a:gd name="connsiteX7" fmla="*/ 18288 w 18288"/>
+              <a:gd name="connsiteY7" fmla="*/ 4080978 h 5590381"/>
+              <a:gd name="connsiteX8" fmla="*/ 18288 w 18288"/>
+              <a:gd name="connsiteY8" fmla="*/ 4835680 h 5590381"/>
+              <a:gd name="connsiteX9" fmla="*/ 18288 w 18288"/>
+              <a:gd name="connsiteY9" fmla="*/ 5590381 h 5590381"/>
+              <a:gd name="connsiteX10" fmla="*/ 0 w 18288"/>
+              <a:gd name="connsiteY10" fmla="*/ 5590381 h 5590381"/>
+              <a:gd name="connsiteX11" fmla="*/ 0 w 18288"/>
+              <a:gd name="connsiteY11" fmla="*/ 4835680 h 5590381"/>
+              <a:gd name="connsiteX12" fmla="*/ 0 w 18288"/>
+              <a:gd name="connsiteY12" fmla="*/ 4304593 h 5590381"/>
+              <a:gd name="connsiteX13" fmla="*/ 0 w 18288"/>
+              <a:gd name="connsiteY13" fmla="*/ 3773507 h 5590381"/>
+              <a:gd name="connsiteX14" fmla="*/ 0 w 18288"/>
+              <a:gd name="connsiteY14" fmla="*/ 3186517 h 5590381"/>
+              <a:gd name="connsiteX15" fmla="*/ 0 w 18288"/>
+              <a:gd name="connsiteY15" fmla="*/ 2487720 h 5590381"/>
+              <a:gd name="connsiteX16" fmla="*/ 0 w 18288"/>
+              <a:gd name="connsiteY16" fmla="*/ 1956633 h 5590381"/>
+              <a:gd name="connsiteX17" fmla="*/ 0 w 18288"/>
+              <a:gd name="connsiteY17" fmla="*/ 1425547 h 5590381"/>
+              <a:gd name="connsiteX18" fmla="*/ 0 w 18288"/>
+              <a:gd name="connsiteY18" fmla="*/ 614942 h 5590381"/>
+              <a:gd name="connsiteX19" fmla="*/ 0 w 18288"/>
+              <a:gd name="connsiteY19" fmla="*/ 0 h 5590381"/>
+            </a:gdLst>
+            <a:ahLst/>
+            <a:cxnLst>
+              <a:cxn ang="0">
+                <a:pos x="connsiteX0" y="connsiteY0"/>
+              </a:cxn>
+              <a:cxn ang="0">
+                <a:pos x="connsiteX1" y="connsiteY1"/>
+              </a:cxn>
+              <a:cxn ang="0">
+                <a:pos x="connsiteX2" y="connsiteY2"/>
+              </a:cxn>
+              <a:cxn ang="0">
+                <a:pos x="connsiteX3" y="connsiteY3"/>
+              </a:cxn>
+              <a:cxn ang="0">
+                <a:pos x="connsiteX4" y="connsiteY4"/>
+              </a:cxn>
+              <a:cxn ang="0">
+                <a:pos x="connsiteX5" y="connsiteY5"/>
+              </a:cxn>
+              <a:cxn ang="0">
+                <a:pos x="connsiteX6" y="connsiteY6"/>
+              </a:cxn>
+              <a:cxn ang="0">
+                <a:pos x="connsiteX7" y="connsiteY7"/>
+              </a:cxn>
+              <a:cxn ang="0">
+                <a:pos x="connsiteX8" y="connsiteY8"/>
+              </a:cxn>
+              <a:cxn ang="0">
+                <a:pos x="connsiteX9" y="connsiteY9"/>
+              </a:cxn>
+              <a:cxn ang="0">
+                <a:pos x="connsiteX10" y="connsiteY10"/>
+              </a:cxn>
+              <a:cxn ang="0">
+                <a:pos x="connsiteX11" y="connsiteY11"/>
+              </a:cxn>
+              <a:cxn ang="0">
+                <a:pos x="connsiteX12" y="connsiteY12"/>
+              </a:cxn>
+              <a:cxn ang="0">
+                <a:pos x="connsiteX13" y="connsiteY13"/>
+              </a:cxn>
+              <a:cxn ang="0">
+                <a:pos x="connsiteX14" y="connsiteY14"/>
+              </a:cxn>
+              <a:cxn ang="0">
+                <a:pos x="connsiteX15" y="connsiteY15"/>
+              </a:cxn>
+              <a:cxn ang="0">
+                <a:pos x="connsiteX16" y="connsiteY16"/>
+              </a:cxn>
+              <a:cxn ang="0">
+                <a:pos x="connsiteX17" y="connsiteY17"/>
+              </a:cxn>
+              <a:cxn ang="0">
+                <a:pos x="connsiteX18" y="connsiteY18"/>
+              </a:cxn>
+              <a:cxn ang="0">
+                <a:pos x="connsiteX19" y="connsiteY19"/>
+              </a:cxn>
+            </a:cxnLst>
+            <a:rect l="l" t="t" r="r" b="b"/>
+            <a:pathLst>
+              <a:path w="18288" h="5590381" fill="none" extrusionOk="0">
+                <a:moveTo>
+                  <a:pt x="0" y="0"/>
+                </a:moveTo>
+                <a:cubicBezTo>
+                  <a:pt x="7726" y="-435"/>
+                  <a:pt x="14198" y="437"/>
+                  <a:pt x="18288" y="0"/>
+                </a:cubicBezTo>
+                <a:cubicBezTo>
+                  <a:pt x="-5226" y="225076"/>
+                  <a:pt x="46275" y="562283"/>
+                  <a:pt x="18288" y="754701"/>
+                </a:cubicBezTo>
+                <a:cubicBezTo>
+                  <a:pt x="-9699" y="947119"/>
+                  <a:pt x="30081" y="1239251"/>
+                  <a:pt x="18288" y="1565307"/>
+                </a:cubicBezTo>
+                <a:cubicBezTo>
+                  <a:pt x="6495" y="1891363"/>
+                  <a:pt x="7160" y="1999140"/>
+                  <a:pt x="18288" y="2152297"/>
+                </a:cubicBezTo>
+                <a:cubicBezTo>
+                  <a:pt x="29417" y="2305454"/>
+                  <a:pt x="28705" y="2598333"/>
+                  <a:pt x="18288" y="2906998"/>
+                </a:cubicBezTo>
+                <a:cubicBezTo>
+                  <a:pt x="7871" y="3215663"/>
+                  <a:pt x="35263" y="3327412"/>
+                  <a:pt x="18288" y="3549892"/>
+                </a:cubicBezTo>
+                <a:cubicBezTo>
+                  <a:pt x="1313" y="3772372"/>
+                  <a:pt x="38561" y="3843836"/>
+                  <a:pt x="18288" y="4080978"/>
+                </a:cubicBezTo>
+                <a:cubicBezTo>
+                  <a:pt x="-1985" y="4318120"/>
+                  <a:pt x="-3806" y="4511166"/>
+                  <a:pt x="18288" y="4835680"/>
+                </a:cubicBezTo>
+                <a:cubicBezTo>
+                  <a:pt x="40382" y="5160194"/>
+                  <a:pt x="-13070" y="5401748"/>
+                  <a:pt x="18288" y="5590381"/>
+                </a:cubicBezTo>
+                <a:cubicBezTo>
+                  <a:pt x="12010" y="5589863"/>
+                  <a:pt x="6799" y="5589982"/>
+                  <a:pt x="0" y="5590381"/>
+                </a:cubicBezTo>
+                <a:cubicBezTo>
+                  <a:pt x="-6480" y="5250523"/>
+                  <a:pt x="-32148" y="5052531"/>
+                  <a:pt x="0" y="4835680"/>
+                </a:cubicBezTo>
+                <a:cubicBezTo>
+                  <a:pt x="32148" y="4618829"/>
+                  <a:pt x="5352" y="4496374"/>
+                  <a:pt x="0" y="4304593"/>
+                </a:cubicBezTo>
+                <a:cubicBezTo>
+                  <a:pt x="-5352" y="4112812"/>
+                  <a:pt x="9645" y="3919423"/>
+                  <a:pt x="0" y="3773507"/>
+                </a:cubicBezTo>
+                <a:cubicBezTo>
+                  <a:pt x="-9645" y="3627591"/>
+                  <a:pt x="-10654" y="3330687"/>
+                  <a:pt x="0" y="3186517"/>
+                </a:cubicBezTo>
+                <a:cubicBezTo>
+                  <a:pt x="10654" y="3042347"/>
+                  <a:pt x="18181" y="2635923"/>
+                  <a:pt x="0" y="2487720"/>
+                </a:cubicBezTo>
+                <a:cubicBezTo>
+                  <a:pt x="-18181" y="2339517"/>
+                  <a:pt x="-7947" y="2113537"/>
+                  <a:pt x="0" y="1956633"/>
+                </a:cubicBezTo>
+                <a:cubicBezTo>
+                  <a:pt x="7947" y="1799729"/>
+                  <a:pt x="-15145" y="1657735"/>
+                  <a:pt x="0" y="1425547"/>
+                </a:cubicBezTo>
+                <a:cubicBezTo>
+                  <a:pt x="15145" y="1193359"/>
+                  <a:pt x="-23832" y="948054"/>
+                  <a:pt x="0" y="614942"/>
+                </a:cubicBezTo>
+                <a:cubicBezTo>
+                  <a:pt x="23832" y="281831"/>
+                  <a:pt x="2816" y="129878"/>
+                  <a:pt x="0" y="0"/>
+                </a:cubicBezTo>
+                <a:close/>
+              </a:path>
+              <a:path w="18288" h="5590381" stroke="0" extrusionOk="0">
+                <a:moveTo>
+                  <a:pt x="0" y="0"/>
+                </a:moveTo>
+                <a:cubicBezTo>
+                  <a:pt x="5871" y="848"/>
+                  <a:pt x="11713" y="-200"/>
+                  <a:pt x="18288" y="0"/>
+                </a:cubicBezTo>
+                <a:cubicBezTo>
+                  <a:pt x="41141" y="165299"/>
+                  <a:pt x="3613" y="427555"/>
+                  <a:pt x="18288" y="698798"/>
+                </a:cubicBezTo>
+                <a:cubicBezTo>
+                  <a:pt x="32963" y="970041"/>
+                  <a:pt x="19680" y="1226199"/>
+                  <a:pt x="18288" y="1397595"/>
+                </a:cubicBezTo>
+                <a:cubicBezTo>
+                  <a:pt x="16896" y="1568991"/>
+                  <a:pt x="38798" y="1794517"/>
+                  <a:pt x="18288" y="2152297"/>
+                </a:cubicBezTo>
+                <a:cubicBezTo>
+                  <a:pt x="-2222" y="2510077"/>
+                  <a:pt x="40846" y="2594424"/>
+                  <a:pt x="18288" y="2739287"/>
+                </a:cubicBezTo>
+                <a:cubicBezTo>
+                  <a:pt x="-4270" y="2884150"/>
+                  <a:pt x="27117" y="3129706"/>
+                  <a:pt x="18288" y="3493988"/>
+                </a:cubicBezTo>
+                <a:cubicBezTo>
+                  <a:pt x="9459" y="3858270"/>
+                  <a:pt x="54201" y="4041447"/>
+                  <a:pt x="18288" y="4304593"/>
+                </a:cubicBezTo>
+                <a:cubicBezTo>
+                  <a:pt x="-17625" y="4567740"/>
+                  <a:pt x="49627" y="5149125"/>
+                  <a:pt x="18288" y="5590381"/>
+                </a:cubicBezTo>
+                <a:cubicBezTo>
+                  <a:pt x="10860" y="5590744"/>
+                  <a:pt x="7568" y="5590157"/>
+                  <a:pt x="0" y="5590381"/>
+                </a:cubicBezTo>
+                <a:cubicBezTo>
+                  <a:pt x="36767" y="5266821"/>
+                  <a:pt x="-16223" y="5116146"/>
+                  <a:pt x="0" y="4835680"/>
+                </a:cubicBezTo>
+                <a:cubicBezTo>
+                  <a:pt x="16223" y="4555214"/>
+                  <a:pt x="-16316" y="4356490"/>
+                  <a:pt x="0" y="4136882"/>
+                </a:cubicBezTo>
+                <a:cubicBezTo>
+                  <a:pt x="16316" y="3917274"/>
+                  <a:pt x="8005" y="3773465"/>
+                  <a:pt x="0" y="3549892"/>
+                </a:cubicBezTo>
+                <a:cubicBezTo>
+                  <a:pt x="-8005" y="3326319"/>
+                  <a:pt x="27623" y="3052456"/>
+                  <a:pt x="0" y="2851094"/>
+                </a:cubicBezTo>
+                <a:cubicBezTo>
+                  <a:pt x="-27623" y="2649732"/>
+                  <a:pt x="5614" y="2455815"/>
+                  <a:pt x="0" y="2264104"/>
+                </a:cubicBezTo>
+                <a:cubicBezTo>
+                  <a:pt x="-5614" y="2072393"/>
+                  <a:pt x="22598" y="1990723"/>
+                  <a:pt x="0" y="1733018"/>
+                </a:cubicBezTo>
+                <a:cubicBezTo>
+                  <a:pt x="-22598" y="1475313"/>
+                  <a:pt x="-6965" y="1369123"/>
+                  <a:pt x="0" y="1090124"/>
+                </a:cubicBezTo>
+                <a:cubicBezTo>
+                  <a:pt x="6965" y="811125"/>
+                  <a:pt x="-19273" y="507044"/>
+                  <a:pt x="0" y="0"/>
+                </a:cubicBezTo>
+                <a:close/>
+              </a:path>
+            </a:pathLst>
+          </a:custGeom>
           <a:solidFill>
             <a:schemeClr val="accent2"/>
           </a:solidFill>
-          <a:ln>
-            <a:noFill/>
+          <a:ln w="41275" cap="rnd">
+            <a:solidFill>
+              <a:schemeClr val="accent2"/>
+            </a:solidFill>
+            <a:round/>
+            <a:extLst>
+              <a:ext uri="{C807C97D-BFC1-408E-A445-0C87EB9F89A2}">
+                <ask:lineSketchStyleProps xmlns:ask="http://schemas.microsoft.com/office/drawing/2018/sketchyshapes" sd="3114097614">
+                  <a:prstGeom prst="rect">
+                    <a:avLst/>
+                  </a:prstGeom>
+                  <ask:type>
+                    <ask:lineSketchFreehand/>
+                  </ask:type>
+                </ask:lineSketchStyleProps>
+              </a:ext>
+            </a:extLst>
           </a:ln>
         </p:spPr>
         <p:style>
@@ -15795,84 +16200,40 @@
           <a:lstStyle/>
           <a:p>
             <a:pPr algn="ctr"/>
-            <a:endParaRPr lang="en-US">
-              <a:solidFill>
-                <a:prstClr val="white"/>
-              </a:solidFill>
-              <a:latin typeface="Calibri" panose="020F0502020204030204"/>
-            </a:endParaRPr>
+            <a:endParaRPr lang="en-US"/>
           </a:p>
         </p:txBody>
       </p:sp>
-      <p:sp>
-        <p:nvSpPr>
-          <p:cNvPr id="33" name="Rectangle 32">
+      <p:pic>
+        <p:nvPicPr>
+          <p:cNvPr id="6" name="Espace réservé du contenu 5" descr="Une image contenant texte, capture d’écran, Police, ligne&#10;&#10;Description générée automatiquement">
             <a:extLst>
               <a:ext uri="{FF2B5EF4-FFF2-40B4-BE49-F238E27FC236}">
-                <a16:creationId xmlns:a16="http://schemas.microsoft.com/office/drawing/2014/main" id="{0570A85B-3810-4F95-97B0-CBF4CCDB381C}"/>
-              </a:ext>
-              <a:ext uri="{C183D7F6-B498-43B3-948B-1728B52AA6E4}">
-                <adec:decorative xmlns:adec="http://schemas.microsoft.com/office/drawing/2017/decorative" val="1"/>
+                <a16:creationId xmlns:a16="http://schemas.microsoft.com/office/drawing/2014/main" id="{4757A790-1D84-F453-2E0D-E6B25ECF696D}"/>
               </a:ext>
             </a:extLst>
           </p:cNvPr>
-          <p:cNvSpPr>
-            <a:spLocks noGrp="1" noRot="1" noChangeAspect="1" noMove="1" noResize="1" noEditPoints="1" noAdjustHandles="1" noChangeArrowheads="1" noChangeShapeType="1" noTextEdit="1"/>
-          </p:cNvSpPr>
-          <p:nvPr>
-            <p:extLst>
-              <p:ext uri="{386F3935-93C4-4BCD-93E2-E3B085C9AB24}">
-                <p16:designElem xmlns:p16="http://schemas.microsoft.com/office/powerpoint/2015/main" val="1"/>
-              </p:ext>
-            </p:extLst>
-          </p:nvPr>
-        </p:nvSpPr>
+          <p:cNvPicPr>
+            <a:picLocks noChangeAspect="1"/>
+          </p:cNvPicPr>
+          <p:nvPr/>
+        </p:nvPicPr>
+        <p:blipFill>
+          <a:blip r:embed="rId3"/>
+          <a:stretch>
+            <a:fillRect/>
+          </a:stretch>
+        </p:blipFill>
         <p:spPr>
-          <a:xfrm rot="5400000">
-            <a:off x="4243541" y="1400638"/>
-            <a:ext cx="1463040" cy="18288"/>
+          <a:xfrm>
+            <a:off x="4654296" y="2001713"/>
+            <a:ext cx="6894576" cy="1172078"/>
           </a:xfrm>
           <a:prstGeom prst="rect">
             <a:avLst/>
           </a:prstGeom>
-          <a:solidFill>
-            <a:srgbClr val="D5D5D5"/>
-          </a:solidFill>
-          <a:ln w="3175">
-            <a:noFill/>
-          </a:ln>
-          <a:effectLst/>
         </p:spPr>
-        <p:style>
-          <a:lnRef idx="2">
-            <a:schemeClr val="accent1">
-              <a:shade val="50000"/>
-            </a:schemeClr>
-          </a:lnRef>
-          <a:fillRef idx="1">
-            <a:schemeClr val="accent1"/>
-          </a:fillRef>
-          <a:effectRef idx="0">
-            <a:schemeClr val="accent1"/>
-          </a:effectRef>
-          <a:fontRef idx="minor">
-            <a:schemeClr val="lt1"/>
-          </a:fontRef>
-        </p:style>
-        <p:txBody>
-          <a:bodyPr rtlCol="0" anchor="ctr"/>
-          <a:lstStyle/>
-          <a:p>
-            <a:pPr algn="ctr"/>
-            <a:endParaRPr lang="en-US">
-              <a:solidFill>
-                <a:prstClr val="white"/>
-              </a:solidFill>
-              <a:latin typeface="Calibri" panose="020F0502020204030204"/>
-            </a:endParaRPr>
-          </a:p>
-        </p:txBody>
-      </p:sp>
+      </p:pic>
       <p:sp>
         <p:nvSpPr>
           <p:cNvPr id="28" name="Content Placeholder 9">
@@ -15891,30 +16252,30 @@
         </p:nvSpPr>
         <p:spPr>
           <a:xfrm>
-            <a:off x="5351164" y="586822"/>
-            <a:ext cx="6002636" cy="1645920"/>
+            <a:off x="4654296" y="4798577"/>
+            <a:ext cx="6894576" cy="1428487"/>
           </a:xfrm>
         </p:spPr>
         <p:txBody>
-          <a:bodyPr anchor="ctr">
+          <a:bodyPr anchor="t">
             <a:normAutofit/>
           </a:bodyPr>
           <a:lstStyle/>
           <a:p>
             <a:r>
-              <a:rPr lang="fr-FR" sz="1800">
+              <a:rPr lang="fr-FR" sz="1500">
                 <a:latin typeface="Arial" panose="020B0604020202020204" pitchFamily="34" charset="0"/>
               </a:rPr>
               <a:t>NCP est un protocole réseau intégré à PPP</a:t>
             </a:r>
-            <a:endParaRPr lang="fr-FR" sz="1800" b="0" i="0">
+            <a:endParaRPr lang="fr-FR" sz="1500" b="0" i="0">
               <a:effectLst/>
               <a:latin typeface="Arial" panose="020B0604020202020204" pitchFamily="34" charset="0"/>
             </a:endParaRPr>
           </a:p>
           <a:p>
             <a:r>
-              <a:rPr lang="fr-FR" sz="1800">
+              <a:rPr lang="fr-FR" sz="1500">
                 <a:effectLst/>
                 <a:latin typeface="Calibri" panose="020F0502020204030204" pitchFamily="34" charset="0"/>
                 <a:ea typeface="Calibri" panose="020F0502020204030204" pitchFamily="34" charset="0"/>
@@ -15922,7 +16283,7 @@
               </a:rPr>
               <a:t>Point to Point Protocol est un protocole de transmission par internet basé sur le HDLC</a:t>
             </a:r>
-            <a:endParaRPr lang="fr-FR" sz="1800" u="none" strike="noStrike">
+            <a:endParaRPr lang="fr-FR" sz="1500" u="none" strike="noStrike">
               <a:effectLst/>
               <a:latin typeface="Arial" panose="020B0604020202020204" pitchFamily="34" charset="0"/>
               <a:ea typeface="Calibri" panose="020F0502020204030204" pitchFamily="34" charset="0"/>
@@ -15931,7 +16292,7 @@
           </a:p>
           <a:p>
             <a:r>
-              <a:rPr lang="fr-FR" sz="1800" b="1" i="1">
+              <a:rPr lang="fr-FR" sz="1500" b="1" i="1">
                 <a:effectLst/>
                 <a:latin typeface="Arial" panose="020B0604020202020204" pitchFamily="34" charset="0"/>
                 <a:ea typeface="Calibri" panose="020F0502020204030204" pitchFamily="34" charset="0"/>
@@ -15939,31 +16300,15 @@
               <a:t>H</a:t>
             </a:r>
             <a:r>
-              <a:rPr lang="fr-FR" sz="1800" i="1">
+              <a:rPr lang="fr-FR" sz="1500" i="1">
                 <a:effectLst/>
                 <a:latin typeface="Arial" panose="020B0604020202020204" pitchFamily="34" charset="0"/>
                 <a:ea typeface="Calibri" panose="020F0502020204030204" pitchFamily="34" charset="0"/>
               </a:rPr>
-              <a:t>igh-</a:t>
-            </a:r>
-            <a:r>
-              <a:rPr lang="fr-FR" sz="1800" i="1" err="1">
-                <a:effectLst/>
-                <a:latin typeface="Arial" panose="020B0604020202020204" pitchFamily="34" charset="0"/>
-                <a:ea typeface="Calibri" panose="020F0502020204030204" pitchFamily="34" charset="0"/>
-              </a:rPr>
-              <a:t>Level</a:t>
-            </a:r>
-            <a:r>
-              <a:rPr lang="fr-FR" sz="1800" i="1">
-                <a:effectLst/>
-                <a:latin typeface="Arial" panose="020B0604020202020204" pitchFamily="34" charset="0"/>
-                <a:ea typeface="Calibri" panose="020F0502020204030204" pitchFamily="34" charset="0"/>
-              </a:rPr>
-              <a:t> </a:t>
-            </a:r>
-            <a:r>
-              <a:rPr lang="fr-FR" sz="1800" b="1" i="1">
+              <a:t>igh-Level </a:t>
+            </a:r>
+            <a:r>
+              <a:rPr lang="fr-FR" sz="1500" b="1" i="1">
                 <a:effectLst/>
                 <a:latin typeface="Arial" panose="020B0604020202020204" pitchFamily="34" charset="0"/>
                 <a:ea typeface="Calibri" panose="020F0502020204030204" pitchFamily="34" charset="0"/>
@@ -15971,7 +16316,7 @@
               <a:t>D</a:t>
             </a:r>
             <a:r>
-              <a:rPr lang="fr-FR" sz="1800" i="1">
+              <a:rPr lang="fr-FR" sz="1500" i="1">
                 <a:effectLst/>
                 <a:latin typeface="Arial" panose="020B0604020202020204" pitchFamily="34" charset="0"/>
                 <a:ea typeface="Calibri" panose="020F0502020204030204" pitchFamily="34" charset="0"/>
@@ -15979,7 +16324,7 @@
               <a:t>ata </a:t>
             </a:r>
             <a:r>
-              <a:rPr lang="fr-FR" sz="1800" b="1" i="1">
+              <a:rPr lang="fr-FR" sz="1500" b="1" i="1">
                 <a:effectLst/>
                 <a:latin typeface="Arial" panose="020B0604020202020204" pitchFamily="34" charset="0"/>
                 <a:ea typeface="Calibri" panose="020F0502020204030204" pitchFamily="34" charset="0"/>
@@ -15987,7 +16332,7 @@
               <a:t>L</a:t>
             </a:r>
             <a:r>
-              <a:rPr lang="fr-FR" sz="1800" i="1">
+              <a:rPr lang="fr-FR" sz="1500" i="1">
                 <a:effectLst/>
                 <a:latin typeface="Arial" panose="020B0604020202020204" pitchFamily="34" charset="0"/>
                 <a:ea typeface="Calibri" panose="020F0502020204030204" pitchFamily="34" charset="0"/>
@@ -15995,7 +16340,7 @@
               <a:t>ink </a:t>
             </a:r>
             <a:r>
-              <a:rPr lang="fr-FR" sz="1800" b="1" i="1">
+              <a:rPr lang="fr-FR" sz="1500" b="1" i="1">
                 <a:effectLst/>
                 <a:latin typeface="Arial" panose="020B0604020202020204" pitchFamily="34" charset="0"/>
                 <a:ea typeface="Calibri" panose="020F0502020204030204" pitchFamily="34" charset="0"/>
@@ -16003,7 +16348,7 @@
               <a:t>C</a:t>
             </a:r>
             <a:r>
-              <a:rPr lang="fr-FR" sz="1800" i="1">
+              <a:rPr lang="fr-FR" sz="1500" i="1">
                 <a:effectLst/>
                 <a:latin typeface="Arial" panose="020B0604020202020204" pitchFamily="34" charset="0"/>
                 <a:ea typeface="Calibri" panose="020F0502020204030204" pitchFamily="34" charset="0"/>
@@ -16011,47 +16356,17 @@
               <a:t>ontrol</a:t>
             </a:r>
             <a:r>
-              <a:rPr lang="fr-FR" sz="1800">
+              <a:rPr lang="fr-FR" sz="1500">
                 <a:effectLst/>
                 <a:latin typeface="Arial" panose="020B0604020202020204" pitchFamily="34" charset="0"/>
                 <a:ea typeface="Calibri" panose="020F0502020204030204" pitchFamily="34" charset="0"/>
               </a:rPr>
               <a:t> est un protocole de niveau 2 du Modèle OSI.</a:t>
             </a:r>
-            <a:endParaRPr lang="en-US" sz="1800"/>
+            <a:endParaRPr lang="en-US" sz="1500"/>
           </a:p>
         </p:txBody>
       </p:sp>
-      <p:pic>
-        <p:nvPicPr>
-          <p:cNvPr id="6" name="Espace réservé du contenu 5" descr="Une image contenant texte, capture d’écran, Police, ligne&#10;&#10;Description générée automatiquement">
-            <a:extLst>
-              <a:ext uri="{FF2B5EF4-FFF2-40B4-BE49-F238E27FC236}">
-                <a16:creationId xmlns:a16="http://schemas.microsoft.com/office/drawing/2014/main" id="{4757A790-1D84-F453-2E0D-E6B25ECF696D}"/>
-              </a:ext>
-            </a:extLst>
-          </p:cNvPr>
-          <p:cNvPicPr>
-            <a:picLocks noChangeAspect="1"/>
-          </p:cNvPicPr>
-          <p:nvPr/>
-        </p:nvPicPr>
-        <p:blipFill>
-          <a:blip r:embed="rId2"/>
-          <a:stretch>
-            <a:fillRect/>
-          </a:stretch>
-        </p:blipFill>
-        <p:spPr>
-          <a:xfrm>
-            <a:off x="557784" y="3526978"/>
-            <a:ext cx="11164824" cy="1898020"/>
-          </a:xfrm>
-          <a:prstGeom prst="rect">
-            <a:avLst/>
-          </a:prstGeom>
-        </p:spPr>
-      </p:pic>
     </p:spTree>
     <p:extLst>
       <p:ext uri="{BB962C8B-B14F-4D97-AF65-F5344CB8AC3E}">
@@ -20876,18 +21191,8 @@
               <a:rPr lang="en-US" sz="1400" noProof="1">
                 <a:sym typeface="Wingdings"/>
               </a:rPr>
-              <a:t>Guerre</a:t>
-            </a:r>
-            <a:r>
-              <a:rPr lang="en-US" sz="1400" noProof="1"/>
-              <a:t> Froide et intensification des efforts de recherche et développement militaire aux États-Unis</a:t>
-            </a:r>
-            <a:endParaRPr lang="en-US" sz="1400">
-              <a:cs typeface="Calibri"/>
-            </a:endParaRPr>
-          </a:p>
-          <a:p>
-            <a:pPr algn="l"/>
+              <a:t>Situation de la Guerre Froide</a:t>
+            </a:r>
             <a:endParaRPr lang="en-US" sz="1400" noProof="1">
               <a:cs typeface="Calibri"/>
             </a:endParaRPr>
@@ -20932,7 +21237,7 @@
             </a:r>
             <a:r>
               <a:rPr lang="en-US" sz="1400" noProof="1"/>
-              <a:t> Emergence des premiers acteurs et acteurs-réseaux,</a:t>
+              <a:t> Emergence des premiers acteurs et acteurs-réseaux</a:t>
             </a:r>
             <a:endParaRPr lang="en-US" sz="1400" noProof="1">
               <a:cs typeface="Calibri"/>
@@ -20991,6 +21296,516 @@
 </file>
 
 <file path=ppt/slides/slide3.xml><?xml version="1.0" encoding="utf-8"?>
+<p:sld xmlns:a="http://schemas.openxmlformats.org/drawingml/2006/main" xmlns:r="http://schemas.openxmlformats.org/officeDocument/2006/relationships" xmlns:p="http://schemas.openxmlformats.org/presentationml/2006/main">
+  <p:cSld>
+    <p:bg>
+      <p:bgPr>
+        <a:solidFill>
+          <a:schemeClr val="bg1"/>
+        </a:solidFill>
+        <a:effectLst/>
+      </p:bgPr>
+    </p:bg>
+    <p:spTree>
+      <p:nvGrpSpPr>
+        <p:cNvPr id="1" name=""/>
+        <p:cNvGrpSpPr/>
+        <p:nvPr/>
+      </p:nvGrpSpPr>
+      <p:grpSpPr>
+        <a:xfrm>
+          <a:off x="0" y="0"/>
+          <a:ext cx="0" cy="0"/>
+          <a:chOff x="0" y="0"/>
+          <a:chExt cx="0" cy="0"/>
+        </a:xfrm>
+      </p:grpSpPr>
+      <p:sp useBgFill="1">
+        <p:nvSpPr>
+          <p:cNvPr id="9" name="Rectangle 8">
+            <a:extLst>
+              <a:ext uri="{FF2B5EF4-FFF2-40B4-BE49-F238E27FC236}">
+                <a16:creationId xmlns:a16="http://schemas.microsoft.com/office/drawing/2014/main" id="{743AA782-23D1-4521-8CAD-47662984AA08}"/>
+              </a:ext>
+              <a:ext uri="{C183D7F6-B498-43B3-948B-1728B52AA6E4}">
+                <adec:decorative xmlns:adec="http://schemas.microsoft.com/office/drawing/2017/decorative" val="1"/>
+              </a:ext>
+            </a:extLst>
+          </p:cNvPr>
+          <p:cNvSpPr>
+            <a:spLocks noGrp="1" noRot="1" noChangeAspect="1" noMove="1" noResize="1" noEditPoints="1" noAdjustHandles="1" noChangeArrowheads="1" noChangeShapeType="1" noTextEdit="1"/>
+          </p:cNvSpPr>
+          <p:nvPr>
+            <p:extLst>
+              <p:ext uri="{386F3935-93C4-4BCD-93E2-E3B085C9AB24}">
+                <p16:designElem xmlns:p16="http://schemas.microsoft.com/office/powerpoint/2015/main" val="1"/>
+              </p:ext>
+            </p:extLst>
+          </p:nvPr>
+        </p:nvSpPr>
+        <p:spPr>
+          <a:xfrm>
+            <a:off x="0" y="0"/>
+            <a:ext cx="12192000" cy="6858000"/>
+          </a:xfrm>
+          <a:prstGeom prst="rect">
+            <a:avLst/>
+          </a:prstGeom>
+          <a:ln>
+            <a:noFill/>
+          </a:ln>
+        </p:spPr>
+        <p:style>
+          <a:lnRef idx="2">
+            <a:schemeClr val="accent1">
+              <a:shade val="50000"/>
+            </a:schemeClr>
+          </a:lnRef>
+          <a:fillRef idx="1">
+            <a:schemeClr val="accent1"/>
+          </a:fillRef>
+          <a:effectRef idx="0">
+            <a:schemeClr val="accent1"/>
+          </a:effectRef>
+          <a:fontRef idx="minor">
+            <a:schemeClr val="lt1"/>
+          </a:fontRef>
+        </p:style>
+        <p:txBody>
+          <a:bodyPr rtlCol="0" anchor="ctr"/>
+          <a:lstStyle/>
+          <a:p>
+            <a:pPr algn="ctr"/>
+            <a:endParaRPr lang="en-US"/>
+          </a:p>
+        </p:txBody>
+      </p:sp>
+      <p:sp>
+        <p:nvSpPr>
+          <p:cNvPr id="2" name="Titre 1">
+            <a:extLst>
+              <a:ext uri="{FF2B5EF4-FFF2-40B4-BE49-F238E27FC236}">
+                <a16:creationId xmlns:a16="http://schemas.microsoft.com/office/drawing/2014/main" id="{B8A5D022-49CD-F031-5CF4-E6BD0CDE50BF}"/>
+              </a:ext>
+            </a:extLst>
+          </p:cNvPr>
+          <p:cNvSpPr>
+            <a:spLocks noGrp="1"/>
+          </p:cNvSpPr>
+          <p:nvPr>
+            <p:ph type="title"/>
+          </p:nvPr>
+        </p:nvSpPr>
+        <p:spPr>
+          <a:xfrm>
+            <a:off x="630936" y="640080"/>
+            <a:ext cx="4818888" cy="1481328"/>
+          </a:xfrm>
+        </p:spPr>
+        <p:txBody>
+          <a:bodyPr anchor="b">
+            <a:normAutofit/>
+          </a:bodyPr>
+          <a:lstStyle/>
+          <a:p>
+            <a:r>
+              <a:rPr lang="fr-FR" sz="4600">
+                <a:cs typeface="Calibri Light"/>
+              </a:rPr>
+              <a:t>Objectif du projet ARPANET</a:t>
+            </a:r>
+            <a:endParaRPr lang="fr-FR" sz="4600"/>
+          </a:p>
+        </p:txBody>
+      </p:sp>
+      <p:sp>
+        <p:nvSpPr>
+          <p:cNvPr id="11" name="sketch line">
+            <a:extLst>
+              <a:ext uri="{FF2B5EF4-FFF2-40B4-BE49-F238E27FC236}">
+                <a16:creationId xmlns:a16="http://schemas.microsoft.com/office/drawing/2014/main" id="{71877DBC-BB60-40F0-AC93-2ACDBAAE60CE}"/>
+              </a:ext>
+              <a:ext uri="{C183D7F6-B498-43B3-948B-1728B52AA6E4}">
+                <adec:decorative xmlns:adec="http://schemas.microsoft.com/office/drawing/2017/decorative" val="1"/>
+              </a:ext>
+            </a:extLst>
+          </p:cNvPr>
+          <p:cNvSpPr>
+            <a:spLocks noGrp="1" noRot="1" noChangeAspect="1" noMove="1" noResize="1" noEditPoints="1" noAdjustHandles="1" noChangeArrowheads="1" noChangeShapeType="1" noTextEdit="1"/>
+          </p:cNvSpPr>
+          <p:nvPr>
+            <p:extLst>
+              <p:ext uri="{386F3935-93C4-4BCD-93E2-E3B085C9AB24}">
+                <p16:designElem xmlns:p16="http://schemas.microsoft.com/office/powerpoint/2015/main" val="1"/>
+              </p:ext>
+            </p:extLst>
+          </p:nvPr>
+        </p:nvSpPr>
+        <p:spPr>
+          <a:xfrm>
+            <a:off x="643278" y="2372868"/>
+            <a:ext cx="3255095" cy="18288"/>
+          </a:xfrm>
+          <a:custGeom>
+            <a:avLst/>
+            <a:gdLst>
+              <a:gd name="connsiteX0" fmla="*/ 0 w 3255095"/>
+              <a:gd name="connsiteY0" fmla="*/ 0 h 18288"/>
+              <a:gd name="connsiteX1" fmla="*/ 618468 w 3255095"/>
+              <a:gd name="connsiteY1" fmla="*/ 0 h 18288"/>
+              <a:gd name="connsiteX2" fmla="*/ 1269487 w 3255095"/>
+              <a:gd name="connsiteY2" fmla="*/ 0 h 18288"/>
+              <a:gd name="connsiteX3" fmla="*/ 1953057 w 3255095"/>
+              <a:gd name="connsiteY3" fmla="*/ 0 h 18288"/>
+              <a:gd name="connsiteX4" fmla="*/ 2636627 w 3255095"/>
+              <a:gd name="connsiteY4" fmla="*/ 0 h 18288"/>
+              <a:gd name="connsiteX5" fmla="*/ 3255095 w 3255095"/>
+              <a:gd name="connsiteY5" fmla="*/ 0 h 18288"/>
+              <a:gd name="connsiteX6" fmla="*/ 3255095 w 3255095"/>
+              <a:gd name="connsiteY6" fmla="*/ 18288 h 18288"/>
+              <a:gd name="connsiteX7" fmla="*/ 2538974 w 3255095"/>
+              <a:gd name="connsiteY7" fmla="*/ 18288 h 18288"/>
+              <a:gd name="connsiteX8" fmla="*/ 1822853 w 3255095"/>
+              <a:gd name="connsiteY8" fmla="*/ 18288 h 18288"/>
+              <a:gd name="connsiteX9" fmla="*/ 1171834 w 3255095"/>
+              <a:gd name="connsiteY9" fmla="*/ 18288 h 18288"/>
+              <a:gd name="connsiteX10" fmla="*/ 0 w 3255095"/>
+              <a:gd name="connsiteY10" fmla="*/ 18288 h 18288"/>
+              <a:gd name="connsiteX11" fmla="*/ 0 w 3255095"/>
+              <a:gd name="connsiteY11" fmla="*/ 0 h 18288"/>
+            </a:gdLst>
+            <a:ahLst/>
+            <a:cxnLst>
+              <a:cxn ang="0">
+                <a:pos x="connsiteX0" y="connsiteY0"/>
+              </a:cxn>
+              <a:cxn ang="0">
+                <a:pos x="connsiteX1" y="connsiteY1"/>
+              </a:cxn>
+              <a:cxn ang="0">
+                <a:pos x="connsiteX2" y="connsiteY2"/>
+              </a:cxn>
+              <a:cxn ang="0">
+                <a:pos x="connsiteX3" y="connsiteY3"/>
+              </a:cxn>
+              <a:cxn ang="0">
+                <a:pos x="connsiteX4" y="connsiteY4"/>
+              </a:cxn>
+              <a:cxn ang="0">
+                <a:pos x="connsiteX5" y="connsiteY5"/>
+              </a:cxn>
+              <a:cxn ang="0">
+                <a:pos x="connsiteX6" y="connsiteY6"/>
+              </a:cxn>
+              <a:cxn ang="0">
+                <a:pos x="connsiteX7" y="connsiteY7"/>
+              </a:cxn>
+              <a:cxn ang="0">
+                <a:pos x="connsiteX8" y="connsiteY8"/>
+              </a:cxn>
+              <a:cxn ang="0">
+                <a:pos x="connsiteX9" y="connsiteY9"/>
+              </a:cxn>
+              <a:cxn ang="0">
+                <a:pos x="connsiteX10" y="connsiteY10"/>
+              </a:cxn>
+              <a:cxn ang="0">
+                <a:pos x="connsiteX11" y="connsiteY11"/>
+              </a:cxn>
+            </a:cxnLst>
+            <a:rect l="l" t="t" r="r" b="b"/>
+            <a:pathLst>
+              <a:path w="3255095" h="18288" fill="none" extrusionOk="0">
+                <a:moveTo>
+                  <a:pt x="0" y="0"/>
+                </a:moveTo>
+                <a:cubicBezTo>
+                  <a:pt x="240201" y="-22123"/>
+                  <a:pt x="462021" y="-19623"/>
+                  <a:pt x="618468" y="0"/>
+                </a:cubicBezTo>
+                <a:cubicBezTo>
+                  <a:pt x="774915" y="19623"/>
+                  <a:pt x="974734" y="2035"/>
+                  <a:pt x="1269487" y="0"/>
+                </a:cubicBezTo>
+                <a:cubicBezTo>
+                  <a:pt x="1564240" y="-2035"/>
+                  <a:pt x="1733579" y="10639"/>
+                  <a:pt x="1953057" y="0"/>
+                </a:cubicBezTo>
+                <a:cubicBezTo>
+                  <a:pt x="2172535" y="-10639"/>
+                  <a:pt x="2453962" y="14018"/>
+                  <a:pt x="2636627" y="0"/>
+                </a:cubicBezTo>
+                <a:cubicBezTo>
+                  <a:pt x="2819292" y="-14018"/>
+                  <a:pt x="3121375" y="5399"/>
+                  <a:pt x="3255095" y="0"/>
+                </a:cubicBezTo>
+                <a:cubicBezTo>
+                  <a:pt x="3254386" y="8157"/>
+                  <a:pt x="3254682" y="12125"/>
+                  <a:pt x="3255095" y="18288"/>
+                </a:cubicBezTo>
+                <a:cubicBezTo>
+                  <a:pt x="3088545" y="23203"/>
+                  <a:pt x="2687475" y="7419"/>
+                  <a:pt x="2538974" y="18288"/>
+                </a:cubicBezTo>
+                <a:cubicBezTo>
+                  <a:pt x="2390473" y="29157"/>
+                  <a:pt x="2137381" y="-8959"/>
+                  <a:pt x="1822853" y="18288"/>
+                </a:cubicBezTo>
+                <a:cubicBezTo>
+                  <a:pt x="1508325" y="45535"/>
+                  <a:pt x="1466437" y="20385"/>
+                  <a:pt x="1171834" y="18288"/>
+                </a:cubicBezTo>
+                <a:cubicBezTo>
+                  <a:pt x="877231" y="16191"/>
+                  <a:pt x="561097" y="37643"/>
+                  <a:pt x="0" y="18288"/>
+                </a:cubicBezTo>
+                <a:cubicBezTo>
+                  <a:pt x="-46" y="12483"/>
+                  <a:pt x="-203" y="6491"/>
+                  <a:pt x="0" y="0"/>
+                </a:cubicBezTo>
+                <a:close/>
+              </a:path>
+              <a:path w="3255095" h="18288" stroke="0" extrusionOk="0">
+                <a:moveTo>
+                  <a:pt x="0" y="0"/>
+                </a:moveTo>
+                <a:cubicBezTo>
+                  <a:pt x="291965" y="19429"/>
+                  <a:pt x="363155" y="8568"/>
+                  <a:pt x="618468" y="0"/>
+                </a:cubicBezTo>
+                <a:cubicBezTo>
+                  <a:pt x="873781" y="-8568"/>
+                  <a:pt x="904459" y="-19505"/>
+                  <a:pt x="1171834" y="0"/>
+                </a:cubicBezTo>
+                <a:cubicBezTo>
+                  <a:pt x="1439209" y="19505"/>
+                  <a:pt x="1744369" y="9790"/>
+                  <a:pt x="1887955" y="0"/>
+                </a:cubicBezTo>
+                <a:cubicBezTo>
+                  <a:pt x="2031541" y="-9790"/>
+                  <a:pt x="2346378" y="21240"/>
+                  <a:pt x="2506423" y="0"/>
+                </a:cubicBezTo>
+                <a:cubicBezTo>
+                  <a:pt x="2666468" y="-21240"/>
+                  <a:pt x="2990257" y="30414"/>
+                  <a:pt x="3255095" y="0"/>
+                </a:cubicBezTo>
+                <a:cubicBezTo>
+                  <a:pt x="3254831" y="4493"/>
+                  <a:pt x="3255479" y="9472"/>
+                  <a:pt x="3255095" y="18288"/>
+                </a:cubicBezTo>
+                <a:cubicBezTo>
+                  <a:pt x="3120743" y="16690"/>
+                  <a:pt x="2759628" y="42462"/>
+                  <a:pt x="2604076" y="18288"/>
+                </a:cubicBezTo>
+                <a:cubicBezTo>
+                  <a:pt x="2448524" y="-5886"/>
+                  <a:pt x="2184336" y="19599"/>
+                  <a:pt x="1887955" y="18288"/>
+                </a:cubicBezTo>
+                <a:cubicBezTo>
+                  <a:pt x="1591574" y="16977"/>
+                  <a:pt x="1548845" y="6870"/>
+                  <a:pt x="1334589" y="18288"/>
+                </a:cubicBezTo>
+                <a:cubicBezTo>
+                  <a:pt x="1120333" y="29706"/>
+                  <a:pt x="996014" y="9662"/>
+                  <a:pt x="683570" y="18288"/>
+                </a:cubicBezTo>
+                <a:cubicBezTo>
+                  <a:pt x="371126" y="26914"/>
+                  <a:pt x="198687" y="16167"/>
+                  <a:pt x="0" y="18288"/>
+                </a:cubicBezTo>
+                <a:cubicBezTo>
+                  <a:pt x="843" y="9577"/>
+                  <a:pt x="371" y="6900"/>
+                  <a:pt x="0" y="0"/>
+                </a:cubicBezTo>
+                <a:close/>
+              </a:path>
+            </a:pathLst>
+          </a:custGeom>
+          <a:solidFill>
+            <a:schemeClr val="accent2"/>
+          </a:solidFill>
+          <a:ln w="38100" cap="rnd">
+            <a:solidFill>
+              <a:schemeClr val="accent2"/>
+            </a:solidFill>
+            <a:round/>
+            <a:extLst>
+              <a:ext uri="{C807C97D-BFC1-408E-A445-0C87EB9F89A2}">
+                <ask:lineSketchStyleProps xmlns:ask="http://schemas.microsoft.com/office/drawing/2018/sketchyshapes" sd="1219033472">
+                  <a:prstGeom prst="rect">
+                    <a:avLst/>
+                  </a:prstGeom>
+                  <ask:type>
+                    <ask:lineSketchFreehand/>
+                  </ask:type>
+                </ask:lineSketchStyleProps>
+              </a:ext>
+            </a:extLst>
+          </a:ln>
+        </p:spPr>
+        <p:style>
+          <a:lnRef idx="2">
+            <a:schemeClr val="accent1">
+              <a:shade val="50000"/>
+            </a:schemeClr>
+          </a:lnRef>
+          <a:fillRef idx="1">
+            <a:schemeClr val="accent1"/>
+          </a:fillRef>
+          <a:effectRef idx="0">
+            <a:schemeClr val="accent1"/>
+          </a:effectRef>
+          <a:fontRef idx="minor">
+            <a:schemeClr val="lt1"/>
+          </a:fontRef>
+        </p:style>
+        <p:txBody>
+          <a:bodyPr rtlCol="0" anchor="ctr"/>
+          <a:lstStyle/>
+          <a:p>
+            <a:pPr algn="ctr"/>
+            <a:endParaRPr lang="en-US"/>
+          </a:p>
+        </p:txBody>
+      </p:sp>
+      <p:sp>
+        <p:nvSpPr>
+          <p:cNvPr id="3" name="Espace réservé du contenu 2">
+            <a:extLst>
+              <a:ext uri="{FF2B5EF4-FFF2-40B4-BE49-F238E27FC236}">
+                <a16:creationId xmlns:a16="http://schemas.microsoft.com/office/drawing/2014/main" id="{7B84777B-C837-DD2A-B516-875BC7CD4784}"/>
+              </a:ext>
+            </a:extLst>
+          </p:cNvPr>
+          <p:cNvSpPr>
+            <a:spLocks noGrp="1"/>
+          </p:cNvSpPr>
+          <p:nvPr>
+            <p:ph idx="1"/>
+          </p:nvPr>
+        </p:nvSpPr>
+        <p:spPr>
+          <a:xfrm>
+            <a:off x="630936" y="2660904"/>
+            <a:ext cx="4818888" cy="3547872"/>
+          </a:xfrm>
+        </p:spPr>
+        <p:txBody>
+          <a:bodyPr vert="horz" lIns="91440" tIns="45720" rIns="91440" bIns="45720" rtlCol="0" anchor="t">
+            <a:normAutofit/>
+          </a:bodyPr>
+          <a:lstStyle/>
+          <a:p>
+            <a:r>
+              <a:rPr lang="fr-FR" sz="1400">
+                <a:cs typeface="Calibri"/>
+              </a:rPr>
+              <a:t>Un projet de réseau civil entre des universités (chercheurs)</a:t>
+            </a:r>
+          </a:p>
+          <a:p>
+            <a:r>
+              <a:rPr lang="fr-FR" sz="1400">
+                <a:cs typeface="Calibri"/>
+              </a:rPr>
+              <a:t>Découverte du projet par l’armée:</a:t>
+            </a:r>
+          </a:p>
+          <a:p>
+            <a:pPr lvl="1"/>
+            <a:r>
+              <a:rPr lang="fr-FR" sz="1000">
+                <a:cs typeface="Calibri"/>
+              </a:rPr>
+              <a:t>Volonté du Pentagone de développer un système de communication résistant en cas d’attaque (résilience)</a:t>
+            </a:r>
+          </a:p>
+          <a:p>
+            <a:pPr lvl="1"/>
+            <a:r>
+              <a:rPr lang="fr-FR" sz="1000">
+                <a:cs typeface="Calibri"/>
+              </a:rPr>
+              <a:t>Le rendre évolutif (Résilience du réseau)</a:t>
+            </a:r>
+          </a:p>
+          <a:p>
+            <a:pPr marL="0" indent="0">
+              <a:buNone/>
+            </a:pPr>
+            <a:endParaRPr lang="fr-FR" sz="1400">
+              <a:cs typeface="Calibri"/>
+            </a:endParaRPr>
+          </a:p>
+        </p:txBody>
+      </p:sp>
+      <p:pic>
+        <p:nvPicPr>
+          <p:cNvPr id="4" name="Image 3" descr="Une image contenant logo, Graphique, conception&#10;&#10;Description générée automatiquement">
+            <a:extLst>
+              <a:ext uri="{FF2B5EF4-FFF2-40B4-BE49-F238E27FC236}">
+                <a16:creationId xmlns:a16="http://schemas.microsoft.com/office/drawing/2014/main" id="{450FFC09-1AB2-F2B8-623A-DAC22C955732}"/>
+              </a:ext>
+            </a:extLst>
+          </p:cNvPr>
+          <p:cNvPicPr>
+            <a:picLocks noChangeAspect="1"/>
+          </p:cNvPicPr>
+          <p:nvPr/>
+        </p:nvPicPr>
+        <p:blipFill>
+          <a:blip r:embed="rId2"/>
+          <a:stretch>
+            <a:fillRect/>
+          </a:stretch>
+        </p:blipFill>
+        <p:spPr>
+          <a:xfrm>
+            <a:off x="6089754" y="1910725"/>
+            <a:ext cx="5458968" cy="3036550"/>
+          </a:xfrm>
+          <a:prstGeom prst="rect">
+            <a:avLst/>
+          </a:prstGeom>
+        </p:spPr>
+      </p:pic>
+    </p:spTree>
+    <p:extLst>
+      <p:ext uri="{BB962C8B-B14F-4D97-AF65-F5344CB8AC3E}">
+        <p14:creationId xmlns:p14="http://schemas.microsoft.com/office/powerpoint/2010/main" val="3921660627"/>
+      </p:ext>
+    </p:extLst>
+  </p:cSld>
+  <p:clrMapOvr>
+    <a:masterClrMapping/>
+  </p:clrMapOvr>
+</p:sld>
+</file>
+
+<file path=ppt/slides/slide4.xml><?xml version="1.0" encoding="utf-8"?>
 <p:sld xmlns:a="http://schemas.openxmlformats.org/drawingml/2006/main" xmlns:r="http://schemas.openxmlformats.org/officeDocument/2006/relationships" xmlns:p="http://schemas.openxmlformats.org/presentationml/2006/main">
   <p:cSld>
     <p:bg>
@@ -21454,20 +22269,6 @@
             </a:pPr>
             <a:r>
               <a:rPr lang="en-US" sz="1400" noProof="1"/>
-              <a:t> J.C.R. Licklider (1915,1990) : Docteur en psychologie, se reconvertit dans la recherche en informatique </a:t>
-            </a:r>
-            <a:endParaRPr lang="en-US" sz="1400" noProof="1">
-              <a:ea typeface="Calibri"/>
-              <a:cs typeface="Calibri"/>
-            </a:endParaRPr>
-          </a:p>
-          <a:p>
-            <a:pPr indent="-228600" algn="l">
-              <a:buFont typeface="Arial" panose="020B0604020202020204" pitchFamily="34" charset="0"/>
-              <a:buChar char="•"/>
-            </a:pPr>
-            <a:r>
-              <a:rPr lang="en-US" sz="1400" noProof="1"/>
               <a:t>Auteur d' un article visionnaire intitulé "Man-Computer Symbiosis</a:t>
             </a:r>
             <a:endParaRPr lang="en-US" sz="1400" noProof="1">
@@ -21705,522 +22506,6 @@
     <p:extLst>
       <p:ext uri="{BB962C8B-B14F-4D97-AF65-F5344CB8AC3E}">
         <p14:creationId xmlns:p14="http://schemas.microsoft.com/office/powerpoint/2010/main" val="406620325"/>
-      </p:ext>
-    </p:extLst>
-  </p:cSld>
-  <p:clrMapOvr>
-    <a:masterClrMapping/>
-  </p:clrMapOvr>
-</p:sld>
-</file>
-
-<file path=ppt/slides/slide4.xml><?xml version="1.0" encoding="utf-8"?>
-<p:sld xmlns:a="http://schemas.openxmlformats.org/drawingml/2006/main" xmlns:r="http://schemas.openxmlformats.org/officeDocument/2006/relationships" xmlns:p="http://schemas.openxmlformats.org/presentationml/2006/main">
-  <p:cSld>
-    <p:bg>
-      <p:bgPr>
-        <a:solidFill>
-          <a:schemeClr val="bg1"/>
-        </a:solidFill>
-        <a:effectLst/>
-      </p:bgPr>
-    </p:bg>
-    <p:spTree>
-      <p:nvGrpSpPr>
-        <p:cNvPr id="1" name=""/>
-        <p:cNvGrpSpPr/>
-        <p:nvPr/>
-      </p:nvGrpSpPr>
-      <p:grpSpPr>
-        <a:xfrm>
-          <a:off x="0" y="0"/>
-          <a:ext cx="0" cy="0"/>
-          <a:chOff x="0" y="0"/>
-          <a:chExt cx="0" cy="0"/>
-        </a:xfrm>
-      </p:grpSpPr>
-      <p:sp useBgFill="1">
-        <p:nvSpPr>
-          <p:cNvPr id="9" name="Rectangle 8">
-            <a:extLst>
-              <a:ext uri="{FF2B5EF4-FFF2-40B4-BE49-F238E27FC236}">
-                <a16:creationId xmlns:a16="http://schemas.microsoft.com/office/drawing/2014/main" id="{743AA782-23D1-4521-8CAD-47662984AA08}"/>
-              </a:ext>
-              <a:ext uri="{C183D7F6-B498-43B3-948B-1728B52AA6E4}">
-                <adec:decorative xmlns:adec="http://schemas.microsoft.com/office/drawing/2017/decorative" val="1"/>
-              </a:ext>
-            </a:extLst>
-          </p:cNvPr>
-          <p:cNvSpPr>
-            <a:spLocks noGrp="1" noRot="1" noChangeAspect="1" noMove="1" noResize="1" noEditPoints="1" noAdjustHandles="1" noChangeArrowheads="1" noChangeShapeType="1" noTextEdit="1"/>
-          </p:cNvSpPr>
-          <p:nvPr>
-            <p:extLst>
-              <p:ext uri="{386F3935-93C4-4BCD-93E2-E3B085C9AB24}">
-                <p16:designElem xmlns:p16="http://schemas.microsoft.com/office/powerpoint/2015/main" val="1"/>
-              </p:ext>
-            </p:extLst>
-          </p:nvPr>
-        </p:nvSpPr>
-        <p:spPr>
-          <a:xfrm>
-            <a:off x="0" y="0"/>
-            <a:ext cx="12192000" cy="6858000"/>
-          </a:xfrm>
-          <a:prstGeom prst="rect">
-            <a:avLst/>
-          </a:prstGeom>
-          <a:ln>
-            <a:noFill/>
-          </a:ln>
-        </p:spPr>
-        <p:style>
-          <a:lnRef idx="2">
-            <a:schemeClr val="accent1">
-              <a:shade val="50000"/>
-            </a:schemeClr>
-          </a:lnRef>
-          <a:fillRef idx="1">
-            <a:schemeClr val="accent1"/>
-          </a:fillRef>
-          <a:effectRef idx="0">
-            <a:schemeClr val="accent1"/>
-          </a:effectRef>
-          <a:fontRef idx="minor">
-            <a:schemeClr val="lt1"/>
-          </a:fontRef>
-        </p:style>
-        <p:txBody>
-          <a:bodyPr rtlCol="0" anchor="ctr"/>
-          <a:lstStyle/>
-          <a:p>
-            <a:pPr algn="ctr"/>
-            <a:endParaRPr lang="en-US"/>
-          </a:p>
-        </p:txBody>
-      </p:sp>
-      <p:sp>
-        <p:nvSpPr>
-          <p:cNvPr id="2" name="Titre 1">
-            <a:extLst>
-              <a:ext uri="{FF2B5EF4-FFF2-40B4-BE49-F238E27FC236}">
-                <a16:creationId xmlns:a16="http://schemas.microsoft.com/office/drawing/2014/main" id="{B8A5D022-49CD-F031-5CF4-E6BD0CDE50BF}"/>
-              </a:ext>
-            </a:extLst>
-          </p:cNvPr>
-          <p:cNvSpPr>
-            <a:spLocks noGrp="1"/>
-          </p:cNvSpPr>
-          <p:nvPr>
-            <p:ph type="title"/>
-          </p:nvPr>
-        </p:nvSpPr>
-        <p:spPr>
-          <a:xfrm>
-            <a:off x="630936" y="640080"/>
-            <a:ext cx="4818888" cy="1481328"/>
-          </a:xfrm>
-        </p:spPr>
-        <p:txBody>
-          <a:bodyPr anchor="b">
-            <a:normAutofit/>
-          </a:bodyPr>
-          <a:lstStyle/>
-          <a:p>
-            <a:r>
-              <a:rPr lang="fr-FR" sz="4600">
-                <a:cs typeface="Calibri Light"/>
-              </a:rPr>
-              <a:t>Objectif du projet ARPANET</a:t>
-            </a:r>
-            <a:endParaRPr lang="fr-FR" sz="4600"/>
-          </a:p>
-        </p:txBody>
-      </p:sp>
-      <p:sp>
-        <p:nvSpPr>
-          <p:cNvPr id="11" name="sketch line">
-            <a:extLst>
-              <a:ext uri="{FF2B5EF4-FFF2-40B4-BE49-F238E27FC236}">
-                <a16:creationId xmlns:a16="http://schemas.microsoft.com/office/drawing/2014/main" id="{71877DBC-BB60-40F0-AC93-2ACDBAAE60CE}"/>
-              </a:ext>
-              <a:ext uri="{C183D7F6-B498-43B3-948B-1728B52AA6E4}">
-                <adec:decorative xmlns:adec="http://schemas.microsoft.com/office/drawing/2017/decorative" val="1"/>
-              </a:ext>
-            </a:extLst>
-          </p:cNvPr>
-          <p:cNvSpPr>
-            <a:spLocks noGrp="1" noRot="1" noChangeAspect="1" noMove="1" noResize="1" noEditPoints="1" noAdjustHandles="1" noChangeArrowheads="1" noChangeShapeType="1" noTextEdit="1"/>
-          </p:cNvSpPr>
-          <p:nvPr>
-            <p:extLst>
-              <p:ext uri="{386F3935-93C4-4BCD-93E2-E3B085C9AB24}">
-                <p16:designElem xmlns:p16="http://schemas.microsoft.com/office/powerpoint/2015/main" val="1"/>
-              </p:ext>
-            </p:extLst>
-          </p:nvPr>
-        </p:nvSpPr>
-        <p:spPr>
-          <a:xfrm>
-            <a:off x="643278" y="2372868"/>
-            <a:ext cx="3255095" cy="18288"/>
-          </a:xfrm>
-          <a:custGeom>
-            <a:avLst/>
-            <a:gdLst>
-              <a:gd name="connsiteX0" fmla="*/ 0 w 3255095"/>
-              <a:gd name="connsiteY0" fmla="*/ 0 h 18288"/>
-              <a:gd name="connsiteX1" fmla="*/ 618468 w 3255095"/>
-              <a:gd name="connsiteY1" fmla="*/ 0 h 18288"/>
-              <a:gd name="connsiteX2" fmla="*/ 1269487 w 3255095"/>
-              <a:gd name="connsiteY2" fmla="*/ 0 h 18288"/>
-              <a:gd name="connsiteX3" fmla="*/ 1953057 w 3255095"/>
-              <a:gd name="connsiteY3" fmla="*/ 0 h 18288"/>
-              <a:gd name="connsiteX4" fmla="*/ 2636627 w 3255095"/>
-              <a:gd name="connsiteY4" fmla="*/ 0 h 18288"/>
-              <a:gd name="connsiteX5" fmla="*/ 3255095 w 3255095"/>
-              <a:gd name="connsiteY5" fmla="*/ 0 h 18288"/>
-              <a:gd name="connsiteX6" fmla="*/ 3255095 w 3255095"/>
-              <a:gd name="connsiteY6" fmla="*/ 18288 h 18288"/>
-              <a:gd name="connsiteX7" fmla="*/ 2538974 w 3255095"/>
-              <a:gd name="connsiteY7" fmla="*/ 18288 h 18288"/>
-              <a:gd name="connsiteX8" fmla="*/ 1822853 w 3255095"/>
-              <a:gd name="connsiteY8" fmla="*/ 18288 h 18288"/>
-              <a:gd name="connsiteX9" fmla="*/ 1171834 w 3255095"/>
-              <a:gd name="connsiteY9" fmla="*/ 18288 h 18288"/>
-              <a:gd name="connsiteX10" fmla="*/ 0 w 3255095"/>
-              <a:gd name="connsiteY10" fmla="*/ 18288 h 18288"/>
-              <a:gd name="connsiteX11" fmla="*/ 0 w 3255095"/>
-              <a:gd name="connsiteY11" fmla="*/ 0 h 18288"/>
-            </a:gdLst>
-            <a:ahLst/>
-            <a:cxnLst>
-              <a:cxn ang="0">
-                <a:pos x="connsiteX0" y="connsiteY0"/>
-              </a:cxn>
-              <a:cxn ang="0">
-                <a:pos x="connsiteX1" y="connsiteY1"/>
-              </a:cxn>
-              <a:cxn ang="0">
-                <a:pos x="connsiteX2" y="connsiteY2"/>
-              </a:cxn>
-              <a:cxn ang="0">
-                <a:pos x="connsiteX3" y="connsiteY3"/>
-              </a:cxn>
-              <a:cxn ang="0">
-                <a:pos x="connsiteX4" y="connsiteY4"/>
-              </a:cxn>
-              <a:cxn ang="0">
-                <a:pos x="connsiteX5" y="connsiteY5"/>
-              </a:cxn>
-              <a:cxn ang="0">
-                <a:pos x="connsiteX6" y="connsiteY6"/>
-              </a:cxn>
-              <a:cxn ang="0">
-                <a:pos x="connsiteX7" y="connsiteY7"/>
-              </a:cxn>
-              <a:cxn ang="0">
-                <a:pos x="connsiteX8" y="connsiteY8"/>
-              </a:cxn>
-              <a:cxn ang="0">
-                <a:pos x="connsiteX9" y="connsiteY9"/>
-              </a:cxn>
-              <a:cxn ang="0">
-                <a:pos x="connsiteX10" y="connsiteY10"/>
-              </a:cxn>
-              <a:cxn ang="0">
-                <a:pos x="connsiteX11" y="connsiteY11"/>
-              </a:cxn>
-            </a:cxnLst>
-            <a:rect l="l" t="t" r="r" b="b"/>
-            <a:pathLst>
-              <a:path w="3255095" h="18288" fill="none" extrusionOk="0">
-                <a:moveTo>
-                  <a:pt x="0" y="0"/>
-                </a:moveTo>
-                <a:cubicBezTo>
-                  <a:pt x="240201" y="-22123"/>
-                  <a:pt x="462021" y="-19623"/>
-                  <a:pt x="618468" y="0"/>
-                </a:cubicBezTo>
-                <a:cubicBezTo>
-                  <a:pt x="774915" y="19623"/>
-                  <a:pt x="974734" y="2035"/>
-                  <a:pt x="1269487" y="0"/>
-                </a:cubicBezTo>
-                <a:cubicBezTo>
-                  <a:pt x="1564240" y="-2035"/>
-                  <a:pt x="1733579" y="10639"/>
-                  <a:pt x="1953057" y="0"/>
-                </a:cubicBezTo>
-                <a:cubicBezTo>
-                  <a:pt x="2172535" y="-10639"/>
-                  <a:pt x="2453962" y="14018"/>
-                  <a:pt x="2636627" y="0"/>
-                </a:cubicBezTo>
-                <a:cubicBezTo>
-                  <a:pt x="2819292" y="-14018"/>
-                  <a:pt x="3121375" y="5399"/>
-                  <a:pt x="3255095" y="0"/>
-                </a:cubicBezTo>
-                <a:cubicBezTo>
-                  <a:pt x="3254386" y="8157"/>
-                  <a:pt x="3254682" y="12125"/>
-                  <a:pt x="3255095" y="18288"/>
-                </a:cubicBezTo>
-                <a:cubicBezTo>
-                  <a:pt x="3088545" y="23203"/>
-                  <a:pt x="2687475" y="7419"/>
-                  <a:pt x="2538974" y="18288"/>
-                </a:cubicBezTo>
-                <a:cubicBezTo>
-                  <a:pt x="2390473" y="29157"/>
-                  <a:pt x="2137381" y="-8959"/>
-                  <a:pt x="1822853" y="18288"/>
-                </a:cubicBezTo>
-                <a:cubicBezTo>
-                  <a:pt x="1508325" y="45535"/>
-                  <a:pt x="1466437" y="20385"/>
-                  <a:pt x="1171834" y="18288"/>
-                </a:cubicBezTo>
-                <a:cubicBezTo>
-                  <a:pt x="877231" y="16191"/>
-                  <a:pt x="561097" y="37643"/>
-                  <a:pt x="0" y="18288"/>
-                </a:cubicBezTo>
-                <a:cubicBezTo>
-                  <a:pt x="-46" y="12483"/>
-                  <a:pt x="-203" y="6491"/>
-                  <a:pt x="0" y="0"/>
-                </a:cubicBezTo>
-                <a:close/>
-              </a:path>
-              <a:path w="3255095" h="18288" stroke="0" extrusionOk="0">
-                <a:moveTo>
-                  <a:pt x="0" y="0"/>
-                </a:moveTo>
-                <a:cubicBezTo>
-                  <a:pt x="291965" y="19429"/>
-                  <a:pt x="363155" y="8568"/>
-                  <a:pt x="618468" y="0"/>
-                </a:cubicBezTo>
-                <a:cubicBezTo>
-                  <a:pt x="873781" y="-8568"/>
-                  <a:pt x="904459" y="-19505"/>
-                  <a:pt x="1171834" y="0"/>
-                </a:cubicBezTo>
-                <a:cubicBezTo>
-                  <a:pt x="1439209" y="19505"/>
-                  <a:pt x="1744369" y="9790"/>
-                  <a:pt x="1887955" y="0"/>
-                </a:cubicBezTo>
-                <a:cubicBezTo>
-                  <a:pt x="2031541" y="-9790"/>
-                  <a:pt x="2346378" y="21240"/>
-                  <a:pt x="2506423" y="0"/>
-                </a:cubicBezTo>
-                <a:cubicBezTo>
-                  <a:pt x="2666468" y="-21240"/>
-                  <a:pt x="2990257" y="30414"/>
-                  <a:pt x="3255095" y="0"/>
-                </a:cubicBezTo>
-                <a:cubicBezTo>
-                  <a:pt x="3254831" y="4493"/>
-                  <a:pt x="3255479" y="9472"/>
-                  <a:pt x="3255095" y="18288"/>
-                </a:cubicBezTo>
-                <a:cubicBezTo>
-                  <a:pt x="3120743" y="16690"/>
-                  <a:pt x="2759628" y="42462"/>
-                  <a:pt x="2604076" y="18288"/>
-                </a:cubicBezTo>
-                <a:cubicBezTo>
-                  <a:pt x="2448524" y="-5886"/>
-                  <a:pt x="2184336" y="19599"/>
-                  <a:pt x="1887955" y="18288"/>
-                </a:cubicBezTo>
-                <a:cubicBezTo>
-                  <a:pt x="1591574" y="16977"/>
-                  <a:pt x="1548845" y="6870"/>
-                  <a:pt x="1334589" y="18288"/>
-                </a:cubicBezTo>
-                <a:cubicBezTo>
-                  <a:pt x="1120333" y="29706"/>
-                  <a:pt x="996014" y="9662"/>
-                  <a:pt x="683570" y="18288"/>
-                </a:cubicBezTo>
-                <a:cubicBezTo>
-                  <a:pt x="371126" y="26914"/>
-                  <a:pt x="198687" y="16167"/>
-                  <a:pt x="0" y="18288"/>
-                </a:cubicBezTo>
-                <a:cubicBezTo>
-                  <a:pt x="843" y="9577"/>
-                  <a:pt x="371" y="6900"/>
-                  <a:pt x="0" y="0"/>
-                </a:cubicBezTo>
-                <a:close/>
-              </a:path>
-            </a:pathLst>
-          </a:custGeom>
-          <a:solidFill>
-            <a:schemeClr val="accent2"/>
-          </a:solidFill>
-          <a:ln w="38100" cap="rnd">
-            <a:solidFill>
-              <a:schemeClr val="accent2"/>
-            </a:solidFill>
-            <a:round/>
-            <a:extLst>
-              <a:ext uri="{C807C97D-BFC1-408E-A445-0C87EB9F89A2}">
-                <ask:lineSketchStyleProps xmlns:ask="http://schemas.microsoft.com/office/drawing/2018/sketchyshapes" sd="1219033472">
-                  <a:prstGeom prst="rect">
-                    <a:avLst/>
-                  </a:prstGeom>
-                  <ask:type>
-                    <ask:lineSketchFreehand/>
-                  </ask:type>
-                </ask:lineSketchStyleProps>
-              </a:ext>
-            </a:extLst>
-          </a:ln>
-        </p:spPr>
-        <p:style>
-          <a:lnRef idx="2">
-            <a:schemeClr val="accent1">
-              <a:shade val="50000"/>
-            </a:schemeClr>
-          </a:lnRef>
-          <a:fillRef idx="1">
-            <a:schemeClr val="accent1"/>
-          </a:fillRef>
-          <a:effectRef idx="0">
-            <a:schemeClr val="accent1"/>
-          </a:effectRef>
-          <a:fontRef idx="minor">
-            <a:schemeClr val="lt1"/>
-          </a:fontRef>
-        </p:style>
-        <p:txBody>
-          <a:bodyPr rtlCol="0" anchor="ctr"/>
-          <a:lstStyle/>
-          <a:p>
-            <a:pPr algn="ctr"/>
-            <a:endParaRPr lang="en-US"/>
-          </a:p>
-        </p:txBody>
-      </p:sp>
-      <p:sp>
-        <p:nvSpPr>
-          <p:cNvPr id="3" name="Espace réservé du contenu 2">
-            <a:extLst>
-              <a:ext uri="{FF2B5EF4-FFF2-40B4-BE49-F238E27FC236}">
-                <a16:creationId xmlns:a16="http://schemas.microsoft.com/office/drawing/2014/main" id="{7B84777B-C837-DD2A-B516-875BC7CD4784}"/>
-              </a:ext>
-            </a:extLst>
-          </p:cNvPr>
-          <p:cNvSpPr>
-            <a:spLocks noGrp="1"/>
-          </p:cNvSpPr>
-          <p:nvPr>
-            <p:ph idx="1"/>
-          </p:nvPr>
-        </p:nvSpPr>
-        <p:spPr>
-          <a:xfrm>
-            <a:off x="630936" y="2660904"/>
-            <a:ext cx="4818888" cy="3547872"/>
-          </a:xfrm>
-        </p:spPr>
-        <p:txBody>
-          <a:bodyPr vert="horz" lIns="91440" tIns="45720" rIns="91440" bIns="45720" rtlCol="0" anchor="t">
-            <a:normAutofit/>
-          </a:bodyPr>
-          <a:lstStyle/>
-          <a:p>
-            <a:r>
-              <a:rPr lang="fr-FR" sz="1400">
-                <a:cs typeface="Calibri"/>
-              </a:rPr>
-              <a:t>Créer un réseau</a:t>
-            </a:r>
-          </a:p>
-          <a:p>
-            <a:pPr marL="0" indent="0">
-              <a:buNone/>
-            </a:pPr>
-            <a:endParaRPr lang="fr-FR" sz="1400">
-              <a:cs typeface="Calibri"/>
-            </a:endParaRPr>
-          </a:p>
-          <a:p>
-            <a:pPr lvl="1">
-              <a:buFont typeface="Courier New" panose="020B0604020202020204" pitchFamily="34" charset="0"/>
-              <a:buChar char="o"/>
-            </a:pPr>
-            <a:r>
-              <a:rPr lang="fr-FR" sz="1400">
-                <a:cs typeface="Calibri"/>
-              </a:rPr>
-              <a:t>Décentralisé: Pour éliminer les vulnérabilités liées à une structure centralisée en cas d'attaques. </a:t>
-            </a:r>
-          </a:p>
-          <a:p>
-            <a:pPr marL="457200" lvl="1" indent="0">
-              <a:buNone/>
-            </a:pPr>
-            <a:endParaRPr lang="fr-FR" sz="1400">
-              <a:cs typeface="Calibri"/>
-            </a:endParaRPr>
-          </a:p>
-          <a:p>
-            <a:pPr lvl="1">
-              <a:buFont typeface="Courier New" panose="020B0604020202020204" pitchFamily="34" charset="0"/>
-              <a:buChar char="o"/>
-            </a:pPr>
-            <a:r>
-              <a:rPr lang="fr-FR" sz="1400">
-                <a:cs typeface="Calibri"/>
-              </a:rPr>
-              <a:t>Robuste: Assurer la résilience du réseau, même en cas de perturbation ou de destruction de parties de celui-ci.</a:t>
-            </a:r>
-          </a:p>
-        </p:txBody>
-      </p:sp>
-      <p:pic>
-        <p:nvPicPr>
-          <p:cNvPr id="4" name="Image 3" descr="Une image contenant logo, Graphique, conception&#10;&#10;Description générée automatiquement">
-            <a:extLst>
-              <a:ext uri="{FF2B5EF4-FFF2-40B4-BE49-F238E27FC236}">
-                <a16:creationId xmlns:a16="http://schemas.microsoft.com/office/drawing/2014/main" id="{450FFC09-1AB2-F2B8-623A-DAC22C955732}"/>
-              </a:ext>
-            </a:extLst>
-          </p:cNvPr>
-          <p:cNvPicPr>
-            <a:picLocks noChangeAspect="1"/>
-          </p:cNvPicPr>
-          <p:nvPr/>
-        </p:nvPicPr>
-        <p:blipFill>
-          <a:blip r:embed="rId2"/>
-          <a:stretch>
-            <a:fillRect/>
-          </a:stretch>
-        </p:blipFill>
-        <p:spPr>
-          <a:xfrm>
-            <a:off x="6099048" y="1910725"/>
-            <a:ext cx="5458968" cy="3036550"/>
-          </a:xfrm>
-          <a:prstGeom prst="rect">
-            <a:avLst/>
-          </a:prstGeom>
-        </p:spPr>
-      </p:pic>
-    </p:spTree>
-    <p:extLst>
-      <p:ext uri="{BB962C8B-B14F-4D97-AF65-F5344CB8AC3E}">
-        <p14:creationId xmlns:p14="http://schemas.microsoft.com/office/powerpoint/2010/main" val="3921660627"/>
       </p:ext>
     </p:extLst>
   </p:cSld>
@@ -22807,67 +23092,54 @@
               <a:rPr lang="en-US" sz="1500" err="1"/>
               <a:t>paquets</a:t>
             </a:r>
-            <a:endParaRPr lang="en-US" sz="1500" err="1">
+            <a:endParaRPr lang="en-US" sz="1500">
               <a:cs typeface="Calibri"/>
             </a:endParaRPr>
           </a:p>
           <a:p>
             <a:pPr algn="l"/>
-            <a:r>
-              <a:rPr lang="en-US" sz="1500"/>
-              <a:t>Termine le </a:t>
-            </a:r>
-            <a:r>
-              <a:rPr lang="en-US" sz="1500" err="1"/>
-              <a:t>terme</a:t>
-            </a:r>
-            <a:r>
-              <a:rPr lang="en-US" sz="1500"/>
-              <a:t> "Packet Switching" pour </a:t>
-            </a:r>
-            <a:r>
-              <a:rPr lang="en-US" sz="1500" err="1"/>
-              <a:t>décrire</a:t>
-            </a:r>
-            <a:r>
-              <a:rPr lang="en-US" sz="1500"/>
-              <a:t> </a:t>
-            </a:r>
-            <a:r>
-              <a:rPr lang="en-US" sz="1500" err="1"/>
-              <a:t>cette</a:t>
-            </a:r>
-            <a:r>
-              <a:rPr lang="en-US" sz="1500"/>
-              <a:t> technique.</a:t>
-            </a:r>
-            <a:endParaRPr lang="en-US" sz="1500">
-              <a:cs typeface="Calibri" panose="020F0502020204030204"/>
-            </a:endParaRPr>
+            <a:endParaRPr lang="en-US" sz="1500"/>
           </a:p>
           <a:p>
             <a:pPr indent="-228600" algn="l">
               <a:buFont typeface="Arial" panose="020B0604020202020204" pitchFamily="34" charset="0"/>
               <a:buChar char="•"/>
             </a:pPr>
-            <a:endParaRPr lang="en-US" sz="1500"/>
-          </a:p>
-          <a:p>
-            <a:pPr indent="-228600" algn="l">
-              <a:buFont typeface="Arial" panose="020B0604020202020204" pitchFamily="34" charset="0"/>
-              <a:buChar char="•"/>
-            </a:pPr>
             <a:r>
               <a:rPr lang="en-US" sz="1500" b="1">
                 <a:cs typeface="Calibri" panose="020F0502020204030204"/>
               </a:rPr>
-              <a:t> Développement du "Packet Switching" (1966): </a:t>
+              <a:t> </a:t>
+            </a:r>
+            <a:r>
+              <a:rPr lang="en-US" sz="1500" b="1" err="1">
+                <a:cs typeface="Calibri" panose="020F0502020204030204"/>
+              </a:rPr>
+              <a:t>Développement</a:t>
+            </a:r>
+            <a:r>
+              <a:rPr lang="en-US" sz="1500" b="1">
+                <a:cs typeface="Calibri" panose="020F0502020204030204"/>
+              </a:rPr>
+              <a:t> du "Packet Switching" (1966): </a:t>
             </a:r>
             <a:r>
               <a:rPr lang="en-US" sz="1500">
                 <a:cs typeface="Calibri" panose="020F0502020204030204"/>
               </a:rPr>
-              <a:t>Lawrence Roberts et Thomas Marill : </a:t>
+              <a:t>Lawrence Roberts et Thomas </a:t>
+            </a:r>
+            <a:r>
+              <a:rPr lang="en-US" sz="1500" err="1">
+                <a:cs typeface="Calibri" panose="020F0502020204030204"/>
+              </a:rPr>
+              <a:t>Marill</a:t>
+            </a:r>
+            <a:r>
+              <a:rPr lang="en-US" sz="1500">
+                <a:cs typeface="Calibri" panose="020F0502020204030204"/>
+              </a:rPr>
+              <a:t> : </a:t>
             </a:r>
             <a:r>
               <a:rPr lang="en-US" sz="1500" err="1">
@@ -23801,15 +24073,6 @@
             <a:r>
               <a:rPr lang="fr-FR" sz="1400"/>
               <a:t>Publication en 1961 "Information Flow in Large Communication Nets "</a:t>
-            </a:r>
-            <a:endParaRPr lang="fr-FR" sz="1400">
-              <a:cs typeface="Calibri"/>
-            </a:endParaRPr>
-          </a:p>
-          <a:p>
-            <a:r>
-              <a:rPr lang="fr-FR" sz="1400"/>
-              <a:t>Son équipe envoie le premier message sur l'ARPANET en 1969 en collaboration avec l'équipe de Roberts</a:t>
             </a:r>
             <a:endParaRPr lang="fr-FR" sz="1400">
               <a:cs typeface="Calibri"/>
@@ -24607,17 +24870,9 @@
             </a:pPr>
             <a:r>
               <a:rPr lang="en-US" sz="1400" noProof="1"/>
-              <a:t> </a:t>
-            </a:r>
-            <a:r>
-              <a:rPr lang="en-US" sz="1400" b="1" i="1" noProof="1"/>
-              <a:t>Lawrence Roberts (1937,2018)</a:t>
-            </a:r>
-            <a:r>
-              <a:rPr lang="en-US" sz="1400" noProof="1"/>
-              <a:t> :  Docteur en ingénierie électrique, diplômé du MIT </a:t>
-            </a:r>
-            <a:endParaRPr lang="en-US" sz="1400">
+              <a:t> 1966 : Directeur des recherches de l'ARPA </a:t>
+            </a:r>
+            <a:endParaRPr lang="en-US" sz="1400" noProof="1">
               <a:cs typeface="Calibri"/>
             </a:endParaRPr>
           </a:p>
@@ -24628,7 +24883,7 @@
             </a:pPr>
             <a:r>
               <a:rPr lang="en-US" sz="1400" noProof="1"/>
-              <a:t> 1966 : Directeur des recherches de l'ARPA </a:t>
+              <a:t> Publication du plan d'ARPANET (1967): intitulé «  Multiple Computer Networks and Intercomputer Communication »</a:t>
             </a:r>
             <a:endParaRPr lang="en-US" sz="1400" noProof="1">
               <a:cs typeface="Calibri"/>
@@ -24641,19 +24896,6 @@
             </a:pPr>
             <a:r>
               <a:rPr lang="en-US" sz="1400" noProof="1"/>
-              <a:t> Publication du plan d'ARPANET (1967): intitulé «  Multiple Computer Networks and Intercomputer Communication »</a:t>
-            </a:r>
-            <a:endParaRPr lang="en-US" sz="1400" noProof="1">
-              <a:cs typeface="Calibri"/>
-            </a:endParaRPr>
-          </a:p>
-          <a:p>
-            <a:pPr indent="-228600" algn="l">
-              <a:buFont typeface="Arial" panose="020B0604020202020204" pitchFamily="34" charset="0"/>
-              <a:buChar char="•"/>
-            </a:pPr>
-            <a:r>
-              <a:rPr lang="en-US" sz="1400" noProof="1"/>
               <a:t>Role essentiel dans le développement des IMP (Interface Message Processor) d'ARPANET.</a:t>
             </a:r>
             <a:endParaRPr lang="en-US" sz="1400">
@@ -24661,30 +24903,10 @@
             </a:endParaRPr>
           </a:p>
           <a:p>
-            <a:pPr indent="-228600" algn="l">
-              <a:buFont typeface="Arial" panose="020B0604020202020204" pitchFamily="34" charset="0"/>
-              <a:buChar char="•"/>
-            </a:pPr>
-            <a:r>
-              <a:rPr lang="en-US" sz="1400" b="1" i="1" noProof="1">
-                <a:cs typeface="Calibri"/>
-              </a:rPr>
-              <a:t> Première Connexion Opérationnelle:</a:t>
-            </a:r>
-            <a:r>
-              <a:rPr lang="en-US" sz="1400" noProof="1">
-                <a:cs typeface="Calibri"/>
-              </a:rPr>
-              <a:t> Mise en œuvre de la première connexion entre l'UCLA et le SRI en 1969.</a:t>
-            </a:r>
-          </a:p>
-          <a:p>
-            <a:pPr indent="-228600" algn="l">
+            <a:pPr algn="l">
               <a:spcBef>
                 <a:spcPts val="100"/>
               </a:spcBef>
-              <a:buFont typeface="Arial" panose="020B0604020202020204" pitchFamily="34" charset="0"/>
-              <a:buChar char="•"/>
             </a:pPr>
             <a:endParaRPr lang="en-US" sz="900" noProof="1">
               <a:cs typeface="Calibri" panose="020F0502020204030204"/>
@@ -24898,14 +25120,6 @@
 <file path=ppt/slides/slide8.xml><?xml version="1.0" encoding="utf-8"?>
 <p:sld xmlns:a="http://schemas.openxmlformats.org/drawingml/2006/main" xmlns:r="http://schemas.openxmlformats.org/officeDocument/2006/relationships" xmlns:p="http://schemas.openxmlformats.org/presentationml/2006/main">
   <p:cSld>
-    <p:bg>
-      <p:bgPr>
-        <a:solidFill>
-          <a:schemeClr val="bg1"/>
-        </a:solidFill>
-        <a:effectLst/>
-      </p:bgPr>
-    </p:bg>
     <p:spTree>
       <p:nvGrpSpPr>
         <p:cNvPr id="1" name=""/>
@@ -24920,72 +25134,12 @@
           <a:chExt cx="0" cy="0"/>
         </a:xfrm>
       </p:grpSpPr>
-      <p:sp useBgFill="1">
-        <p:nvSpPr>
-          <p:cNvPr id="9" name="Rectangle 8">
-            <a:extLst>
-              <a:ext uri="{FF2B5EF4-FFF2-40B4-BE49-F238E27FC236}">
-                <a16:creationId xmlns:a16="http://schemas.microsoft.com/office/drawing/2014/main" id="{F13C74B1-5B17-4795-BED0-7140497B445A}"/>
-              </a:ext>
-              <a:ext uri="{C183D7F6-B498-43B3-948B-1728B52AA6E4}">
-                <adec:decorative xmlns:adec="http://schemas.microsoft.com/office/drawing/2017/decorative" val="1"/>
-              </a:ext>
-            </a:extLst>
-          </p:cNvPr>
-          <p:cNvSpPr>
-            <a:spLocks noGrp="1" noRot="1" noChangeAspect="1" noMove="1" noResize="1" noEditPoints="1" noAdjustHandles="1" noChangeArrowheads="1" noChangeShapeType="1" noTextEdit="1"/>
-          </p:cNvSpPr>
-          <p:nvPr>
-            <p:extLst>
-              <p:ext uri="{386F3935-93C4-4BCD-93E2-E3B085C9AB24}">
-                <p16:designElem xmlns:p16="http://schemas.microsoft.com/office/powerpoint/2015/main" val="1"/>
-              </p:ext>
-            </p:extLst>
-          </p:nvPr>
-        </p:nvSpPr>
-        <p:spPr>
-          <a:xfrm>
-            <a:off x="0" y="0"/>
-            <a:ext cx="12188952" cy="6858000"/>
-          </a:xfrm>
-          <a:prstGeom prst="rect">
-            <a:avLst/>
-          </a:prstGeom>
-          <a:ln>
-            <a:noFill/>
-          </a:ln>
-        </p:spPr>
-        <p:style>
-          <a:lnRef idx="2">
-            <a:schemeClr val="accent1">
-              <a:shade val="50000"/>
-            </a:schemeClr>
-          </a:lnRef>
-          <a:fillRef idx="1">
-            <a:schemeClr val="accent1"/>
-          </a:fillRef>
-          <a:effectRef idx="0">
-            <a:schemeClr val="accent1"/>
-          </a:effectRef>
-          <a:fontRef idx="minor">
-            <a:schemeClr val="lt1"/>
-          </a:fontRef>
-        </p:style>
-        <p:txBody>
-          <a:bodyPr rtlCol="0" anchor="ctr"/>
-          <a:lstStyle/>
-          <a:p>
-            <a:pPr algn="ctr"/>
-            <a:endParaRPr lang="en-US"/>
-          </a:p>
-        </p:txBody>
-      </p:sp>
       <p:sp>
         <p:nvSpPr>
           <p:cNvPr id="2" name="Titre 1">
             <a:extLst>
               <a:ext uri="{FF2B5EF4-FFF2-40B4-BE49-F238E27FC236}">
-                <a16:creationId xmlns:a16="http://schemas.microsoft.com/office/drawing/2014/main" id="{E1ABFEBE-89B1-8032-852B-762AD86B607A}"/>
+                <a16:creationId xmlns:a16="http://schemas.microsoft.com/office/drawing/2014/main" id="{BB0B9FDE-55F1-C744-2628-0D9E143F8A57}"/>
               </a:ext>
             </a:extLst>
           </p:cNvPr>
@@ -24996,307 +25150,20 @@
             <p:ph type="title"/>
           </p:nvPr>
         </p:nvSpPr>
-        <p:spPr>
-          <a:xfrm>
-            <a:off x="640080" y="325369"/>
-            <a:ext cx="4368602" cy="1956841"/>
-          </a:xfrm>
-        </p:spPr>
+        <p:spPr/>
         <p:txBody>
-          <a:bodyPr anchor="b">
-            <a:normAutofit fontScale="90000"/>
+          <a:bodyPr>
+            <a:normAutofit/>
           </a:bodyPr>
           <a:lstStyle/>
           <a:p>
             <a:r>
-              <a:rPr lang="fr-FR" sz="4200">
+              <a:rPr lang="fr-FR" sz="3600">
                 <a:cs typeface="Calibri Light"/>
               </a:rPr>
-              <a:t>La collaboration scientifique : Véritable atout de ce projet</a:t>
-            </a:r>
-          </a:p>
-        </p:txBody>
-      </p:sp>
-      <p:sp>
-        <p:nvSpPr>
-          <p:cNvPr id="11" name="sketchy line">
-            <a:extLst>
-              <a:ext uri="{FF2B5EF4-FFF2-40B4-BE49-F238E27FC236}">
-                <a16:creationId xmlns:a16="http://schemas.microsoft.com/office/drawing/2014/main" id="{D4974D33-8DC5-464E-8C6D-BE58F0669C17}"/>
-              </a:ext>
-              <a:ext uri="{C183D7F6-B498-43B3-948B-1728B52AA6E4}">
-                <adec:decorative xmlns:adec="http://schemas.microsoft.com/office/drawing/2017/decorative" val="1"/>
-              </a:ext>
-            </a:extLst>
-          </p:cNvPr>
-          <p:cNvSpPr>
-            <a:spLocks noGrp="1" noRot="1" noChangeAspect="1" noMove="1" noResize="1" noEditPoints="1" noAdjustHandles="1" noChangeArrowheads="1" noChangeShapeType="1" noTextEdit="1"/>
-          </p:cNvSpPr>
-          <p:nvPr>
-            <p:extLst>
-              <p:ext uri="{386F3935-93C4-4BCD-93E2-E3B085C9AB24}">
-                <p16:designElem xmlns:p16="http://schemas.microsoft.com/office/powerpoint/2015/main" val="1"/>
-              </p:ext>
-            </p:extLst>
-          </p:nvPr>
-        </p:nvSpPr>
-        <p:spPr>
-          <a:xfrm>
-            <a:off x="640080" y="2586994"/>
-            <a:ext cx="3474720" cy="18288"/>
-          </a:xfrm>
-          <a:custGeom>
-            <a:avLst/>
-            <a:gdLst>
-              <a:gd name="connsiteX0" fmla="*/ 0 w 3474720"/>
-              <a:gd name="connsiteY0" fmla="*/ 0 h 18288"/>
-              <a:gd name="connsiteX1" fmla="*/ 694944 w 3474720"/>
-              <a:gd name="connsiteY1" fmla="*/ 0 h 18288"/>
-              <a:gd name="connsiteX2" fmla="*/ 1355141 w 3474720"/>
-              <a:gd name="connsiteY2" fmla="*/ 0 h 18288"/>
-              <a:gd name="connsiteX3" fmla="*/ 2015338 w 3474720"/>
-              <a:gd name="connsiteY3" fmla="*/ 0 h 18288"/>
-              <a:gd name="connsiteX4" fmla="*/ 2779776 w 3474720"/>
-              <a:gd name="connsiteY4" fmla="*/ 0 h 18288"/>
-              <a:gd name="connsiteX5" fmla="*/ 3474720 w 3474720"/>
-              <a:gd name="connsiteY5" fmla="*/ 0 h 18288"/>
-              <a:gd name="connsiteX6" fmla="*/ 3474720 w 3474720"/>
-              <a:gd name="connsiteY6" fmla="*/ 18288 h 18288"/>
-              <a:gd name="connsiteX7" fmla="*/ 2779776 w 3474720"/>
-              <a:gd name="connsiteY7" fmla="*/ 18288 h 18288"/>
-              <a:gd name="connsiteX8" fmla="*/ 2189074 w 3474720"/>
-              <a:gd name="connsiteY8" fmla="*/ 18288 h 18288"/>
-              <a:gd name="connsiteX9" fmla="*/ 1528877 w 3474720"/>
-              <a:gd name="connsiteY9" fmla="*/ 18288 h 18288"/>
-              <a:gd name="connsiteX10" fmla="*/ 868680 w 3474720"/>
-              <a:gd name="connsiteY10" fmla="*/ 18288 h 18288"/>
-              <a:gd name="connsiteX11" fmla="*/ 0 w 3474720"/>
-              <a:gd name="connsiteY11" fmla="*/ 18288 h 18288"/>
-              <a:gd name="connsiteX12" fmla="*/ 0 w 3474720"/>
-              <a:gd name="connsiteY12" fmla="*/ 0 h 18288"/>
-            </a:gdLst>
-            <a:ahLst/>
-            <a:cxnLst>
-              <a:cxn ang="0">
-                <a:pos x="connsiteX0" y="connsiteY0"/>
-              </a:cxn>
-              <a:cxn ang="0">
-                <a:pos x="connsiteX1" y="connsiteY1"/>
-              </a:cxn>
-              <a:cxn ang="0">
-                <a:pos x="connsiteX2" y="connsiteY2"/>
-              </a:cxn>
-              <a:cxn ang="0">
-                <a:pos x="connsiteX3" y="connsiteY3"/>
-              </a:cxn>
-              <a:cxn ang="0">
-                <a:pos x="connsiteX4" y="connsiteY4"/>
-              </a:cxn>
-              <a:cxn ang="0">
-                <a:pos x="connsiteX5" y="connsiteY5"/>
-              </a:cxn>
-              <a:cxn ang="0">
-                <a:pos x="connsiteX6" y="connsiteY6"/>
-              </a:cxn>
-              <a:cxn ang="0">
-                <a:pos x="connsiteX7" y="connsiteY7"/>
-              </a:cxn>
-              <a:cxn ang="0">
-                <a:pos x="connsiteX8" y="connsiteY8"/>
-              </a:cxn>
-              <a:cxn ang="0">
-                <a:pos x="connsiteX9" y="connsiteY9"/>
-              </a:cxn>
-              <a:cxn ang="0">
-                <a:pos x="connsiteX10" y="connsiteY10"/>
-              </a:cxn>
-              <a:cxn ang="0">
-                <a:pos x="connsiteX11" y="connsiteY11"/>
-              </a:cxn>
-              <a:cxn ang="0">
-                <a:pos x="connsiteX12" y="connsiteY12"/>
-              </a:cxn>
-            </a:cxnLst>
-            <a:rect l="l" t="t" r="r" b="b"/>
-            <a:pathLst>
-              <a:path w="3474720" h="18288" fill="none" extrusionOk="0">
-                <a:moveTo>
-                  <a:pt x="0" y="0"/>
-                </a:moveTo>
-                <a:cubicBezTo>
-                  <a:pt x="224454" y="-14544"/>
-                  <a:pt x="495407" y="26540"/>
-                  <a:pt x="694944" y="0"/>
-                </a:cubicBezTo>
-                <a:cubicBezTo>
-                  <a:pt x="894481" y="-26540"/>
-                  <a:pt x="1130063" y="24713"/>
-                  <a:pt x="1355141" y="0"/>
-                </a:cubicBezTo>
-                <a:cubicBezTo>
-                  <a:pt x="1580219" y="-24713"/>
-                  <a:pt x="1820099" y="26695"/>
-                  <a:pt x="2015338" y="0"/>
-                </a:cubicBezTo>
-                <a:cubicBezTo>
-                  <a:pt x="2210577" y="-26695"/>
-                  <a:pt x="2402045" y="165"/>
-                  <a:pt x="2779776" y="0"/>
-                </a:cubicBezTo>
-                <a:cubicBezTo>
-                  <a:pt x="3157507" y="-165"/>
-                  <a:pt x="3286859" y="-15571"/>
-                  <a:pt x="3474720" y="0"/>
-                </a:cubicBezTo>
-                <a:cubicBezTo>
-                  <a:pt x="3474286" y="7551"/>
-                  <a:pt x="3474253" y="9822"/>
-                  <a:pt x="3474720" y="18288"/>
-                </a:cubicBezTo>
-                <a:cubicBezTo>
-                  <a:pt x="3233904" y="29845"/>
-                  <a:pt x="2945134" y="-5256"/>
-                  <a:pt x="2779776" y="18288"/>
-                </a:cubicBezTo>
-                <a:cubicBezTo>
-                  <a:pt x="2614418" y="41832"/>
-                  <a:pt x="2339768" y="22709"/>
-                  <a:pt x="2189074" y="18288"/>
-                </a:cubicBezTo>
-                <a:cubicBezTo>
-                  <a:pt x="2038380" y="13867"/>
-                  <a:pt x="1817434" y="-4947"/>
-                  <a:pt x="1528877" y="18288"/>
-                </a:cubicBezTo>
-                <a:cubicBezTo>
-                  <a:pt x="1240320" y="41523"/>
-                  <a:pt x="1042447" y="37198"/>
-                  <a:pt x="868680" y="18288"/>
-                </a:cubicBezTo>
-                <a:cubicBezTo>
-                  <a:pt x="694913" y="-622"/>
-                  <a:pt x="233232" y="44909"/>
-                  <a:pt x="0" y="18288"/>
-                </a:cubicBezTo>
-                <a:cubicBezTo>
-                  <a:pt x="60" y="11696"/>
-                  <a:pt x="66" y="3758"/>
-                  <a:pt x="0" y="0"/>
-                </a:cubicBezTo>
-                <a:close/>
-              </a:path>
-              <a:path w="3474720" h="18288" stroke="0" extrusionOk="0">
-                <a:moveTo>
-                  <a:pt x="0" y="0"/>
-                </a:moveTo>
-                <a:cubicBezTo>
-                  <a:pt x="202328" y="-14716"/>
-                  <a:pt x="332722" y="-11499"/>
-                  <a:pt x="625450" y="0"/>
-                </a:cubicBezTo>
-                <a:cubicBezTo>
-                  <a:pt x="918178" y="11499"/>
-                  <a:pt x="1096688" y="5123"/>
-                  <a:pt x="1389888" y="0"/>
-                </a:cubicBezTo>
-                <a:cubicBezTo>
-                  <a:pt x="1683088" y="-5123"/>
-                  <a:pt x="1835981" y="-14038"/>
-                  <a:pt x="1980590" y="0"/>
-                </a:cubicBezTo>
-                <a:cubicBezTo>
-                  <a:pt x="2125199" y="14038"/>
-                  <a:pt x="2396099" y="-7203"/>
-                  <a:pt x="2571293" y="0"/>
-                </a:cubicBezTo>
-                <a:cubicBezTo>
-                  <a:pt x="2746487" y="7203"/>
-                  <a:pt x="3041609" y="-12036"/>
-                  <a:pt x="3474720" y="0"/>
-                </a:cubicBezTo>
-                <a:cubicBezTo>
-                  <a:pt x="3474638" y="4406"/>
-                  <a:pt x="3474631" y="9982"/>
-                  <a:pt x="3474720" y="18288"/>
-                </a:cubicBezTo>
-                <a:cubicBezTo>
-                  <a:pt x="3324873" y="21876"/>
-                  <a:pt x="3136771" y="12587"/>
-                  <a:pt x="2814523" y="18288"/>
-                </a:cubicBezTo>
-                <a:cubicBezTo>
-                  <a:pt x="2492275" y="23989"/>
-                  <a:pt x="2294402" y="47111"/>
-                  <a:pt x="2154326" y="18288"/>
-                </a:cubicBezTo>
-                <a:cubicBezTo>
-                  <a:pt x="2014250" y="-10535"/>
-                  <a:pt x="1820317" y="33903"/>
-                  <a:pt x="1494130" y="18288"/>
-                </a:cubicBezTo>
-                <a:cubicBezTo>
-                  <a:pt x="1167943" y="2673"/>
-                  <a:pt x="948432" y="14868"/>
-                  <a:pt x="729691" y="18288"/>
-                </a:cubicBezTo>
-                <a:cubicBezTo>
-                  <a:pt x="510950" y="21708"/>
-                  <a:pt x="264032" y="24354"/>
-                  <a:pt x="0" y="18288"/>
-                </a:cubicBezTo>
-                <a:cubicBezTo>
-                  <a:pt x="189" y="14288"/>
-                  <a:pt x="-703" y="3747"/>
-                  <a:pt x="0" y="0"/>
-                </a:cubicBezTo>
-                <a:close/>
-              </a:path>
-            </a:pathLst>
-          </a:custGeom>
-          <a:solidFill>
-            <a:schemeClr val="accent2"/>
-          </a:solidFill>
-          <a:ln w="44450" cap="rnd">
-            <a:solidFill>
-              <a:schemeClr val="accent2"/>
-            </a:solidFill>
-            <a:round/>
-            <a:extLst>
-              <a:ext uri="{C807C97D-BFC1-408E-A445-0C87EB9F89A2}">
-                <ask:lineSketchStyleProps xmlns:ask="http://schemas.microsoft.com/office/drawing/2018/sketchyshapes" sd="2863741219">
-                  <a:prstGeom prst="rect">
-                    <a:avLst/>
-                  </a:prstGeom>
-                  <ask:type>
-                    <ask:lineSketchFreehand/>
-                  </ask:type>
-                </ask:lineSketchStyleProps>
-              </a:ext>
-            </a:extLst>
-          </a:ln>
-        </p:spPr>
-        <p:style>
-          <a:lnRef idx="2">
-            <a:schemeClr val="accent1">
-              <a:shade val="50000"/>
-            </a:schemeClr>
-          </a:lnRef>
-          <a:fillRef idx="1">
-            <a:schemeClr val="accent1"/>
-          </a:fillRef>
-          <a:effectRef idx="0">
-            <a:schemeClr val="accent1"/>
-          </a:effectRef>
-          <a:fontRef idx="minor">
-            <a:schemeClr val="lt1"/>
-          </a:fontRef>
-        </p:style>
-        <p:txBody>
-          <a:bodyPr rtlCol="0" anchor="ctr"/>
-          <a:lstStyle/>
-          <a:p>
-            <a:pPr algn="ctr"/>
-            <a:endParaRPr lang="en-US"/>
+              <a:t>Topologie en maillage </a:t>
+            </a:r>
+            <a:endParaRPr lang="fr-FR" sz="3600"/>
           </a:p>
         </p:txBody>
       </p:sp>
@@ -25305,7 +25172,7 @@
           <p:cNvPr id="3" name="Espace réservé du contenu 2">
             <a:extLst>
               <a:ext uri="{FF2B5EF4-FFF2-40B4-BE49-F238E27FC236}">
-                <a16:creationId xmlns:a16="http://schemas.microsoft.com/office/drawing/2014/main" id="{3CEA4403-45F8-D8CD-D438-D85FDE05C5A2}"/>
+                <a16:creationId xmlns:a16="http://schemas.microsoft.com/office/drawing/2014/main" id="{41E13E7E-6D93-8E33-9710-9FAEE4813A21}"/>
               </a:ext>
             </a:extLst>
           </p:cNvPr>
@@ -25316,217 +25183,45 @@
             <p:ph idx="1"/>
           </p:nvPr>
         </p:nvSpPr>
-        <p:spPr>
-          <a:xfrm>
-            <a:off x="640080" y="2872899"/>
-            <a:ext cx="4243589" cy="3320668"/>
-          </a:xfrm>
-        </p:spPr>
+        <p:spPr/>
         <p:txBody>
-          <a:bodyPr vert="horz" lIns="91440" tIns="45720" rIns="91440" bIns="45720" rtlCol="0">
+          <a:bodyPr vert="horz" lIns="91440" tIns="45720" rIns="91440" bIns="45720" rtlCol="0" anchor="t">
             <a:normAutofit/>
           </a:bodyPr>
           <a:lstStyle/>
           <a:p>
             <a:r>
-              <a:rPr lang="fr-FR" sz="1700">
+              <a:rPr lang="fr-FR" sz="2000" u="sng">
                 <a:cs typeface="Calibri"/>
               </a:rPr>
-              <a:t>Collaboration entre ces chercheurs clés a façonné le développement de l'ARPANET.</a:t>
-            </a:r>
-            <a:endParaRPr lang="fr-FR" sz="1700"/>
-          </a:p>
-          <a:p>
-            <a:endParaRPr lang="fr-FR" sz="1700">
+              <a:t>Résilience et redondance</a:t>
+            </a:r>
+            <a:br>
+              <a:rPr lang="fr-FR" sz="2000" u="sng">
+                <a:cs typeface="Calibri"/>
+              </a:rPr>
+            </a:br>
+            <a:br>
+              <a:rPr lang="fr-FR" sz="2000" u="sng">
+                <a:cs typeface="Calibri"/>
+              </a:rPr>
+            </a:br>
+            <a:endParaRPr lang="fr-FR" sz="2000" u="sng">
               <a:cs typeface="Calibri"/>
             </a:endParaRPr>
           </a:p>
-          <a:p>
-            <a:r>
-              <a:rPr lang="fr-FR" sz="1700">
-                <a:cs typeface="Calibri"/>
-              </a:rPr>
-              <a:t>Fondation de l'ARPANET en 1969, considérée comme le point de départ d'Internet.</a:t>
-            </a:r>
-            <a:endParaRPr lang="fr-FR" sz="1700"/>
-          </a:p>
-          <a:p>
-            <a:endParaRPr lang="fr-FR" sz="1700">
-              <a:cs typeface="Calibri"/>
-            </a:endParaRPr>
-          </a:p>
-          <a:p>
-            <a:r>
-              <a:rPr lang="fr-FR" sz="1700">
-                <a:cs typeface="Calibri"/>
-              </a:rPr>
-              <a:t>Leur vision collective continue d'influencer l'évolution d'Internet et de la technologie</a:t>
-            </a:r>
-            <a:endParaRPr lang="fr-FR" sz="1700"/>
-          </a:p>
-          <a:p>
-            <a:endParaRPr lang="fr-FR" sz="1700">
-              <a:cs typeface="Calibri"/>
-            </a:endParaRPr>
-          </a:p>
         </p:txBody>
       </p:sp>
-      <p:pic>
-        <p:nvPicPr>
-          <p:cNvPr id="4" name="Image 3" descr="Une image contenant art, peinture, personne, graphisme&#10;&#10;Description générée automatiquement">
-            <a:extLst>
-              <a:ext uri="{FF2B5EF4-FFF2-40B4-BE49-F238E27FC236}">
-                <a16:creationId xmlns:a16="http://schemas.microsoft.com/office/drawing/2014/main" id="{D1CF49A7-6669-7447-A39F-A8A8061DA4C8}"/>
-              </a:ext>
-            </a:extLst>
-          </p:cNvPr>
-          <p:cNvPicPr>
-            <a:picLocks noChangeAspect="1"/>
-          </p:cNvPicPr>
-          <p:nvPr/>
-        </p:nvPicPr>
-        <p:blipFill rotWithShape="1">
-          <a:blip r:embed="rId3"/>
-          <a:srcRect l="15905" r="17141" b="-1"/>
-          <a:stretch/>
-        </p:blipFill>
-        <p:spPr>
-          <a:xfrm>
-            <a:off x="5311702" y="10"/>
-            <a:ext cx="6878775" cy="6857990"/>
-          </a:xfrm>
-          <a:custGeom>
-            <a:avLst/>
-            <a:gdLst/>
-            <a:ahLst/>
-            <a:cxnLst/>
-            <a:rect l="l" t="t" r="r" b="b"/>
-            <a:pathLst>
-              <a:path w="6878775" h="6858000">
-                <a:moveTo>
-                  <a:pt x="1102973" y="0"/>
-                </a:moveTo>
-                <a:lnTo>
-                  <a:pt x="1160688" y="0"/>
-                </a:lnTo>
-                <a:lnTo>
-                  <a:pt x="983189" y="331786"/>
-                </a:lnTo>
-                <a:cubicBezTo>
-                  <a:pt x="914866" y="469145"/>
-                  <a:pt x="850355" y="608712"/>
-                  <a:pt x="789261" y="750263"/>
-                </a:cubicBezTo>
-                <a:cubicBezTo>
-                  <a:pt x="774307" y="784928"/>
-                  <a:pt x="759992" y="819849"/>
-                  <a:pt x="745295" y="854514"/>
-                </a:cubicBezTo>
-                <a:cubicBezTo>
-                  <a:pt x="756682" y="845393"/>
-                  <a:pt x="765489" y="833492"/>
-                  <a:pt x="770857" y="819975"/>
-                </a:cubicBezTo>
-                <a:cubicBezTo>
-                  <a:pt x="879943" y="589569"/>
-                  <a:pt x="999605" y="365513"/>
-                  <a:pt x="1131329" y="148742"/>
-                </a:cubicBezTo>
-                <a:lnTo>
-                  <a:pt x="1227589" y="0"/>
-                </a:lnTo>
-                <a:lnTo>
-                  <a:pt x="6878775" y="0"/>
-                </a:lnTo>
-                <a:lnTo>
-                  <a:pt x="6878775" y="6858000"/>
-                </a:lnTo>
-                <a:lnTo>
-                  <a:pt x="713521" y="6858000"/>
-                </a:lnTo>
-                <a:lnTo>
-                  <a:pt x="625642" y="6670527"/>
-                </a:lnTo>
-                <a:cubicBezTo>
-                  <a:pt x="507232" y="6398531"/>
-                  <a:pt x="403083" y="6118381"/>
-                  <a:pt x="312785" y="5830359"/>
-                </a:cubicBezTo>
-                <a:cubicBezTo>
-                  <a:pt x="278149" y="5719759"/>
-                  <a:pt x="248879" y="5607635"/>
-                  <a:pt x="212198" y="5480401"/>
-                </a:cubicBezTo>
-                <a:cubicBezTo>
-                  <a:pt x="212208" y="5491601"/>
-                  <a:pt x="212803" y="5502788"/>
-                  <a:pt x="213988" y="5513923"/>
-                </a:cubicBezTo>
-                <a:cubicBezTo>
-                  <a:pt x="264089" y="5723695"/>
-                  <a:pt x="307290" y="5935370"/>
-                  <a:pt x="365826" y="6142729"/>
-                </a:cubicBezTo>
-                <a:cubicBezTo>
-                  <a:pt x="433152" y="6380817"/>
-                  <a:pt x="510068" y="6614016"/>
-                  <a:pt x="597975" y="6841549"/>
-                </a:cubicBezTo>
-                <a:lnTo>
-                  <a:pt x="604824" y="6858000"/>
-                </a:lnTo>
-                <a:lnTo>
-                  <a:pt x="552056" y="6858000"/>
-                </a:lnTo>
-                <a:lnTo>
-                  <a:pt x="539576" y="6828295"/>
-                </a:lnTo>
-                <a:cubicBezTo>
-                  <a:pt x="380597" y="6414594"/>
-                  <a:pt x="260223" y="5988893"/>
-                  <a:pt x="171555" y="5552906"/>
-                </a:cubicBezTo>
-                <a:cubicBezTo>
-                  <a:pt x="91163" y="5157998"/>
-                  <a:pt x="43746" y="4758899"/>
-                  <a:pt x="12305" y="4357388"/>
-                </a:cubicBezTo>
-                <a:cubicBezTo>
-                  <a:pt x="-14281" y="4013908"/>
-                  <a:pt x="4507" y="3672965"/>
-                  <a:pt x="46684" y="3331516"/>
-                </a:cubicBezTo>
-                <a:cubicBezTo>
-                  <a:pt x="127203" y="2664286"/>
-                  <a:pt x="277819" y="2007265"/>
-                  <a:pt x="496065" y="1371196"/>
-                </a:cubicBezTo>
-                <a:cubicBezTo>
-                  <a:pt x="636273" y="966066"/>
-                  <a:pt x="800445" y="573253"/>
-                  <a:pt x="995723" y="196614"/>
-                </a:cubicBezTo>
-                <a:close/>
-              </a:path>
-            </a:pathLst>
-          </a:custGeom>
-        </p:spPr>
-      </p:pic>
     </p:spTree>
     <p:extLst>
       <p:ext uri="{BB962C8B-B14F-4D97-AF65-F5344CB8AC3E}">
-        <p14:creationId xmlns:p14="http://schemas.microsoft.com/office/powerpoint/2010/main" val="2191452943"/>
+        <p14:creationId xmlns:p14="http://schemas.microsoft.com/office/powerpoint/2010/main" val="1173996352"/>
       </p:ext>
     </p:extLst>
   </p:cSld>
   <p:clrMapOvr>
     <a:masterClrMapping/>
   </p:clrMapOvr>
-  <p:extLst>
-    <p:ext uri="{6950BFC3-D8DA-4A85-94F7-54DA5524770B}">
-      <p188:commentRel xmlns:p188="http://schemas.microsoft.com/office/powerpoint/2018/8/main" r:id="rId2"/>
-    </p:ext>
-  </p:extLst>
 </p:sld>
 </file>
 

</xml_diff>